<commit_message>
Add a graph showing the error in train and validation, update slide
</commit_message>
<xml_diff>
--- a/Slide.pptx
+++ b/Slide.pptx
@@ -10454,14 +10454,7 @@
                 <a:latin typeface="Cambria Math" panose="02040503050406030204" pitchFamily="18" charset="0"/>
                 <a:ea typeface="Cambria Math" panose="02040503050406030204" pitchFamily="18" charset="0"/>
               </a:rPr>
-              <a:t>0</a:t>
-            </a:r>
-            <a:r>
-              <a:rPr lang="en-GB" dirty="0" smtClean="0">
-                <a:latin typeface="Cambria Math" panose="02040503050406030204" pitchFamily="18" charset="0"/>
-                <a:ea typeface="Cambria Math" panose="02040503050406030204" pitchFamily="18" charset="0"/>
-              </a:rPr>
-              <a:t>), activation=‘</a:t>
+              <a:t>0), activation=‘</a:t>
             </a:r>
             <a:r>
               <a:rPr lang="en-GB" dirty="0" err="1" smtClean="0">
@@ -10931,10 +10924,6 @@
               </a:rPr>
               <a:t>=1.103</a:t>
             </a:r>
-            <a:endParaRPr lang="en-GB" dirty="0" smtClean="0">
-              <a:latin typeface="Cambria Math" panose="02040503050406030204" pitchFamily="18" charset="0"/>
-              <a:ea typeface="Cambria Math" panose="02040503050406030204" pitchFamily="18" charset="0"/>
-            </a:endParaRPr>
           </a:p>
         </p:txBody>
       </p:sp>
@@ -11750,10 +11739,6 @@
               </a:rPr>
               <a:t>=8.841</a:t>
             </a:r>
-            <a:endParaRPr lang="en-GB" dirty="0" smtClean="0">
-              <a:latin typeface="Cambria Math" panose="02040503050406030204" pitchFamily="18" charset="0"/>
-              <a:ea typeface="Cambria Math" panose="02040503050406030204" pitchFamily="18" charset="0"/>
-            </a:endParaRPr>
           </a:p>
         </p:txBody>
       </p:sp>
@@ -12385,21 +12370,7 @@
                 <a:latin typeface="Cambria Math" panose="02040503050406030204" pitchFamily="18" charset="0"/>
                 <a:ea typeface="Cambria Math" panose="02040503050406030204" pitchFamily="18" charset="0"/>
               </a:rPr>
-              <a:t>: </a:t>
-            </a:r>
-            <a:r>
-              <a:rPr lang="en-GB" dirty="0" smtClean="0">
-                <a:latin typeface="Cambria Math" panose="02040503050406030204" pitchFamily="18" charset="0"/>
-                <a:ea typeface="Cambria Math" panose="02040503050406030204" pitchFamily="18" charset="0"/>
-              </a:rPr>
-              <a:t>50, 75, 100, 125, 150</a:t>
-            </a:r>
-            <a:r>
-              <a:rPr lang="en-GB" dirty="0" smtClean="0">
-                <a:latin typeface="Cambria Math" panose="02040503050406030204" pitchFamily="18" charset="0"/>
-                <a:ea typeface="Cambria Math" panose="02040503050406030204" pitchFamily="18" charset="0"/>
-              </a:rPr>
-              <a:t> </a:t>
+              <a:t>: 50, 75, 100, 125, 150 </a:t>
             </a:r>
             <a:r>
               <a:rPr lang="en-GB" dirty="0" err="1" smtClean="0">
@@ -12511,33 +12482,8 @@
                 <a:latin typeface="Cambria Math" panose="02040503050406030204" pitchFamily="18" charset="0"/>
                 <a:ea typeface="Cambria Math" panose="02040503050406030204" pitchFamily="18" charset="0"/>
               </a:rPr>
-              <a:t>: 16</a:t>
-            </a:r>
-            <a:r>
-              <a:rPr lang="en-GB" dirty="0" smtClean="0">
-                <a:latin typeface="Cambria Math" panose="02040503050406030204" pitchFamily="18" charset="0"/>
-                <a:ea typeface="Cambria Math" panose="02040503050406030204" pitchFamily="18" charset="0"/>
-              </a:rPr>
-              <a:t>, 32, </a:t>
-            </a:r>
-            <a:r>
-              <a:rPr lang="en-GB" dirty="0" smtClean="0">
-                <a:latin typeface="Cambria Math" panose="02040503050406030204" pitchFamily="18" charset="0"/>
-                <a:ea typeface="Cambria Math" panose="02040503050406030204" pitchFamily="18" charset="0"/>
-              </a:rPr>
-              <a:t>64, 128, </a:t>
-            </a:r>
-            <a:r>
-              <a:rPr lang="en-GB" dirty="0" smtClean="0">
-                <a:latin typeface="Cambria Math" panose="02040503050406030204" pitchFamily="18" charset="0"/>
-                <a:ea typeface="Cambria Math" panose="02040503050406030204" pitchFamily="18" charset="0"/>
-              </a:rPr>
-              <a:t>256</a:t>
-            </a:r>
-            <a:endParaRPr lang="en-GB" dirty="0" smtClean="0">
-              <a:latin typeface="Cambria Math" panose="02040503050406030204" pitchFamily="18" charset="0"/>
-              <a:ea typeface="Cambria Math" panose="02040503050406030204" pitchFamily="18" charset="0"/>
-            </a:endParaRPr>
+              <a:t>: 16, 32, 64, 128, 256</a:t>
+            </a:r>
           </a:p>
           <a:p>
             <a:pPr lvl="1"/>
@@ -12625,10 +12571,6 @@
               </a:rPr>
               <a:t>=2.238</a:t>
             </a:r>
-            <a:endParaRPr lang="en-GB" dirty="0" smtClean="0">
-              <a:latin typeface="Cambria Math" panose="02040503050406030204" pitchFamily="18" charset="0"/>
-              <a:ea typeface="Cambria Math" panose="02040503050406030204" pitchFamily="18" charset="0"/>
-            </a:endParaRPr>
           </a:p>
         </p:txBody>
       </p:sp>
@@ -14236,19 +14178,8 @@
                 <a:latin typeface="Cambria Math" panose="02040503050406030204" pitchFamily="18" charset="0"/>
                 <a:ea typeface="Cambria Math" panose="02040503050406030204" pitchFamily="18" charset="0"/>
               </a:rPr>
-              <a:t> </a:t>
-            </a:r>
-            <a:r>
-              <a:rPr lang="en-GB" dirty="0" smtClean="0">
-                <a:latin typeface="Cambria Math" panose="02040503050406030204" pitchFamily="18" charset="0"/>
-                <a:ea typeface="Cambria Math" panose="02040503050406030204" pitchFamily="18" charset="0"/>
-              </a:rPr>
-              <a:t>97.5%</a:t>
-            </a:r>
-            <a:endParaRPr lang="en-GB" dirty="0" smtClean="0">
-              <a:latin typeface="Cambria Math" panose="02040503050406030204" pitchFamily="18" charset="0"/>
-              <a:ea typeface="Cambria Math" panose="02040503050406030204" pitchFamily="18" charset="0"/>
-            </a:endParaRPr>
+              <a:t> 97.5%</a:t>
+            </a:r>
           </a:p>
         </p:txBody>
       </p:sp>
@@ -15609,10 +15540,6 @@
               </a:rPr>
               <a:t>:</a:t>
             </a:r>
-            <a:endParaRPr lang="en-GB" dirty="0" smtClean="0">
-              <a:latin typeface="Cambria Math" panose="02040503050406030204" pitchFamily="18" charset="0"/>
-              <a:ea typeface="Cambria Math" panose="02040503050406030204" pitchFamily="18" charset="0"/>
-            </a:endParaRPr>
           </a:p>
           <a:p>
             <a:pPr lvl="1"/>
@@ -25485,218 +25412,223 @@
             <p:ph idx="1"/>
           </p:nvPr>
         </p:nvSpPr>
-        <p:spPr/>
+        <p:spPr>
+          <a:xfrm>
+            <a:off x="1069848" y="2121408"/>
+            <a:ext cx="10058400" cy="4516501"/>
+          </a:xfrm>
+        </p:spPr>
         <p:txBody>
           <a:bodyPr>
-            <a:normAutofit/>
+            <a:normAutofit fontScale="25000" lnSpcReduction="20000"/>
           </a:bodyPr>
           <a:lstStyle/>
           <a:p>
             <a:r>
-              <a:rPr lang="en-GB" sz="2400" dirty="0" err="1" smtClean="0">
+              <a:rPr lang="en-GB" sz="6400" dirty="0" err="1" smtClean="0">
                 <a:latin typeface="Cambria Math" panose="02040503050406030204" pitchFamily="18" charset="0"/>
                 <a:ea typeface="Cambria Math" panose="02040503050406030204" pitchFamily="18" charset="0"/>
               </a:rPr>
               <a:t>Đâu</a:t>
             </a:r>
             <a:r>
-              <a:rPr lang="en-GB" sz="2400" dirty="0" smtClean="0">
-                <a:latin typeface="Cambria Math" panose="02040503050406030204" pitchFamily="18" charset="0"/>
-                <a:ea typeface="Cambria Math" panose="02040503050406030204" pitchFamily="18" charset="0"/>
-              </a:rPr>
-              <a:t> </a:t>
-            </a:r>
-            <a:r>
-              <a:rPr lang="en-GB" sz="2400" dirty="0" err="1" smtClean="0">
+              <a:rPr lang="en-GB" sz="6400" dirty="0" smtClean="0">
+                <a:latin typeface="Cambria Math" panose="02040503050406030204" pitchFamily="18" charset="0"/>
+                <a:ea typeface="Cambria Math" panose="02040503050406030204" pitchFamily="18" charset="0"/>
+              </a:rPr>
+              <a:t> </a:t>
+            </a:r>
+            <a:r>
+              <a:rPr lang="en-GB" sz="6400" dirty="0" err="1" smtClean="0">
                 <a:latin typeface="Cambria Math" panose="02040503050406030204" pitchFamily="18" charset="0"/>
                 <a:ea typeface="Cambria Math" panose="02040503050406030204" pitchFamily="18" charset="0"/>
               </a:rPr>
               <a:t>là</a:t>
             </a:r>
             <a:r>
-              <a:rPr lang="en-GB" sz="2400" dirty="0" smtClean="0">
-                <a:latin typeface="Cambria Math" panose="02040503050406030204" pitchFamily="18" charset="0"/>
-                <a:ea typeface="Cambria Math" panose="02040503050406030204" pitchFamily="18" charset="0"/>
-              </a:rPr>
-              <a:t> </a:t>
-            </a:r>
-            <a:r>
-              <a:rPr lang="en-GB" sz="2400" dirty="0" err="1" smtClean="0">
+              <a:rPr lang="en-GB" sz="6400" dirty="0" smtClean="0">
+                <a:latin typeface="Cambria Math" panose="02040503050406030204" pitchFamily="18" charset="0"/>
+                <a:ea typeface="Cambria Math" panose="02040503050406030204" pitchFamily="18" charset="0"/>
+              </a:rPr>
+              <a:t> </a:t>
+            </a:r>
+            <a:r>
+              <a:rPr lang="en-GB" sz="6400" dirty="0" err="1" smtClean="0">
                 <a:latin typeface="Cambria Math" panose="02040503050406030204" pitchFamily="18" charset="0"/>
                 <a:ea typeface="Cambria Math" panose="02040503050406030204" pitchFamily="18" charset="0"/>
               </a:rPr>
               <a:t>công</a:t>
             </a:r>
             <a:r>
-              <a:rPr lang="en-GB" sz="2400" dirty="0" smtClean="0">
-                <a:latin typeface="Cambria Math" panose="02040503050406030204" pitchFamily="18" charset="0"/>
-                <a:ea typeface="Cambria Math" panose="02040503050406030204" pitchFamily="18" charset="0"/>
-              </a:rPr>
-              <a:t> </a:t>
-            </a:r>
-            <a:r>
-              <a:rPr lang="en-GB" sz="2400" dirty="0" err="1" smtClean="0">
+              <a:rPr lang="en-GB" sz="6400" dirty="0" smtClean="0">
+                <a:latin typeface="Cambria Math" panose="02040503050406030204" pitchFamily="18" charset="0"/>
+                <a:ea typeface="Cambria Math" panose="02040503050406030204" pitchFamily="18" charset="0"/>
+              </a:rPr>
+              <a:t> </a:t>
+            </a:r>
+            <a:r>
+              <a:rPr lang="en-GB" sz="6400" dirty="0" err="1" smtClean="0">
                 <a:latin typeface="Cambria Math" panose="02040503050406030204" pitchFamily="18" charset="0"/>
                 <a:ea typeface="Cambria Math" panose="02040503050406030204" pitchFamily="18" charset="0"/>
               </a:rPr>
               <a:t>thức</a:t>
             </a:r>
             <a:r>
-              <a:rPr lang="en-GB" sz="2400" dirty="0" smtClean="0">
-                <a:latin typeface="Cambria Math" panose="02040503050406030204" pitchFamily="18" charset="0"/>
-                <a:ea typeface="Cambria Math" panose="02040503050406030204" pitchFamily="18" charset="0"/>
-              </a:rPr>
-              <a:t> </a:t>
-            </a:r>
-            <a:r>
-              <a:rPr lang="en-GB" sz="2400" dirty="0" err="1" smtClean="0">
+              <a:rPr lang="en-GB" sz="6400" dirty="0" smtClean="0">
+                <a:latin typeface="Cambria Math" panose="02040503050406030204" pitchFamily="18" charset="0"/>
+                <a:ea typeface="Cambria Math" panose="02040503050406030204" pitchFamily="18" charset="0"/>
+              </a:rPr>
+              <a:t> </a:t>
+            </a:r>
+            <a:r>
+              <a:rPr lang="en-GB" sz="6400" dirty="0" err="1" smtClean="0">
                 <a:latin typeface="Cambria Math" panose="02040503050406030204" pitchFamily="18" charset="0"/>
                 <a:ea typeface="Cambria Math" panose="02040503050406030204" pitchFamily="18" charset="0"/>
               </a:rPr>
               <a:t>tính</a:t>
             </a:r>
             <a:r>
-              <a:rPr lang="en-GB" sz="2400" dirty="0" smtClean="0">
-                <a:latin typeface="Cambria Math" panose="02040503050406030204" pitchFamily="18" charset="0"/>
-                <a:ea typeface="Cambria Math" panose="02040503050406030204" pitchFamily="18" charset="0"/>
-              </a:rPr>
-              <a:t> </a:t>
-            </a:r>
-            <a:r>
-              <a:rPr lang="en-GB" sz="2400" dirty="0" err="1" smtClean="0">
+              <a:rPr lang="en-GB" sz="6400" dirty="0" smtClean="0">
+                <a:latin typeface="Cambria Math" panose="02040503050406030204" pitchFamily="18" charset="0"/>
+                <a:ea typeface="Cambria Math" panose="02040503050406030204" pitchFamily="18" charset="0"/>
+              </a:rPr>
+              <a:t> </a:t>
+            </a:r>
+            <a:r>
+              <a:rPr lang="en-GB" sz="6400" dirty="0" err="1" smtClean="0">
                 <a:latin typeface="Cambria Math" panose="02040503050406030204" pitchFamily="18" charset="0"/>
                 <a:ea typeface="Cambria Math" panose="02040503050406030204" pitchFamily="18" charset="0"/>
               </a:rPr>
               <a:t>năng</a:t>
             </a:r>
             <a:r>
-              <a:rPr lang="en-GB" sz="2400" dirty="0" smtClean="0">
-                <a:latin typeface="Cambria Math" panose="02040503050406030204" pitchFamily="18" charset="0"/>
-                <a:ea typeface="Cambria Math" panose="02040503050406030204" pitchFamily="18" charset="0"/>
-              </a:rPr>
-              <a:t> </a:t>
-            </a:r>
-            <a:r>
-              <a:rPr lang="en-GB" sz="2400" dirty="0" err="1" smtClean="0">
+              <a:rPr lang="en-GB" sz="6400" dirty="0" smtClean="0">
+                <a:latin typeface="Cambria Math" panose="02040503050406030204" pitchFamily="18" charset="0"/>
+                <a:ea typeface="Cambria Math" panose="02040503050406030204" pitchFamily="18" charset="0"/>
+              </a:rPr>
+              <a:t> </a:t>
+            </a:r>
+            <a:r>
+              <a:rPr lang="en-GB" sz="6400" dirty="0" err="1" smtClean="0">
                 <a:latin typeface="Cambria Math" panose="02040503050406030204" pitchFamily="18" charset="0"/>
                 <a:ea typeface="Cambria Math" panose="02040503050406030204" pitchFamily="18" charset="0"/>
               </a:rPr>
               <a:t>lượng</a:t>
             </a:r>
             <a:r>
-              <a:rPr lang="en-GB" sz="2400" dirty="0" smtClean="0">
-                <a:latin typeface="Cambria Math" panose="02040503050406030204" pitchFamily="18" charset="0"/>
-                <a:ea typeface="Cambria Math" panose="02040503050406030204" pitchFamily="18" charset="0"/>
-              </a:rPr>
-              <a:t> </a:t>
-            </a:r>
-            <a:r>
-              <a:rPr lang="en-GB" sz="2400" dirty="0" err="1" smtClean="0">
+              <a:rPr lang="en-GB" sz="6400" dirty="0" smtClean="0">
+                <a:latin typeface="Cambria Math" panose="02040503050406030204" pitchFamily="18" charset="0"/>
+                <a:ea typeface="Cambria Math" panose="02040503050406030204" pitchFamily="18" charset="0"/>
+              </a:rPr>
+              <a:t> </a:t>
+            </a:r>
+            <a:r>
+              <a:rPr lang="en-GB" sz="6400" dirty="0" err="1" smtClean="0">
                 <a:latin typeface="Cambria Math" panose="02040503050406030204" pitchFamily="18" charset="0"/>
                 <a:ea typeface="Cambria Math" panose="02040503050406030204" pitchFamily="18" charset="0"/>
               </a:rPr>
               <a:t>từ</a:t>
             </a:r>
             <a:r>
-              <a:rPr lang="en-GB" sz="2400" dirty="0" smtClean="0">
-                <a:latin typeface="Cambria Math" panose="02040503050406030204" pitchFamily="18" charset="0"/>
-                <a:ea typeface="Cambria Math" panose="02040503050406030204" pitchFamily="18" charset="0"/>
-              </a:rPr>
-              <a:t> </a:t>
-            </a:r>
-            <a:r>
-              <a:rPr lang="en-GB" sz="2400" dirty="0" err="1" smtClean="0">
+              <a:rPr lang="en-GB" sz="6400" dirty="0" smtClean="0">
+                <a:latin typeface="Cambria Math" panose="02040503050406030204" pitchFamily="18" charset="0"/>
+                <a:ea typeface="Cambria Math" panose="02040503050406030204" pitchFamily="18" charset="0"/>
+              </a:rPr>
+              <a:t> </a:t>
+            </a:r>
+            <a:r>
+              <a:rPr lang="en-GB" sz="6400" dirty="0" err="1" smtClean="0">
                 <a:latin typeface="Cambria Math" panose="02040503050406030204" pitchFamily="18" charset="0"/>
                 <a:ea typeface="Cambria Math" panose="02040503050406030204" pitchFamily="18" charset="0"/>
               </a:rPr>
               <a:t>các</a:t>
             </a:r>
             <a:r>
-              <a:rPr lang="en-GB" sz="2400" dirty="0" smtClean="0">
-                <a:latin typeface="Cambria Math" panose="02040503050406030204" pitchFamily="18" charset="0"/>
-                <a:ea typeface="Cambria Math" panose="02040503050406030204" pitchFamily="18" charset="0"/>
-              </a:rPr>
-              <a:t> </a:t>
-            </a:r>
-            <a:r>
-              <a:rPr lang="en-GB" sz="2400" dirty="0" err="1" smtClean="0">
+              <a:rPr lang="en-GB" sz="6400" dirty="0" smtClean="0">
+                <a:latin typeface="Cambria Math" panose="02040503050406030204" pitchFamily="18" charset="0"/>
+                <a:ea typeface="Cambria Math" panose="02040503050406030204" pitchFamily="18" charset="0"/>
+              </a:rPr>
+              <a:t> </a:t>
+            </a:r>
+            <a:r>
+              <a:rPr lang="en-GB" sz="6400" dirty="0" err="1" smtClean="0">
                 <a:latin typeface="Cambria Math" panose="02040503050406030204" pitchFamily="18" charset="0"/>
                 <a:ea typeface="Cambria Math" panose="02040503050406030204" pitchFamily="18" charset="0"/>
               </a:rPr>
               <a:t>thành</a:t>
             </a:r>
             <a:r>
-              <a:rPr lang="en-GB" sz="2400" dirty="0" smtClean="0">
-                <a:latin typeface="Cambria Math" panose="02040503050406030204" pitchFamily="18" charset="0"/>
-                <a:ea typeface="Cambria Math" panose="02040503050406030204" pitchFamily="18" charset="0"/>
-              </a:rPr>
-              <a:t> </a:t>
-            </a:r>
-            <a:r>
-              <a:rPr lang="en-GB" sz="2400" dirty="0" err="1" smtClean="0">
+              <a:rPr lang="en-GB" sz="6400" dirty="0" smtClean="0">
+                <a:latin typeface="Cambria Math" panose="02040503050406030204" pitchFamily="18" charset="0"/>
+                <a:ea typeface="Cambria Math" panose="02040503050406030204" pitchFamily="18" charset="0"/>
+              </a:rPr>
+              <a:t> </a:t>
+            </a:r>
+            <a:r>
+              <a:rPr lang="en-GB" sz="6400" dirty="0" err="1" smtClean="0">
                 <a:latin typeface="Cambria Math" panose="02040503050406030204" pitchFamily="18" charset="0"/>
                 <a:ea typeface="Cambria Math" panose="02040503050406030204" pitchFamily="18" charset="0"/>
               </a:rPr>
               <a:t>phần</a:t>
             </a:r>
             <a:r>
-              <a:rPr lang="en-GB" sz="2400" dirty="0" smtClean="0">
-                <a:latin typeface="Cambria Math" panose="02040503050406030204" pitchFamily="18" charset="0"/>
-                <a:ea typeface="Cambria Math" panose="02040503050406030204" pitchFamily="18" charset="0"/>
-              </a:rPr>
-              <a:t> </a:t>
-            </a:r>
-            <a:r>
-              <a:rPr lang="en-GB" sz="2400" dirty="0" err="1" smtClean="0">
+              <a:rPr lang="en-GB" sz="6400" dirty="0" smtClean="0">
+                <a:latin typeface="Cambria Math" panose="02040503050406030204" pitchFamily="18" charset="0"/>
+                <a:ea typeface="Cambria Math" panose="02040503050406030204" pitchFamily="18" charset="0"/>
+              </a:rPr>
+              <a:t> </a:t>
+            </a:r>
+            <a:r>
+              <a:rPr lang="en-GB" sz="6400" dirty="0" err="1" smtClean="0">
                 <a:latin typeface="Cambria Math" panose="02040503050406030204" pitchFamily="18" charset="0"/>
                 <a:ea typeface="Cambria Math" panose="02040503050406030204" pitchFamily="18" charset="0"/>
               </a:rPr>
               <a:t>dinh</a:t>
             </a:r>
             <a:r>
-              <a:rPr lang="en-GB" sz="2400" dirty="0" smtClean="0">
-                <a:latin typeface="Cambria Math" panose="02040503050406030204" pitchFamily="18" charset="0"/>
-                <a:ea typeface="Cambria Math" panose="02040503050406030204" pitchFamily="18" charset="0"/>
-              </a:rPr>
-              <a:t> </a:t>
-            </a:r>
-            <a:r>
-              <a:rPr lang="en-GB" sz="2400" dirty="0" err="1" smtClean="0">
+              <a:rPr lang="en-GB" sz="6400" dirty="0" smtClean="0">
+                <a:latin typeface="Cambria Math" panose="02040503050406030204" pitchFamily="18" charset="0"/>
+                <a:ea typeface="Cambria Math" panose="02040503050406030204" pitchFamily="18" charset="0"/>
+              </a:rPr>
+              <a:t> </a:t>
+            </a:r>
+            <a:r>
+              <a:rPr lang="en-GB" sz="6400" dirty="0" err="1" smtClean="0">
                 <a:latin typeface="Cambria Math" panose="02040503050406030204" pitchFamily="18" charset="0"/>
                 <a:ea typeface="Cambria Math" panose="02040503050406030204" pitchFamily="18" charset="0"/>
               </a:rPr>
               <a:t>dưỡng</a:t>
             </a:r>
             <a:r>
-              <a:rPr lang="en-GB" sz="2400" dirty="0" smtClean="0">
-                <a:latin typeface="Cambria Math" panose="02040503050406030204" pitchFamily="18" charset="0"/>
-                <a:ea typeface="Cambria Math" panose="02040503050406030204" pitchFamily="18" charset="0"/>
-              </a:rPr>
-              <a:t> </a:t>
-            </a:r>
-            <a:r>
-              <a:rPr lang="en-GB" sz="2400" dirty="0" err="1" smtClean="0">
+              <a:rPr lang="en-GB" sz="6400" dirty="0" smtClean="0">
+                <a:latin typeface="Cambria Math" panose="02040503050406030204" pitchFamily="18" charset="0"/>
+                <a:ea typeface="Cambria Math" panose="02040503050406030204" pitchFamily="18" charset="0"/>
+              </a:rPr>
+              <a:t> </a:t>
+            </a:r>
+            <a:r>
+              <a:rPr lang="en-GB" sz="6400" dirty="0" err="1" smtClean="0">
                 <a:latin typeface="Cambria Math" panose="02040503050406030204" pitchFamily="18" charset="0"/>
                 <a:ea typeface="Cambria Math" panose="02040503050406030204" pitchFamily="18" charset="0"/>
               </a:rPr>
               <a:t>cụ</a:t>
             </a:r>
             <a:r>
-              <a:rPr lang="en-GB" sz="2400" dirty="0" smtClean="0">
-                <a:latin typeface="Cambria Math" panose="02040503050406030204" pitchFamily="18" charset="0"/>
-                <a:ea typeface="Cambria Math" panose="02040503050406030204" pitchFamily="18" charset="0"/>
-              </a:rPr>
-              <a:t> </a:t>
-            </a:r>
-            <a:r>
-              <a:rPr lang="en-GB" sz="2400" dirty="0" err="1" smtClean="0">
+              <a:rPr lang="en-GB" sz="6400" dirty="0" smtClean="0">
+                <a:latin typeface="Cambria Math" panose="02040503050406030204" pitchFamily="18" charset="0"/>
+                <a:ea typeface="Cambria Math" panose="02040503050406030204" pitchFamily="18" charset="0"/>
+              </a:rPr>
+              <a:t> </a:t>
+            </a:r>
+            <a:r>
+              <a:rPr lang="en-GB" sz="6400" dirty="0" err="1" smtClean="0">
                 <a:latin typeface="Cambria Math" panose="02040503050406030204" pitchFamily="18" charset="0"/>
                 <a:ea typeface="Cambria Math" panose="02040503050406030204" pitchFamily="18" charset="0"/>
               </a:rPr>
               <a:t>thể</a:t>
             </a:r>
             <a:r>
-              <a:rPr lang="en-GB" sz="2400" dirty="0" smtClean="0">
+              <a:rPr lang="en-GB" sz="6400" dirty="0" smtClean="0">
                 <a:latin typeface="Cambria Math" panose="02040503050406030204" pitchFamily="18" charset="0"/>
                 <a:ea typeface="Cambria Math" panose="02040503050406030204" pitchFamily="18" charset="0"/>
               </a:rPr>
@@ -25706,146 +25638,146 @@
           <a:p>
             <a:pPr lvl="1"/>
             <a:r>
-              <a:rPr lang="en-GB" sz="2200" dirty="0" smtClean="0">
+              <a:rPr lang="en-GB" sz="6400" dirty="0" smtClean="0">
                 <a:latin typeface="Cambria Math" panose="02040503050406030204" pitchFamily="18" charset="0"/>
                 <a:ea typeface="Cambria Math" panose="02040503050406030204" pitchFamily="18" charset="0"/>
               </a:rPr>
               <a:t>Input </a:t>
             </a:r>
             <a:r>
-              <a:rPr lang="en-GB" sz="2200" dirty="0" err="1" smtClean="0">
+              <a:rPr lang="en-GB" sz="6400" dirty="0" err="1" smtClean="0">
                 <a:latin typeface="Cambria Math" panose="02040503050406030204" pitchFamily="18" charset="0"/>
                 <a:ea typeface="Cambria Math" panose="02040503050406030204" pitchFamily="18" charset="0"/>
               </a:rPr>
               <a:t>được</a:t>
             </a:r>
             <a:r>
-              <a:rPr lang="en-GB" sz="2200" dirty="0" smtClean="0">
-                <a:latin typeface="Cambria Math" panose="02040503050406030204" pitchFamily="18" charset="0"/>
-                <a:ea typeface="Cambria Math" panose="02040503050406030204" pitchFamily="18" charset="0"/>
-              </a:rPr>
-              <a:t> </a:t>
-            </a:r>
-            <a:r>
-              <a:rPr lang="en-GB" sz="2200" dirty="0" err="1" smtClean="0">
+              <a:rPr lang="en-GB" sz="6400" dirty="0" smtClean="0">
+                <a:latin typeface="Cambria Math" panose="02040503050406030204" pitchFamily="18" charset="0"/>
+                <a:ea typeface="Cambria Math" panose="02040503050406030204" pitchFamily="18" charset="0"/>
+              </a:rPr>
+              <a:t> </a:t>
+            </a:r>
+            <a:r>
+              <a:rPr lang="en-GB" sz="6400" dirty="0" err="1" smtClean="0">
                 <a:latin typeface="Cambria Math" panose="02040503050406030204" pitchFamily="18" charset="0"/>
                 <a:ea typeface="Cambria Math" panose="02040503050406030204" pitchFamily="18" charset="0"/>
               </a:rPr>
               <a:t>xác</a:t>
             </a:r>
             <a:r>
-              <a:rPr lang="en-GB" sz="2200" dirty="0" smtClean="0">
-                <a:latin typeface="Cambria Math" panose="02040503050406030204" pitchFamily="18" charset="0"/>
-                <a:ea typeface="Cambria Math" panose="02040503050406030204" pitchFamily="18" charset="0"/>
-              </a:rPr>
-              <a:t> </a:t>
-            </a:r>
-            <a:r>
-              <a:rPr lang="en-GB" sz="2200" dirty="0" err="1" smtClean="0">
+              <a:rPr lang="en-GB" sz="6400" dirty="0" smtClean="0">
+                <a:latin typeface="Cambria Math" panose="02040503050406030204" pitchFamily="18" charset="0"/>
+                <a:ea typeface="Cambria Math" panose="02040503050406030204" pitchFamily="18" charset="0"/>
+              </a:rPr>
+              <a:t> </a:t>
+            </a:r>
+            <a:r>
+              <a:rPr lang="en-GB" sz="6400" dirty="0" err="1" smtClean="0">
                 <a:latin typeface="Cambria Math" panose="02040503050406030204" pitchFamily="18" charset="0"/>
                 <a:ea typeface="Cambria Math" panose="02040503050406030204" pitchFamily="18" charset="0"/>
               </a:rPr>
               <a:t>định</a:t>
             </a:r>
             <a:r>
-              <a:rPr lang="en-GB" sz="2200" dirty="0" smtClean="0">
-                <a:latin typeface="Cambria Math" panose="02040503050406030204" pitchFamily="18" charset="0"/>
-                <a:ea typeface="Cambria Math" panose="02040503050406030204" pitchFamily="18" charset="0"/>
-              </a:rPr>
-              <a:t> </a:t>
-            </a:r>
-            <a:r>
-              <a:rPr lang="en-GB" sz="2200" dirty="0" err="1" smtClean="0">
+              <a:rPr lang="en-GB" sz="6400" dirty="0" smtClean="0">
+                <a:latin typeface="Cambria Math" panose="02040503050406030204" pitchFamily="18" charset="0"/>
+                <a:ea typeface="Cambria Math" panose="02040503050406030204" pitchFamily="18" charset="0"/>
+              </a:rPr>
+              <a:t> </a:t>
+            </a:r>
+            <a:r>
+              <a:rPr lang="en-GB" sz="6400" dirty="0" err="1" smtClean="0">
                 <a:latin typeface="Cambria Math" panose="02040503050406030204" pitchFamily="18" charset="0"/>
                 <a:ea typeface="Cambria Math" panose="02040503050406030204" pitchFamily="18" charset="0"/>
               </a:rPr>
               <a:t>là</a:t>
             </a:r>
             <a:r>
-              <a:rPr lang="en-GB" sz="2200" dirty="0" smtClean="0">
-                <a:latin typeface="Cambria Math" panose="02040503050406030204" pitchFamily="18" charset="0"/>
-                <a:ea typeface="Cambria Math" panose="02040503050406030204" pitchFamily="18" charset="0"/>
-              </a:rPr>
-              <a:t> </a:t>
-            </a:r>
-            <a:r>
-              <a:rPr lang="en-GB" sz="2200" dirty="0" err="1" smtClean="0">
+              <a:rPr lang="en-GB" sz="6400" dirty="0" smtClean="0">
+                <a:latin typeface="Cambria Math" panose="02040503050406030204" pitchFamily="18" charset="0"/>
+                <a:ea typeface="Cambria Math" panose="02040503050406030204" pitchFamily="18" charset="0"/>
+              </a:rPr>
+              <a:t> </a:t>
+            </a:r>
+            <a:r>
+              <a:rPr lang="en-GB" sz="6400" dirty="0" err="1" smtClean="0">
                 <a:latin typeface="Cambria Math" panose="02040503050406030204" pitchFamily="18" charset="0"/>
                 <a:ea typeface="Cambria Math" panose="02040503050406030204" pitchFamily="18" charset="0"/>
               </a:rPr>
               <a:t>các</a:t>
             </a:r>
             <a:r>
-              <a:rPr lang="en-GB" sz="2200" dirty="0" smtClean="0">
-                <a:latin typeface="Cambria Math" panose="02040503050406030204" pitchFamily="18" charset="0"/>
-                <a:ea typeface="Cambria Math" panose="02040503050406030204" pitchFamily="18" charset="0"/>
-              </a:rPr>
-              <a:t> </a:t>
-            </a:r>
-            <a:r>
-              <a:rPr lang="en-GB" sz="2200" dirty="0" err="1" smtClean="0">
+              <a:rPr lang="en-GB" sz="6400" dirty="0" smtClean="0">
+                <a:latin typeface="Cambria Math" panose="02040503050406030204" pitchFamily="18" charset="0"/>
+                <a:ea typeface="Cambria Math" panose="02040503050406030204" pitchFamily="18" charset="0"/>
+              </a:rPr>
+              <a:t> </a:t>
+            </a:r>
+            <a:r>
+              <a:rPr lang="en-GB" sz="6400" dirty="0" err="1" smtClean="0">
                 <a:latin typeface="Cambria Math" panose="02040503050406030204" pitchFamily="18" charset="0"/>
                 <a:ea typeface="Cambria Math" panose="02040503050406030204" pitchFamily="18" charset="0"/>
               </a:rPr>
               <a:t>cột</a:t>
             </a:r>
             <a:r>
-              <a:rPr lang="en-GB" sz="2200" dirty="0" smtClean="0">
-                <a:latin typeface="Cambria Math" panose="02040503050406030204" pitchFamily="18" charset="0"/>
-                <a:ea typeface="Cambria Math" panose="02040503050406030204" pitchFamily="18" charset="0"/>
-              </a:rPr>
-              <a:t> </a:t>
-            </a:r>
-            <a:r>
-              <a:rPr lang="en-GB" sz="2200" dirty="0" err="1" smtClean="0">
+              <a:rPr lang="en-GB" sz="6400" dirty="0" smtClean="0">
+                <a:latin typeface="Cambria Math" panose="02040503050406030204" pitchFamily="18" charset="0"/>
+                <a:ea typeface="Cambria Math" panose="02040503050406030204" pitchFamily="18" charset="0"/>
+              </a:rPr>
+              <a:t> </a:t>
+            </a:r>
+            <a:r>
+              <a:rPr lang="en-GB" sz="6400" dirty="0" err="1" smtClean="0">
                 <a:latin typeface="Cambria Math" panose="02040503050406030204" pitchFamily="18" charset="0"/>
                 <a:ea typeface="Cambria Math" panose="02040503050406030204" pitchFamily="18" charset="0"/>
               </a:rPr>
               <a:t>thành</a:t>
             </a:r>
             <a:r>
-              <a:rPr lang="en-GB" sz="2200" dirty="0" smtClean="0">
-                <a:latin typeface="Cambria Math" panose="02040503050406030204" pitchFamily="18" charset="0"/>
-                <a:ea typeface="Cambria Math" panose="02040503050406030204" pitchFamily="18" charset="0"/>
-              </a:rPr>
-              <a:t> </a:t>
-            </a:r>
-            <a:r>
-              <a:rPr lang="en-GB" sz="2200" dirty="0" err="1" smtClean="0">
+              <a:rPr lang="en-GB" sz="6400" dirty="0" smtClean="0">
+                <a:latin typeface="Cambria Math" panose="02040503050406030204" pitchFamily="18" charset="0"/>
+                <a:ea typeface="Cambria Math" panose="02040503050406030204" pitchFamily="18" charset="0"/>
+              </a:rPr>
+              <a:t> </a:t>
+            </a:r>
+            <a:r>
+              <a:rPr lang="en-GB" sz="6400" dirty="0" err="1" smtClean="0">
                 <a:latin typeface="Cambria Math" panose="02040503050406030204" pitchFamily="18" charset="0"/>
                 <a:ea typeface="Cambria Math" panose="02040503050406030204" pitchFamily="18" charset="0"/>
               </a:rPr>
               <a:t>phần</a:t>
             </a:r>
             <a:r>
-              <a:rPr lang="en-GB" sz="2200" dirty="0" smtClean="0">
-                <a:latin typeface="Cambria Math" panose="02040503050406030204" pitchFamily="18" charset="0"/>
-                <a:ea typeface="Cambria Math" panose="02040503050406030204" pitchFamily="18" charset="0"/>
-              </a:rPr>
-              <a:t> </a:t>
-            </a:r>
-            <a:r>
-              <a:rPr lang="en-GB" sz="2200" dirty="0" err="1" smtClean="0">
+              <a:rPr lang="en-GB" sz="6400" dirty="0" smtClean="0">
+                <a:latin typeface="Cambria Math" panose="02040503050406030204" pitchFamily="18" charset="0"/>
+                <a:ea typeface="Cambria Math" panose="02040503050406030204" pitchFamily="18" charset="0"/>
+              </a:rPr>
+              <a:t> </a:t>
+            </a:r>
+            <a:r>
+              <a:rPr lang="en-GB" sz="6400" dirty="0" err="1" smtClean="0">
                 <a:latin typeface="Cambria Math" panose="02040503050406030204" pitchFamily="18" charset="0"/>
                 <a:ea typeface="Cambria Math" panose="02040503050406030204" pitchFamily="18" charset="0"/>
               </a:rPr>
               <a:t>dinh</a:t>
             </a:r>
             <a:r>
-              <a:rPr lang="en-GB" sz="2200" dirty="0" smtClean="0">
-                <a:latin typeface="Cambria Math" panose="02040503050406030204" pitchFamily="18" charset="0"/>
-                <a:ea typeface="Cambria Math" panose="02040503050406030204" pitchFamily="18" charset="0"/>
-              </a:rPr>
-              <a:t> </a:t>
-            </a:r>
-            <a:r>
-              <a:rPr lang="en-GB" sz="2200" dirty="0" err="1" smtClean="0">
+              <a:rPr lang="en-GB" sz="6400" dirty="0" smtClean="0">
+                <a:latin typeface="Cambria Math" panose="02040503050406030204" pitchFamily="18" charset="0"/>
+                <a:ea typeface="Cambria Math" panose="02040503050406030204" pitchFamily="18" charset="0"/>
+              </a:rPr>
+              <a:t> </a:t>
+            </a:r>
+            <a:r>
+              <a:rPr lang="en-GB" sz="6400" dirty="0" err="1" smtClean="0">
                 <a:latin typeface="Cambria Math" panose="02040503050406030204" pitchFamily="18" charset="0"/>
                 <a:ea typeface="Cambria Math" panose="02040503050406030204" pitchFamily="18" charset="0"/>
               </a:rPr>
               <a:t>dưỡng</a:t>
             </a:r>
-            <a:endParaRPr lang="en-GB" sz="2200" dirty="0" smtClean="0">
+            <a:endParaRPr lang="en-GB" sz="6400" dirty="0" smtClean="0">
               <a:latin typeface="Cambria Math" panose="02040503050406030204" pitchFamily="18" charset="0"/>
               <a:ea typeface="Cambria Math" panose="02040503050406030204" pitchFamily="18" charset="0"/>
             </a:endParaRPr>
@@ -25853,104 +25785,104 @@
           <a:p>
             <a:pPr lvl="1"/>
             <a:r>
-              <a:rPr lang="en-GB" sz="2200" dirty="0" smtClean="0">
+              <a:rPr lang="en-GB" sz="6400" dirty="0" smtClean="0">
                 <a:latin typeface="Cambria Math" panose="02040503050406030204" pitchFamily="18" charset="0"/>
                 <a:ea typeface="Cambria Math" panose="02040503050406030204" pitchFamily="18" charset="0"/>
               </a:rPr>
               <a:t>Output </a:t>
             </a:r>
             <a:r>
-              <a:rPr lang="en-GB" sz="2200" dirty="0" err="1" smtClean="0">
+              <a:rPr lang="en-GB" sz="6400" dirty="0" err="1" smtClean="0">
                 <a:latin typeface="Cambria Math" panose="02040503050406030204" pitchFamily="18" charset="0"/>
                 <a:ea typeface="Cambria Math" panose="02040503050406030204" pitchFamily="18" charset="0"/>
               </a:rPr>
               <a:t>được</a:t>
             </a:r>
             <a:r>
-              <a:rPr lang="en-GB" sz="2200" dirty="0" smtClean="0">
-                <a:latin typeface="Cambria Math" panose="02040503050406030204" pitchFamily="18" charset="0"/>
-                <a:ea typeface="Cambria Math" panose="02040503050406030204" pitchFamily="18" charset="0"/>
-              </a:rPr>
-              <a:t> </a:t>
-            </a:r>
-            <a:r>
-              <a:rPr lang="en-GB" sz="2200" dirty="0" err="1" smtClean="0">
+              <a:rPr lang="en-GB" sz="6400" dirty="0" smtClean="0">
+                <a:latin typeface="Cambria Math" panose="02040503050406030204" pitchFamily="18" charset="0"/>
+                <a:ea typeface="Cambria Math" panose="02040503050406030204" pitchFamily="18" charset="0"/>
+              </a:rPr>
+              <a:t> </a:t>
+            </a:r>
+            <a:r>
+              <a:rPr lang="en-GB" sz="6400" dirty="0" err="1" smtClean="0">
                 <a:latin typeface="Cambria Math" panose="02040503050406030204" pitchFamily="18" charset="0"/>
                 <a:ea typeface="Cambria Math" panose="02040503050406030204" pitchFamily="18" charset="0"/>
               </a:rPr>
               <a:t>xác</a:t>
             </a:r>
             <a:r>
-              <a:rPr lang="en-GB" sz="2200" dirty="0" smtClean="0">
-                <a:latin typeface="Cambria Math" panose="02040503050406030204" pitchFamily="18" charset="0"/>
-                <a:ea typeface="Cambria Math" panose="02040503050406030204" pitchFamily="18" charset="0"/>
-              </a:rPr>
-              <a:t> </a:t>
-            </a:r>
-            <a:r>
-              <a:rPr lang="en-GB" sz="2200" dirty="0" err="1" smtClean="0">
+              <a:rPr lang="en-GB" sz="6400" dirty="0" smtClean="0">
+                <a:latin typeface="Cambria Math" panose="02040503050406030204" pitchFamily="18" charset="0"/>
+                <a:ea typeface="Cambria Math" panose="02040503050406030204" pitchFamily="18" charset="0"/>
+              </a:rPr>
+              <a:t> </a:t>
+            </a:r>
+            <a:r>
+              <a:rPr lang="en-GB" sz="6400" dirty="0" err="1" smtClean="0">
                 <a:latin typeface="Cambria Math" panose="02040503050406030204" pitchFamily="18" charset="0"/>
                 <a:ea typeface="Cambria Math" panose="02040503050406030204" pitchFamily="18" charset="0"/>
               </a:rPr>
               <a:t>định</a:t>
             </a:r>
             <a:r>
-              <a:rPr lang="en-GB" sz="2200" dirty="0" smtClean="0">
-                <a:latin typeface="Cambria Math" panose="02040503050406030204" pitchFamily="18" charset="0"/>
-                <a:ea typeface="Cambria Math" panose="02040503050406030204" pitchFamily="18" charset="0"/>
-              </a:rPr>
-              <a:t> </a:t>
-            </a:r>
-            <a:r>
-              <a:rPr lang="en-GB" sz="2200" dirty="0" err="1" smtClean="0">
+              <a:rPr lang="en-GB" sz="6400" dirty="0" smtClean="0">
+                <a:latin typeface="Cambria Math" panose="02040503050406030204" pitchFamily="18" charset="0"/>
+                <a:ea typeface="Cambria Math" panose="02040503050406030204" pitchFamily="18" charset="0"/>
+              </a:rPr>
+              <a:t> </a:t>
+            </a:r>
+            <a:r>
+              <a:rPr lang="en-GB" sz="6400" dirty="0" err="1" smtClean="0">
                 <a:latin typeface="Cambria Math" panose="02040503050406030204" pitchFamily="18" charset="0"/>
                 <a:ea typeface="Cambria Math" panose="02040503050406030204" pitchFamily="18" charset="0"/>
               </a:rPr>
               <a:t>là</a:t>
             </a:r>
             <a:r>
-              <a:rPr lang="en-GB" sz="2200" dirty="0" smtClean="0">
-                <a:latin typeface="Cambria Math" panose="02040503050406030204" pitchFamily="18" charset="0"/>
-                <a:ea typeface="Cambria Math" panose="02040503050406030204" pitchFamily="18" charset="0"/>
-              </a:rPr>
-              <a:t> </a:t>
-            </a:r>
-            <a:r>
-              <a:rPr lang="en-GB" sz="2200" dirty="0" err="1" smtClean="0">
+              <a:rPr lang="en-GB" sz="6400" dirty="0" smtClean="0">
+                <a:latin typeface="Cambria Math" panose="02040503050406030204" pitchFamily="18" charset="0"/>
+                <a:ea typeface="Cambria Math" panose="02040503050406030204" pitchFamily="18" charset="0"/>
+              </a:rPr>
+              <a:t> </a:t>
+            </a:r>
+            <a:r>
+              <a:rPr lang="en-GB" sz="6400" dirty="0" err="1" smtClean="0">
                 <a:latin typeface="Cambria Math" panose="02040503050406030204" pitchFamily="18" charset="0"/>
                 <a:ea typeface="Cambria Math" panose="02040503050406030204" pitchFamily="18" charset="0"/>
               </a:rPr>
               <a:t>cột</a:t>
             </a:r>
             <a:r>
-              <a:rPr lang="en-GB" sz="2200" dirty="0" smtClean="0">
-                <a:latin typeface="Cambria Math" panose="02040503050406030204" pitchFamily="18" charset="0"/>
-                <a:ea typeface="Cambria Math" panose="02040503050406030204" pitchFamily="18" charset="0"/>
-              </a:rPr>
-              <a:t> </a:t>
-            </a:r>
-            <a:r>
-              <a:rPr lang="en-GB" sz="2200" dirty="0" err="1" smtClean="0">
+              <a:rPr lang="en-GB" sz="6400" dirty="0" smtClean="0">
+                <a:latin typeface="Cambria Math" panose="02040503050406030204" pitchFamily="18" charset="0"/>
+                <a:ea typeface="Cambria Math" panose="02040503050406030204" pitchFamily="18" charset="0"/>
+              </a:rPr>
+              <a:t> </a:t>
+            </a:r>
+            <a:r>
+              <a:rPr lang="en-GB" sz="6400" dirty="0" err="1" smtClean="0">
                 <a:latin typeface="Cambria Math" panose="02040503050406030204" pitchFamily="18" charset="0"/>
                 <a:ea typeface="Cambria Math" panose="02040503050406030204" pitchFamily="18" charset="0"/>
               </a:rPr>
               <a:t>năng</a:t>
             </a:r>
             <a:r>
-              <a:rPr lang="en-GB" sz="2200" dirty="0" smtClean="0">
-                <a:latin typeface="Cambria Math" panose="02040503050406030204" pitchFamily="18" charset="0"/>
-                <a:ea typeface="Cambria Math" panose="02040503050406030204" pitchFamily="18" charset="0"/>
-              </a:rPr>
-              <a:t> </a:t>
-            </a:r>
-            <a:r>
-              <a:rPr lang="en-GB" sz="2200" dirty="0" err="1" smtClean="0">
+              <a:rPr lang="en-GB" sz="6400" dirty="0" smtClean="0">
+                <a:latin typeface="Cambria Math" panose="02040503050406030204" pitchFamily="18" charset="0"/>
+                <a:ea typeface="Cambria Math" panose="02040503050406030204" pitchFamily="18" charset="0"/>
+              </a:rPr>
+              <a:t> </a:t>
+            </a:r>
+            <a:r>
+              <a:rPr lang="en-GB" sz="6400" dirty="0" err="1" smtClean="0">
                 <a:latin typeface="Cambria Math" panose="02040503050406030204" pitchFamily="18" charset="0"/>
                 <a:ea typeface="Cambria Math" panose="02040503050406030204" pitchFamily="18" charset="0"/>
               </a:rPr>
               <a:t>lượng</a:t>
             </a:r>
-            <a:endParaRPr lang="en-GB" sz="2200" dirty="0" smtClean="0">
+            <a:endParaRPr lang="en-GB" sz="6400" dirty="0" smtClean="0">
               <a:latin typeface="Cambria Math" panose="02040503050406030204" pitchFamily="18" charset="0"/>
               <a:ea typeface="Cambria Math" panose="02040503050406030204" pitchFamily="18" charset="0"/>
             </a:endParaRPr>
@@ -25958,1135 +25890,125 @@
           <a:p>
             <a:pPr lvl="1"/>
             <a:r>
-              <a:rPr lang="en-GB" sz="2200" dirty="0" err="1" smtClean="0">
+              <a:rPr lang="en-GB" sz="6400" dirty="0" err="1" smtClean="0">
                 <a:latin typeface="Cambria Math" panose="02040503050406030204" pitchFamily="18" charset="0"/>
                 <a:ea typeface="Cambria Math" panose="02040503050406030204" pitchFamily="18" charset="0"/>
               </a:rPr>
               <a:t>Dễ</a:t>
             </a:r>
             <a:r>
-              <a:rPr lang="en-GB" sz="2200" dirty="0" smtClean="0">
-                <a:latin typeface="Cambria Math" panose="02040503050406030204" pitchFamily="18" charset="0"/>
-                <a:ea typeface="Cambria Math" panose="02040503050406030204" pitchFamily="18" charset="0"/>
-              </a:rPr>
-              <a:t> </a:t>
-            </a:r>
-            <a:r>
-              <a:rPr lang="en-GB" sz="2200" dirty="0" err="1" smtClean="0">
+              <a:rPr lang="en-GB" sz="6400" dirty="0" smtClean="0">
+                <a:latin typeface="Cambria Math" panose="02040503050406030204" pitchFamily="18" charset="0"/>
+                <a:ea typeface="Cambria Math" panose="02040503050406030204" pitchFamily="18" charset="0"/>
+              </a:rPr>
+              <a:t> </a:t>
+            </a:r>
+            <a:r>
+              <a:rPr lang="en-GB" sz="6400" dirty="0" err="1" smtClean="0">
                 <a:latin typeface="Cambria Math" panose="02040503050406030204" pitchFamily="18" charset="0"/>
                 <a:ea typeface="Cambria Math" panose="02040503050406030204" pitchFamily="18" charset="0"/>
               </a:rPr>
               <a:t>nhận</a:t>
             </a:r>
             <a:r>
-              <a:rPr lang="en-GB" sz="2200" dirty="0" smtClean="0">
-                <a:latin typeface="Cambria Math" panose="02040503050406030204" pitchFamily="18" charset="0"/>
-                <a:ea typeface="Cambria Math" panose="02040503050406030204" pitchFamily="18" charset="0"/>
-              </a:rPr>
-              <a:t> </a:t>
-            </a:r>
-            <a:r>
-              <a:rPr lang="en-GB" sz="2200" dirty="0" err="1" smtClean="0">
+              <a:rPr lang="en-GB" sz="6400" dirty="0" smtClean="0">
+                <a:latin typeface="Cambria Math" panose="02040503050406030204" pitchFamily="18" charset="0"/>
+                <a:ea typeface="Cambria Math" panose="02040503050406030204" pitchFamily="18" charset="0"/>
+              </a:rPr>
+              <a:t> </a:t>
+            </a:r>
+            <a:r>
+              <a:rPr lang="en-GB" sz="6400" dirty="0" err="1" smtClean="0">
                 <a:latin typeface="Cambria Math" panose="02040503050406030204" pitchFamily="18" charset="0"/>
                 <a:ea typeface="Cambria Math" panose="02040503050406030204" pitchFamily="18" charset="0"/>
               </a:rPr>
               <a:t>thấy</a:t>
             </a:r>
             <a:r>
-              <a:rPr lang="en-GB" sz="2200" dirty="0" smtClean="0">
-                <a:latin typeface="Cambria Math" panose="02040503050406030204" pitchFamily="18" charset="0"/>
-                <a:ea typeface="Cambria Math" panose="02040503050406030204" pitchFamily="18" charset="0"/>
-              </a:rPr>
-              <a:t> </a:t>
-            </a:r>
-            <a:r>
-              <a:rPr lang="en-GB" sz="2200" dirty="0" err="1" smtClean="0">
+              <a:rPr lang="en-GB" sz="6400" dirty="0" smtClean="0">
+                <a:latin typeface="Cambria Math" panose="02040503050406030204" pitchFamily="18" charset="0"/>
+                <a:ea typeface="Cambria Math" panose="02040503050406030204" pitchFamily="18" charset="0"/>
+              </a:rPr>
+              <a:t> </a:t>
+            </a:r>
+            <a:r>
+              <a:rPr lang="en-GB" sz="6400" dirty="0" err="1" smtClean="0">
                 <a:latin typeface="Cambria Math" panose="02040503050406030204" pitchFamily="18" charset="0"/>
                 <a:ea typeface="Cambria Math" panose="02040503050406030204" pitchFamily="18" charset="0"/>
               </a:rPr>
               <a:t>đây</a:t>
             </a:r>
             <a:r>
-              <a:rPr lang="en-GB" sz="2200" dirty="0" smtClean="0">
-                <a:latin typeface="Cambria Math" panose="02040503050406030204" pitchFamily="18" charset="0"/>
-                <a:ea typeface="Cambria Math" panose="02040503050406030204" pitchFamily="18" charset="0"/>
-              </a:rPr>
-              <a:t> </a:t>
-            </a:r>
-            <a:r>
-              <a:rPr lang="en-GB" sz="2200" dirty="0" err="1" smtClean="0">
+              <a:rPr lang="en-GB" sz="6400" dirty="0" smtClean="0">
+                <a:latin typeface="Cambria Math" panose="02040503050406030204" pitchFamily="18" charset="0"/>
+                <a:ea typeface="Cambria Math" panose="02040503050406030204" pitchFamily="18" charset="0"/>
+              </a:rPr>
+              <a:t> </a:t>
+            </a:r>
+            <a:r>
+              <a:rPr lang="en-GB" sz="6400" dirty="0" err="1" smtClean="0">
                 <a:latin typeface="Cambria Math" panose="02040503050406030204" pitchFamily="18" charset="0"/>
                 <a:ea typeface="Cambria Math" panose="02040503050406030204" pitchFamily="18" charset="0"/>
               </a:rPr>
               <a:t>là</a:t>
             </a:r>
             <a:r>
-              <a:rPr lang="en-GB" sz="2200" dirty="0" smtClean="0">
-                <a:latin typeface="Cambria Math" panose="02040503050406030204" pitchFamily="18" charset="0"/>
-                <a:ea typeface="Cambria Math" panose="02040503050406030204" pitchFamily="18" charset="0"/>
-              </a:rPr>
-              <a:t> </a:t>
-            </a:r>
-            <a:r>
-              <a:rPr lang="en-GB" sz="2200" dirty="0" err="1" smtClean="0">
+              <a:rPr lang="en-GB" sz="6400" dirty="0" smtClean="0">
+                <a:latin typeface="Cambria Math" panose="02040503050406030204" pitchFamily="18" charset="0"/>
+                <a:ea typeface="Cambria Math" panose="02040503050406030204" pitchFamily="18" charset="0"/>
+              </a:rPr>
+              <a:t> </a:t>
+            </a:r>
+            <a:r>
+              <a:rPr lang="en-GB" sz="6400" dirty="0" err="1" smtClean="0">
                 <a:latin typeface="Cambria Math" panose="02040503050406030204" pitchFamily="18" charset="0"/>
                 <a:ea typeface="Cambria Math" panose="02040503050406030204" pitchFamily="18" charset="0"/>
               </a:rPr>
               <a:t>bài</a:t>
             </a:r>
             <a:r>
-              <a:rPr lang="en-GB" sz="2200" dirty="0" smtClean="0">
-                <a:latin typeface="Cambria Math" panose="02040503050406030204" pitchFamily="18" charset="0"/>
-                <a:ea typeface="Cambria Math" panose="02040503050406030204" pitchFamily="18" charset="0"/>
-              </a:rPr>
-              <a:t> </a:t>
-            </a:r>
-            <a:r>
-              <a:rPr lang="en-GB" sz="2200" dirty="0" err="1" smtClean="0">
+              <a:rPr lang="en-GB" sz="6400" dirty="0" smtClean="0">
+                <a:latin typeface="Cambria Math" panose="02040503050406030204" pitchFamily="18" charset="0"/>
+                <a:ea typeface="Cambria Math" panose="02040503050406030204" pitchFamily="18" charset="0"/>
+              </a:rPr>
+              <a:t> </a:t>
+            </a:r>
+            <a:r>
+              <a:rPr lang="en-GB" sz="6400" dirty="0" err="1" smtClean="0">
                 <a:latin typeface="Cambria Math" panose="02040503050406030204" pitchFamily="18" charset="0"/>
                 <a:ea typeface="Cambria Math" panose="02040503050406030204" pitchFamily="18" charset="0"/>
               </a:rPr>
               <a:t>toán</a:t>
             </a:r>
             <a:r>
-              <a:rPr lang="en-GB" sz="2200" dirty="0" smtClean="0">
-                <a:latin typeface="Cambria Math" panose="02040503050406030204" pitchFamily="18" charset="0"/>
-                <a:ea typeface="Cambria Math" panose="02040503050406030204" pitchFamily="18" charset="0"/>
-              </a:rPr>
-              <a:t> </a:t>
-            </a:r>
-            <a:r>
-              <a:rPr lang="en-GB" sz="2200" dirty="0" err="1" smtClean="0">
+              <a:rPr lang="en-GB" sz="6400" dirty="0" smtClean="0">
+                <a:latin typeface="Cambria Math" panose="02040503050406030204" pitchFamily="18" charset="0"/>
+                <a:ea typeface="Cambria Math" panose="02040503050406030204" pitchFamily="18" charset="0"/>
+              </a:rPr>
+              <a:t> </a:t>
+            </a:r>
+            <a:r>
+              <a:rPr lang="en-GB" sz="6400" dirty="0" err="1" smtClean="0">
                 <a:latin typeface="Cambria Math" panose="02040503050406030204" pitchFamily="18" charset="0"/>
                 <a:ea typeface="Cambria Math" panose="02040503050406030204" pitchFamily="18" charset="0"/>
               </a:rPr>
               <a:t>hồi</a:t>
             </a:r>
             <a:r>
-              <a:rPr lang="en-GB" sz="2200" dirty="0" smtClean="0">
-                <a:latin typeface="Cambria Math" panose="02040503050406030204" pitchFamily="18" charset="0"/>
-                <a:ea typeface="Cambria Math" panose="02040503050406030204" pitchFamily="18" charset="0"/>
-              </a:rPr>
-              <a:t> </a:t>
-            </a:r>
-            <a:r>
-              <a:rPr lang="en-GB" sz="2200" dirty="0" err="1" smtClean="0">
+              <a:rPr lang="en-GB" sz="6400" dirty="0" smtClean="0">
+                <a:latin typeface="Cambria Math" panose="02040503050406030204" pitchFamily="18" charset="0"/>
+                <a:ea typeface="Cambria Math" panose="02040503050406030204" pitchFamily="18" charset="0"/>
+              </a:rPr>
+              <a:t> </a:t>
+            </a:r>
+            <a:r>
+              <a:rPr lang="en-GB" sz="6400" dirty="0" err="1" smtClean="0">
                 <a:latin typeface="Cambria Math" panose="02040503050406030204" pitchFamily="18" charset="0"/>
                 <a:ea typeface="Cambria Math" panose="02040503050406030204" pitchFamily="18" charset="0"/>
               </a:rPr>
               <a:t>quy</a:t>
             </a:r>
-            <a:endParaRPr lang="en-GB" sz="2200" dirty="0" smtClean="0">
-              <a:latin typeface="Cambria Math" panose="02040503050406030204" pitchFamily="18" charset="0"/>
-              <a:ea typeface="Cambria Math" panose="02040503050406030204" pitchFamily="18" charset="0"/>
-            </a:endParaRPr>
-          </a:p>
-          <a:p>
-            <a:r>
-              <a:rPr lang="en-GB" sz="2400" dirty="0" err="1" smtClean="0">
-                <a:latin typeface="Cambria Math" panose="02040503050406030204" pitchFamily="18" charset="0"/>
-                <a:ea typeface="Cambria Math" panose="02040503050406030204" pitchFamily="18" charset="0"/>
-              </a:rPr>
-              <a:t>Việc</a:t>
-            </a:r>
-            <a:r>
-              <a:rPr lang="en-GB" sz="2400" dirty="0" smtClean="0">
-                <a:latin typeface="Cambria Math" panose="02040503050406030204" pitchFamily="18" charset="0"/>
-                <a:ea typeface="Cambria Math" panose="02040503050406030204" pitchFamily="18" charset="0"/>
-              </a:rPr>
-              <a:t> </a:t>
-            </a:r>
-            <a:r>
-              <a:rPr lang="en-GB" sz="2400" dirty="0" err="1" smtClean="0">
-                <a:latin typeface="Cambria Math" panose="02040503050406030204" pitchFamily="18" charset="0"/>
-                <a:ea typeface="Cambria Math" panose="02040503050406030204" pitchFamily="18" charset="0"/>
-              </a:rPr>
-              <a:t>tìm</a:t>
-            </a:r>
-            <a:r>
-              <a:rPr lang="en-GB" sz="2400" dirty="0" smtClean="0">
-                <a:latin typeface="Cambria Math" panose="02040503050406030204" pitchFamily="18" charset="0"/>
-                <a:ea typeface="Cambria Math" panose="02040503050406030204" pitchFamily="18" charset="0"/>
-              </a:rPr>
-              <a:t> </a:t>
-            </a:r>
-            <a:r>
-              <a:rPr lang="en-GB" sz="2400" dirty="0" err="1" smtClean="0">
-                <a:latin typeface="Cambria Math" panose="02040503050406030204" pitchFamily="18" charset="0"/>
-                <a:ea typeface="Cambria Math" panose="02040503050406030204" pitchFamily="18" charset="0"/>
-              </a:rPr>
-              <a:t>ra</a:t>
-            </a:r>
-            <a:r>
-              <a:rPr lang="en-GB" sz="2400" dirty="0" smtClean="0">
-                <a:latin typeface="Cambria Math" panose="02040503050406030204" pitchFamily="18" charset="0"/>
-                <a:ea typeface="Cambria Math" panose="02040503050406030204" pitchFamily="18" charset="0"/>
-              </a:rPr>
-              <a:t> </a:t>
-            </a:r>
-            <a:r>
-              <a:rPr lang="en-GB" sz="2400" dirty="0" err="1" smtClean="0">
-                <a:latin typeface="Cambria Math" panose="02040503050406030204" pitchFamily="18" charset="0"/>
-                <a:ea typeface="Cambria Math" panose="02040503050406030204" pitchFamily="18" charset="0"/>
-              </a:rPr>
-              <a:t>câu</a:t>
-            </a:r>
-            <a:r>
-              <a:rPr lang="en-GB" sz="2400" dirty="0" smtClean="0">
-                <a:latin typeface="Cambria Math" panose="02040503050406030204" pitchFamily="18" charset="0"/>
-                <a:ea typeface="Cambria Math" panose="02040503050406030204" pitchFamily="18" charset="0"/>
-              </a:rPr>
-              <a:t> </a:t>
-            </a:r>
-            <a:r>
-              <a:rPr lang="en-GB" sz="2400" dirty="0" err="1" smtClean="0">
-                <a:latin typeface="Cambria Math" panose="02040503050406030204" pitchFamily="18" charset="0"/>
-                <a:ea typeface="Cambria Math" panose="02040503050406030204" pitchFamily="18" charset="0"/>
-              </a:rPr>
-              <a:t>trả</a:t>
-            </a:r>
-            <a:r>
-              <a:rPr lang="en-GB" sz="2400" dirty="0" smtClean="0">
-                <a:latin typeface="Cambria Math" panose="02040503050406030204" pitchFamily="18" charset="0"/>
-                <a:ea typeface="Cambria Math" panose="02040503050406030204" pitchFamily="18" charset="0"/>
-              </a:rPr>
-              <a:t> </a:t>
-            </a:r>
-            <a:r>
-              <a:rPr lang="en-GB" sz="2400" dirty="0" err="1" smtClean="0">
-                <a:latin typeface="Cambria Math" panose="02040503050406030204" pitchFamily="18" charset="0"/>
-                <a:ea typeface="Cambria Math" panose="02040503050406030204" pitchFamily="18" charset="0"/>
-              </a:rPr>
-              <a:t>lời</a:t>
-            </a:r>
-            <a:r>
-              <a:rPr lang="en-GB" sz="2400" dirty="0" smtClean="0">
-                <a:latin typeface="Cambria Math" panose="02040503050406030204" pitchFamily="18" charset="0"/>
-                <a:ea typeface="Cambria Math" panose="02040503050406030204" pitchFamily="18" charset="0"/>
-              </a:rPr>
-              <a:t> </a:t>
-            </a:r>
-            <a:r>
-              <a:rPr lang="en-GB" sz="2400" dirty="0" err="1" smtClean="0">
-                <a:latin typeface="Cambria Math" panose="02040503050406030204" pitchFamily="18" charset="0"/>
-                <a:ea typeface="Cambria Math" panose="02040503050406030204" pitchFamily="18" charset="0"/>
-              </a:rPr>
-              <a:t>cho</a:t>
-            </a:r>
-            <a:r>
-              <a:rPr lang="en-GB" sz="2400" dirty="0" smtClean="0">
-                <a:latin typeface="Cambria Math" panose="02040503050406030204" pitchFamily="18" charset="0"/>
-                <a:ea typeface="Cambria Math" panose="02040503050406030204" pitchFamily="18" charset="0"/>
-              </a:rPr>
-              <a:t> </a:t>
-            </a:r>
-            <a:r>
-              <a:rPr lang="en-GB" sz="2400" dirty="0" err="1" smtClean="0">
-                <a:latin typeface="Cambria Math" panose="02040503050406030204" pitchFamily="18" charset="0"/>
-                <a:ea typeface="Cambria Math" panose="02040503050406030204" pitchFamily="18" charset="0"/>
-              </a:rPr>
-              <a:t>câu</a:t>
-            </a:r>
-            <a:r>
-              <a:rPr lang="en-GB" sz="2400" dirty="0" smtClean="0">
-                <a:latin typeface="Cambria Math" panose="02040503050406030204" pitchFamily="18" charset="0"/>
-                <a:ea typeface="Cambria Math" panose="02040503050406030204" pitchFamily="18" charset="0"/>
-              </a:rPr>
-              <a:t> </a:t>
-            </a:r>
-            <a:r>
-              <a:rPr lang="en-GB" sz="2400" dirty="0" err="1" smtClean="0">
-                <a:latin typeface="Cambria Math" panose="02040503050406030204" pitchFamily="18" charset="0"/>
-                <a:ea typeface="Cambria Math" panose="02040503050406030204" pitchFamily="18" charset="0"/>
-              </a:rPr>
-              <a:t>hỏi</a:t>
-            </a:r>
-            <a:r>
-              <a:rPr lang="en-GB" sz="2400" dirty="0" smtClean="0">
-                <a:latin typeface="Cambria Math" panose="02040503050406030204" pitchFamily="18" charset="0"/>
-                <a:ea typeface="Cambria Math" panose="02040503050406030204" pitchFamily="18" charset="0"/>
-              </a:rPr>
-              <a:t> </a:t>
-            </a:r>
-            <a:r>
-              <a:rPr lang="en-GB" sz="2400" dirty="0" err="1" smtClean="0">
-                <a:latin typeface="Cambria Math" panose="02040503050406030204" pitchFamily="18" charset="0"/>
-                <a:ea typeface="Cambria Math" panose="02040503050406030204" pitchFamily="18" charset="0"/>
-              </a:rPr>
-              <a:t>này</a:t>
-            </a:r>
-            <a:r>
-              <a:rPr lang="en-GB" sz="2400" dirty="0" smtClean="0">
-                <a:latin typeface="Cambria Math" panose="02040503050406030204" pitchFamily="18" charset="0"/>
-                <a:ea typeface="Cambria Math" panose="02040503050406030204" pitchFamily="18" charset="0"/>
-              </a:rPr>
-              <a:t> </a:t>
-            </a:r>
-            <a:r>
-              <a:rPr lang="en-GB" sz="2400" dirty="0" err="1" smtClean="0">
-                <a:latin typeface="Cambria Math" panose="02040503050406030204" pitchFamily="18" charset="0"/>
-                <a:ea typeface="Cambria Math" panose="02040503050406030204" pitchFamily="18" charset="0"/>
-              </a:rPr>
-              <a:t>có</a:t>
-            </a:r>
-            <a:r>
-              <a:rPr lang="en-GB" sz="2400" dirty="0" smtClean="0">
-                <a:latin typeface="Cambria Math" panose="02040503050406030204" pitchFamily="18" charset="0"/>
-                <a:ea typeface="Cambria Math" panose="02040503050406030204" pitchFamily="18" charset="0"/>
-              </a:rPr>
-              <a:t> ý </a:t>
-            </a:r>
-            <a:r>
-              <a:rPr lang="en-GB" sz="2400" dirty="0" err="1" smtClean="0">
-                <a:latin typeface="Cambria Math" panose="02040503050406030204" pitchFamily="18" charset="0"/>
-                <a:ea typeface="Cambria Math" panose="02040503050406030204" pitchFamily="18" charset="0"/>
-              </a:rPr>
-              <a:t>nghĩa</a:t>
-            </a:r>
-            <a:r>
-              <a:rPr lang="en-GB" sz="2400" dirty="0" smtClean="0">
-                <a:latin typeface="Cambria Math" panose="02040503050406030204" pitchFamily="18" charset="0"/>
-                <a:ea typeface="Cambria Math" panose="02040503050406030204" pitchFamily="18" charset="0"/>
-              </a:rPr>
-              <a:t>:</a:t>
-            </a:r>
-          </a:p>
-          <a:p>
-            <a:pPr lvl="1"/>
-            <a:r>
-              <a:rPr lang="en-GB" sz="2200" dirty="0" err="1" smtClean="0">
-                <a:latin typeface="Cambria Math" panose="02040503050406030204" pitchFamily="18" charset="0"/>
-                <a:ea typeface="Cambria Math" panose="02040503050406030204" pitchFamily="18" charset="0"/>
-              </a:rPr>
-              <a:t>Từ</a:t>
-            </a:r>
-            <a:r>
-              <a:rPr lang="en-GB" sz="2200" dirty="0" smtClean="0">
-                <a:latin typeface="Cambria Math" panose="02040503050406030204" pitchFamily="18" charset="0"/>
-                <a:ea typeface="Cambria Math" panose="02040503050406030204" pitchFamily="18" charset="0"/>
-              </a:rPr>
-              <a:t> </a:t>
-            </a:r>
-            <a:r>
-              <a:rPr lang="en-GB" sz="2200" dirty="0" err="1" smtClean="0">
-                <a:latin typeface="Cambria Math" panose="02040503050406030204" pitchFamily="18" charset="0"/>
-                <a:ea typeface="Cambria Math" panose="02040503050406030204" pitchFamily="18" charset="0"/>
-              </a:rPr>
-              <a:t>việc</a:t>
-            </a:r>
-            <a:r>
-              <a:rPr lang="en-GB" sz="2200" dirty="0" smtClean="0">
-                <a:latin typeface="Cambria Math" panose="02040503050406030204" pitchFamily="18" charset="0"/>
-                <a:ea typeface="Cambria Math" panose="02040503050406030204" pitchFamily="18" charset="0"/>
-              </a:rPr>
-              <a:t> </a:t>
-            </a:r>
-            <a:r>
-              <a:rPr lang="en-GB" sz="2200" dirty="0" err="1" smtClean="0">
-                <a:latin typeface="Cambria Math" panose="02040503050406030204" pitchFamily="18" charset="0"/>
-                <a:ea typeface="Cambria Math" panose="02040503050406030204" pitchFamily="18" charset="0"/>
-              </a:rPr>
-              <a:t>biết</a:t>
-            </a:r>
-            <a:r>
-              <a:rPr lang="en-GB" sz="2200" dirty="0" smtClean="0">
-                <a:latin typeface="Cambria Math" panose="02040503050406030204" pitchFamily="18" charset="0"/>
-                <a:ea typeface="Cambria Math" panose="02040503050406030204" pitchFamily="18" charset="0"/>
-              </a:rPr>
-              <a:t> </a:t>
-            </a:r>
-            <a:r>
-              <a:rPr lang="en-GB" sz="2200" dirty="0" err="1" smtClean="0">
-                <a:latin typeface="Cambria Math" panose="02040503050406030204" pitchFamily="18" charset="0"/>
-                <a:ea typeface="Cambria Math" panose="02040503050406030204" pitchFamily="18" charset="0"/>
-              </a:rPr>
-              <a:t>được</a:t>
-            </a:r>
-            <a:r>
-              <a:rPr lang="en-GB" sz="2200" dirty="0" smtClean="0">
-                <a:latin typeface="Cambria Math" panose="02040503050406030204" pitchFamily="18" charset="0"/>
-                <a:ea typeface="Cambria Math" panose="02040503050406030204" pitchFamily="18" charset="0"/>
-              </a:rPr>
-              <a:t> </a:t>
-            </a:r>
-            <a:r>
-              <a:rPr lang="en-GB" sz="2200" dirty="0" err="1" smtClean="0">
-                <a:latin typeface="Cambria Math" panose="02040503050406030204" pitchFamily="18" charset="0"/>
-                <a:ea typeface="Cambria Math" panose="02040503050406030204" pitchFamily="18" charset="0"/>
-              </a:rPr>
-              <a:t>mức</a:t>
-            </a:r>
-            <a:r>
-              <a:rPr lang="en-GB" sz="2200" dirty="0" smtClean="0">
-                <a:latin typeface="Cambria Math" panose="02040503050406030204" pitchFamily="18" charset="0"/>
-                <a:ea typeface="Cambria Math" panose="02040503050406030204" pitchFamily="18" charset="0"/>
-              </a:rPr>
-              <a:t> </a:t>
-            </a:r>
-            <a:r>
-              <a:rPr lang="en-GB" sz="2200" dirty="0" err="1" smtClean="0">
-                <a:latin typeface="Cambria Math" panose="02040503050406030204" pitchFamily="18" charset="0"/>
-                <a:ea typeface="Cambria Math" panose="02040503050406030204" pitchFamily="18" charset="0"/>
-              </a:rPr>
-              <a:t>năng</a:t>
-            </a:r>
-            <a:r>
-              <a:rPr lang="en-GB" sz="2200" dirty="0" smtClean="0">
-                <a:latin typeface="Cambria Math" panose="02040503050406030204" pitchFamily="18" charset="0"/>
-                <a:ea typeface="Cambria Math" panose="02040503050406030204" pitchFamily="18" charset="0"/>
-              </a:rPr>
-              <a:t> </a:t>
-            </a:r>
-            <a:r>
-              <a:rPr lang="en-GB" sz="2200" dirty="0" err="1" smtClean="0">
-                <a:latin typeface="Cambria Math" panose="02040503050406030204" pitchFamily="18" charset="0"/>
-                <a:ea typeface="Cambria Math" panose="02040503050406030204" pitchFamily="18" charset="0"/>
-              </a:rPr>
-              <a:t>lượng</a:t>
-            </a:r>
-            <a:r>
-              <a:rPr lang="en-GB" sz="2200" dirty="0" smtClean="0">
-                <a:latin typeface="Cambria Math" panose="02040503050406030204" pitchFamily="18" charset="0"/>
-                <a:ea typeface="Cambria Math" panose="02040503050406030204" pitchFamily="18" charset="0"/>
-              </a:rPr>
-              <a:t> </a:t>
-            </a:r>
-            <a:r>
-              <a:rPr lang="en-GB" sz="2200" dirty="0" err="1" smtClean="0">
-                <a:latin typeface="Cambria Math" panose="02040503050406030204" pitchFamily="18" charset="0"/>
-                <a:ea typeface="Cambria Math" panose="02040503050406030204" pitchFamily="18" charset="0"/>
-              </a:rPr>
-              <a:t>mà</a:t>
-            </a:r>
-            <a:r>
-              <a:rPr lang="en-GB" sz="2200" dirty="0" smtClean="0">
-                <a:latin typeface="Cambria Math" panose="02040503050406030204" pitchFamily="18" charset="0"/>
-                <a:ea typeface="Cambria Math" panose="02040503050406030204" pitchFamily="18" charset="0"/>
-              </a:rPr>
-              <a:t> </a:t>
-            </a:r>
-            <a:r>
-              <a:rPr lang="en-GB" sz="2200" dirty="0" err="1" smtClean="0">
-                <a:latin typeface="Cambria Math" panose="02040503050406030204" pitchFamily="18" charset="0"/>
-                <a:ea typeface="Cambria Math" panose="02040503050406030204" pitchFamily="18" charset="0"/>
-              </a:rPr>
-              <a:t>mỗi</a:t>
-            </a:r>
-            <a:r>
-              <a:rPr lang="en-GB" sz="2200" dirty="0" smtClean="0">
-                <a:latin typeface="Cambria Math" panose="02040503050406030204" pitchFamily="18" charset="0"/>
-                <a:ea typeface="Cambria Math" panose="02040503050406030204" pitchFamily="18" charset="0"/>
-              </a:rPr>
-              <a:t> </a:t>
-            </a:r>
-            <a:r>
-              <a:rPr lang="en-GB" sz="2200" dirty="0" err="1" smtClean="0">
-                <a:latin typeface="Cambria Math" panose="02040503050406030204" pitchFamily="18" charset="0"/>
-                <a:ea typeface="Cambria Math" panose="02040503050406030204" pitchFamily="18" charset="0"/>
-              </a:rPr>
-              <a:t>loại</a:t>
-            </a:r>
-            <a:r>
-              <a:rPr lang="en-GB" sz="2200" dirty="0" smtClean="0">
-                <a:latin typeface="Cambria Math" panose="02040503050406030204" pitchFamily="18" charset="0"/>
-                <a:ea typeface="Cambria Math" panose="02040503050406030204" pitchFamily="18" charset="0"/>
-              </a:rPr>
-              <a:t> </a:t>
-            </a:r>
-            <a:r>
-              <a:rPr lang="en-GB" sz="2200" dirty="0" err="1" smtClean="0">
-                <a:latin typeface="Cambria Math" panose="02040503050406030204" pitchFamily="18" charset="0"/>
-                <a:ea typeface="Cambria Math" panose="02040503050406030204" pitchFamily="18" charset="0"/>
-              </a:rPr>
-              <a:t>thực</a:t>
-            </a:r>
-            <a:r>
-              <a:rPr lang="en-GB" sz="2200" dirty="0" smtClean="0">
-                <a:latin typeface="Cambria Math" panose="02040503050406030204" pitchFamily="18" charset="0"/>
-                <a:ea typeface="Cambria Math" panose="02040503050406030204" pitchFamily="18" charset="0"/>
-              </a:rPr>
-              <a:t> </a:t>
-            </a:r>
-            <a:r>
-              <a:rPr lang="en-GB" sz="2200" dirty="0" err="1" smtClean="0">
-                <a:latin typeface="Cambria Math" panose="02040503050406030204" pitchFamily="18" charset="0"/>
-                <a:ea typeface="Cambria Math" panose="02040503050406030204" pitchFamily="18" charset="0"/>
-              </a:rPr>
-              <a:t>phẩm</a:t>
-            </a:r>
-            <a:r>
-              <a:rPr lang="en-GB" sz="2200" dirty="0" smtClean="0">
-                <a:latin typeface="Cambria Math" panose="02040503050406030204" pitchFamily="18" charset="0"/>
-                <a:ea typeface="Cambria Math" panose="02040503050406030204" pitchFamily="18" charset="0"/>
-              </a:rPr>
-              <a:t> </a:t>
-            </a:r>
-            <a:r>
-              <a:rPr lang="en-GB" sz="2200" dirty="0" err="1" smtClean="0">
-                <a:latin typeface="Cambria Math" panose="02040503050406030204" pitchFamily="18" charset="0"/>
-                <a:ea typeface="Cambria Math" panose="02040503050406030204" pitchFamily="18" charset="0"/>
-              </a:rPr>
-              <a:t>mang</a:t>
-            </a:r>
-            <a:r>
-              <a:rPr lang="en-GB" sz="2200" dirty="0" smtClean="0">
-                <a:latin typeface="Cambria Math" panose="02040503050406030204" pitchFamily="18" charset="0"/>
-                <a:ea typeface="Cambria Math" panose="02040503050406030204" pitchFamily="18" charset="0"/>
-              </a:rPr>
-              <a:t> </a:t>
-            </a:r>
-            <a:r>
-              <a:rPr lang="en-GB" sz="2200" dirty="0" err="1" smtClean="0">
-                <a:latin typeface="Cambria Math" panose="02040503050406030204" pitchFamily="18" charset="0"/>
-                <a:ea typeface="Cambria Math" panose="02040503050406030204" pitchFamily="18" charset="0"/>
-              </a:rPr>
-              <a:t>lại</a:t>
-            </a:r>
-            <a:r>
-              <a:rPr lang="en-GB" sz="2200" dirty="0" smtClean="0">
-                <a:latin typeface="Cambria Math" panose="02040503050406030204" pitchFamily="18" charset="0"/>
-                <a:ea typeface="Cambria Math" panose="02040503050406030204" pitchFamily="18" charset="0"/>
-              </a:rPr>
-              <a:t>, con </a:t>
-            </a:r>
-            <a:r>
-              <a:rPr lang="en-GB" sz="2200" dirty="0" err="1" smtClean="0">
-                <a:latin typeface="Cambria Math" panose="02040503050406030204" pitchFamily="18" charset="0"/>
-                <a:ea typeface="Cambria Math" panose="02040503050406030204" pitchFamily="18" charset="0"/>
-              </a:rPr>
-              <a:t>người</a:t>
-            </a:r>
-            <a:r>
-              <a:rPr lang="en-GB" sz="2200" dirty="0" smtClean="0">
-                <a:latin typeface="Cambria Math" panose="02040503050406030204" pitchFamily="18" charset="0"/>
-                <a:ea typeface="Cambria Math" panose="02040503050406030204" pitchFamily="18" charset="0"/>
-              </a:rPr>
-              <a:t> ta </a:t>
-            </a:r>
-            <a:r>
-              <a:rPr lang="en-GB" sz="2200" dirty="0" err="1" smtClean="0">
-                <a:latin typeface="Cambria Math" panose="02040503050406030204" pitchFamily="18" charset="0"/>
-                <a:ea typeface="Cambria Math" panose="02040503050406030204" pitchFamily="18" charset="0"/>
-              </a:rPr>
-              <a:t>có</a:t>
-            </a:r>
-            <a:r>
-              <a:rPr lang="en-GB" sz="2200" dirty="0" smtClean="0">
-                <a:latin typeface="Cambria Math" panose="02040503050406030204" pitchFamily="18" charset="0"/>
-                <a:ea typeface="Cambria Math" panose="02040503050406030204" pitchFamily="18" charset="0"/>
-              </a:rPr>
-              <a:t> </a:t>
-            </a:r>
-            <a:r>
-              <a:rPr lang="en-GB" sz="2200" dirty="0" err="1" smtClean="0">
-                <a:latin typeface="Cambria Math" panose="02040503050406030204" pitchFamily="18" charset="0"/>
-                <a:ea typeface="Cambria Math" panose="02040503050406030204" pitchFamily="18" charset="0"/>
-              </a:rPr>
-              <a:t>thể</a:t>
-            </a:r>
-            <a:r>
-              <a:rPr lang="en-GB" sz="2200" dirty="0" smtClean="0">
-                <a:latin typeface="Cambria Math" panose="02040503050406030204" pitchFamily="18" charset="0"/>
-                <a:ea typeface="Cambria Math" panose="02040503050406030204" pitchFamily="18" charset="0"/>
-              </a:rPr>
-              <a:t> </a:t>
-            </a:r>
-            <a:r>
-              <a:rPr lang="en-GB" sz="2200" dirty="0" err="1" smtClean="0">
-                <a:latin typeface="Cambria Math" panose="02040503050406030204" pitchFamily="18" charset="0"/>
-                <a:ea typeface="Cambria Math" panose="02040503050406030204" pitchFamily="18" charset="0"/>
-              </a:rPr>
-              <a:t>chủ</a:t>
-            </a:r>
-            <a:r>
-              <a:rPr lang="en-GB" sz="2200" dirty="0" smtClean="0">
-                <a:latin typeface="Cambria Math" panose="02040503050406030204" pitchFamily="18" charset="0"/>
-                <a:ea typeface="Cambria Math" panose="02040503050406030204" pitchFamily="18" charset="0"/>
-              </a:rPr>
-              <a:t> </a:t>
-            </a:r>
-            <a:r>
-              <a:rPr lang="en-GB" sz="2200" dirty="0" err="1" smtClean="0">
-                <a:latin typeface="Cambria Math" panose="02040503050406030204" pitchFamily="18" charset="0"/>
-                <a:ea typeface="Cambria Math" panose="02040503050406030204" pitchFamily="18" charset="0"/>
-              </a:rPr>
-              <a:t>động</a:t>
-            </a:r>
-            <a:r>
-              <a:rPr lang="en-GB" sz="2200" dirty="0" smtClean="0">
-                <a:latin typeface="Cambria Math" panose="02040503050406030204" pitchFamily="18" charset="0"/>
-                <a:ea typeface="Cambria Math" panose="02040503050406030204" pitchFamily="18" charset="0"/>
-              </a:rPr>
-              <a:t> </a:t>
-            </a:r>
-            <a:r>
-              <a:rPr lang="en-GB" sz="2200" dirty="0" err="1" smtClean="0">
-                <a:latin typeface="Cambria Math" panose="02040503050406030204" pitchFamily="18" charset="0"/>
-                <a:ea typeface="Cambria Math" panose="02040503050406030204" pitchFamily="18" charset="0"/>
-              </a:rPr>
-              <a:t>trong</a:t>
-            </a:r>
-            <a:r>
-              <a:rPr lang="en-GB" sz="2200" dirty="0" smtClean="0">
-                <a:latin typeface="Cambria Math" panose="02040503050406030204" pitchFamily="18" charset="0"/>
-                <a:ea typeface="Cambria Math" panose="02040503050406030204" pitchFamily="18" charset="0"/>
-              </a:rPr>
-              <a:t> </a:t>
-            </a:r>
-            <a:r>
-              <a:rPr lang="en-GB" sz="2200" dirty="0" err="1" smtClean="0">
-                <a:latin typeface="Cambria Math" panose="02040503050406030204" pitchFamily="18" charset="0"/>
-                <a:ea typeface="Cambria Math" panose="02040503050406030204" pitchFamily="18" charset="0"/>
-              </a:rPr>
-              <a:t>việc</a:t>
-            </a:r>
-            <a:r>
-              <a:rPr lang="en-GB" sz="2200" dirty="0" smtClean="0">
-                <a:latin typeface="Cambria Math" panose="02040503050406030204" pitchFamily="18" charset="0"/>
-                <a:ea typeface="Cambria Math" panose="02040503050406030204" pitchFamily="18" charset="0"/>
-              </a:rPr>
-              <a:t> </a:t>
-            </a:r>
-            <a:r>
-              <a:rPr lang="en-GB" sz="2200" dirty="0" err="1" smtClean="0">
-                <a:latin typeface="Cambria Math" panose="02040503050406030204" pitchFamily="18" charset="0"/>
-                <a:ea typeface="Cambria Math" panose="02040503050406030204" pitchFamily="18" charset="0"/>
-              </a:rPr>
-              <a:t>điều</a:t>
-            </a:r>
-            <a:r>
-              <a:rPr lang="en-GB" sz="2200" dirty="0" smtClean="0">
-                <a:latin typeface="Cambria Math" panose="02040503050406030204" pitchFamily="18" charset="0"/>
-                <a:ea typeface="Cambria Math" panose="02040503050406030204" pitchFamily="18" charset="0"/>
-              </a:rPr>
-              <a:t> </a:t>
-            </a:r>
-            <a:r>
-              <a:rPr lang="en-GB" sz="2200" dirty="0" err="1" smtClean="0">
-                <a:latin typeface="Cambria Math" panose="02040503050406030204" pitchFamily="18" charset="0"/>
-                <a:ea typeface="Cambria Math" panose="02040503050406030204" pitchFamily="18" charset="0"/>
-              </a:rPr>
-              <a:t>phối</a:t>
-            </a:r>
-            <a:r>
-              <a:rPr lang="en-GB" sz="2200" dirty="0" smtClean="0">
-                <a:latin typeface="Cambria Math" panose="02040503050406030204" pitchFamily="18" charset="0"/>
-                <a:ea typeface="Cambria Math" panose="02040503050406030204" pitchFamily="18" charset="0"/>
-              </a:rPr>
-              <a:t> </a:t>
-            </a:r>
-            <a:r>
-              <a:rPr lang="en-GB" sz="2200" dirty="0" err="1" smtClean="0">
-                <a:latin typeface="Cambria Math" panose="02040503050406030204" pitchFamily="18" charset="0"/>
-                <a:ea typeface="Cambria Math" panose="02040503050406030204" pitchFamily="18" charset="0"/>
-              </a:rPr>
-              <a:t>khẩu</a:t>
-            </a:r>
-            <a:r>
-              <a:rPr lang="en-GB" sz="2200" dirty="0" smtClean="0">
-                <a:latin typeface="Cambria Math" panose="02040503050406030204" pitchFamily="18" charset="0"/>
-                <a:ea typeface="Cambria Math" panose="02040503050406030204" pitchFamily="18" charset="0"/>
-              </a:rPr>
-              <a:t> </a:t>
-            </a:r>
-            <a:r>
-              <a:rPr lang="en-GB" sz="2200" dirty="0" err="1" smtClean="0">
-                <a:latin typeface="Cambria Math" panose="02040503050406030204" pitchFamily="18" charset="0"/>
-                <a:ea typeface="Cambria Math" panose="02040503050406030204" pitchFamily="18" charset="0"/>
-              </a:rPr>
-              <a:t>phần</a:t>
-            </a:r>
-            <a:r>
-              <a:rPr lang="en-GB" sz="2200" dirty="0" smtClean="0">
-                <a:latin typeface="Cambria Math" panose="02040503050406030204" pitchFamily="18" charset="0"/>
-                <a:ea typeface="Cambria Math" panose="02040503050406030204" pitchFamily="18" charset="0"/>
-              </a:rPr>
-              <a:t> </a:t>
-            </a:r>
-            <a:r>
-              <a:rPr lang="en-GB" sz="2200" dirty="0" err="1" smtClean="0">
-                <a:latin typeface="Cambria Math" panose="02040503050406030204" pitchFamily="18" charset="0"/>
-                <a:ea typeface="Cambria Math" panose="02040503050406030204" pitchFamily="18" charset="0"/>
-              </a:rPr>
-              <a:t>ăn</a:t>
-            </a:r>
-            <a:r>
-              <a:rPr lang="en-GB" sz="2200" dirty="0" smtClean="0">
-                <a:latin typeface="Cambria Math" panose="02040503050406030204" pitchFamily="18" charset="0"/>
-                <a:ea typeface="Cambria Math" panose="02040503050406030204" pitchFamily="18" charset="0"/>
-              </a:rPr>
-              <a:t> </a:t>
-            </a:r>
-            <a:r>
-              <a:rPr lang="en-GB" sz="2200" dirty="0" err="1" smtClean="0">
-                <a:latin typeface="Cambria Math" panose="02040503050406030204" pitchFamily="18" charset="0"/>
-                <a:ea typeface="Cambria Math" panose="02040503050406030204" pitchFamily="18" charset="0"/>
-              </a:rPr>
-              <a:t>hằng</a:t>
-            </a:r>
-            <a:r>
-              <a:rPr lang="en-GB" sz="2200" dirty="0" smtClean="0">
-                <a:latin typeface="Cambria Math" panose="02040503050406030204" pitchFamily="18" charset="0"/>
-                <a:ea typeface="Cambria Math" panose="02040503050406030204" pitchFamily="18" charset="0"/>
-              </a:rPr>
-              <a:t> </a:t>
-            </a:r>
-            <a:r>
-              <a:rPr lang="en-GB" sz="2200" dirty="0" err="1" smtClean="0">
-                <a:latin typeface="Cambria Math" panose="02040503050406030204" pitchFamily="18" charset="0"/>
-                <a:ea typeface="Cambria Math" panose="02040503050406030204" pitchFamily="18" charset="0"/>
-              </a:rPr>
-              <a:t>ngày</a:t>
-            </a:r>
-            <a:r>
-              <a:rPr lang="en-GB" sz="2200" dirty="0" smtClean="0">
-                <a:latin typeface="Cambria Math" panose="02040503050406030204" pitchFamily="18" charset="0"/>
-                <a:ea typeface="Cambria Math" panose="02040503050406030204" pitchFamily="18" charset="0"/>
-              </a:rPr>
-              <a:t> </a:t>
-            </a:r>
-            <a:r>
-              <a:rPr lang="en-GB" sz="2200" dirty="0" err="1" smtClean="0">
-                <a:latin typeface="Cambria Math" panose="02040503050406030204" pitchFamily="18" charset="0"/>
-                <a:ea typeface="Cambria Math" panose="02040503050406030204" pitchFamily="18" charset="0"/>
-              </a:rPr>
-              <a:t>sao</a:t>
-            </a:r>
-            <a:r>
-              <a:rPr lang="en-GB" sz="2200" dirty="0" smtClean="0">
-                <a:latin typeface="Cambria Math" panose="02040503050406030204" pitchFamily="18" charset="0"/>
-                <a:ea typeface="Cambria Math" panose="02040503050406030204" pitchFamily="18" charset="0"/>
-              </a:rPr>
-              <a:t> </a:t>
-            </a:r>
-            <a:r>
-              <a:rPr lang="en-GB" sz="2200" dirty="0" err="1" smtClean="0">
-                <a:latin typeface="Cambria Math" panose="02040503050406030204" pitchFamily="18" charset="0"/>
-                <a:ea typeface="Cambria Math" panose="02040503050406030204" pitchFamily="18" charset="0"/>
-              </a:rPr>
-              <a:t>cho</a:t>
-            </a:r>
-            <a:r>
-              <a:rPr lang="en-GB" sz="2200" dirty="0" smtClean="0">
-                <a:latin typeface="Cambria Math" panose="02040503050406030204" pitchFamily="18" charset="0"/>
-                <a:ea typeface="Cambria Math" panose="02040503050406030204" pitchFamily="18" charset="0"/>
-              </a:rPr>
-              <a:t> </a:t>
-            </a:r>
-            <a:r>
-              <a:rPr lang="en-GB" sz="2200" dirty="0" err="1" smtClean="0">
-                <a:latin typeface="Cambria Math" panose="02040503050406030204" pitchFamily="18" charset="0"/>
-                <a:ea typeface="Cambria Math" panose="02040503050406030204" pitchFamily="18" charset="0"/>
-              </a:rPr>
-              <a:t>cân</a:t>
-            </a:r>
-            <a:r>
-              <a:rPr lang="en-GB" sz="2200" dirty="0" smtClean="0">
-                <a:latin typeface="Cambria Math" panose="02040503050406030204" pitchFamily="18" charset="0"/>
-                <a:ea typeface="Cambria Math" panose="02040503050406030204" pitchFamily="18" charset="0"/>
-              </a:rPr>
-              <a:t> </a:t>
-            </a:r>
-            <a:r>
-              <a:rPr lang="en-GB" sz="2200" dirty="0" err="1" smtClean="0">
-                <a:latin typeface="Cambria Math" panose="02040503050406030204" pitchFamily="18" charset="0"/>
-                <a:ea typeface="Cambria Math" panose="02040503050406030204" pitchFamily="18" charset="0"/>
-              </a:rPr>
-              <a:t>bằng</a:t>
-            </a:r>
-            <a:r>
-              <a:rPr lang="en-GB" sz="2200" dirty="0" smtClean="0">
-                <a:latin typeface="Cambria Math" panose="02040503050406030204" pitchFamily="18" charset="0"/>
-                <a:ea typeface="Cambria Math" panose="02040503050406030204" pitchFamily="18" charset="0"/>
-              </a:rPr>
-              <a:t> </a:t>
-            </a:r>
-            <a:r>
-              <a:rPr lang="en-GB" sz="2200" dirty="0" err="1" smtClean="0">
-                <a:latin typeface="Cambria Math" panose="02040503050406030204" pitchFamily="18" charset="0"/>
-                <a:ea typeface="Cambria Math" panose="02040503050406030204" pitchFamily="18" charset="0"/>
-              </a:rPr>
-              <a:t>giữa</a:t>
-            </a:r>
-            <a:r>
-              <a:rPr lang="en-GB" sz="2200" dirty="0" smtClean="0">
-                <a:latin typeface="Cambria Math" panose="02040503050406030204" pitchFamily="18" charset="0"/>
-                <a:ea typeface="Cambria Math" panose="02040503050406030204" pitchFamily="18" charset="0"/>
-              </a:rPr>
-              <a:t> </a:t>
-            </a:r>
-            <a:r>
-              <a:rPr lang="en-GB" sz="2200" dirty="0" err="1" smtClean="0">
-                <a:latin typeface="Cambria Math" panose="02040503050406030204" pitchFamily="18" charset="0"/>
-                <a:ea typeface="Cambria Math" panose="02040503050406030204" pitchFamily="18" charset="0"/>
-              </a:rPr>
-              <a:t>mức</a:t>
-            </a:r>
-            <a:r>
-              <a:rPr lang="en-GB" sz="2200" dirty="0" smtClean="0">
-                <a:latin typeface="Cambria Math" panose="02040503050406030204" pitchFamily="18" charset="0"/>
-                <a:ea typeface="Cambria Math" panose="02040503050406030204" pitchFamily="18" charset="0"/>
-              </a:rPr>
-              <a:t> </a:t>
-            </a:r>
-            <a:r>
-              <a:rPr lang="en-GB" sz="2200" dirty="0" err="1" smtClean="0">
-                <a:latin typeface="Cambria Math" panose="02040503050406030204" pitchFamily="18" charset="0"/>
-                <a:ea typeface="Cambria Math" panose="02040503050406030204" pitchFamily="18" charset="0"/>
-              </a:rPr>
-              <a:t>năng</a:t>
-            </a:r>
-            <a:r>
-              <a:rPr lang="en-GB" sz="2200" dirty="0" smtClean="0">
-                <a:latin typeface="Cambria Math" panose="02040503050406030204" pitchFamily="18" charset="0"/>
-                <a:ea typeface="Cambria Math" panose="02040503050406030204" pitchFamily="18" charset="0"/>
-              </a:rPr>
-              <a:t> </a:t>
-            </a:r>
-            <a:r>
-              <a:rPr lang="en-GB" sz="2200" dirty="0" err="1" smtClean="0">
-                <a:latin typeface="Cambria Math" panose="02040503050406030204" pitchFamily="18" charset="0"/>
-                <a:ea typeface="Cambria Math" panose="02040503050406030204" pitchFamily="18" charset="0"/>
-              </a:rPr>
-              <a:t>lượng</a:t>
-            </a:r>
-            <a:r>
-              <a:rPr lang="en-GB" sz="2200" dirty="0" smtClean="0">
-                <a:latin typeface="Cambria Math" panose="02040503050406030204" pitchFamily="18" charset="0"/>
-                <a:ea typeface="Cambria Math" panose="02040503050406030204" pitchFamily="18" charset="0"/>
-              </a:rPr>
-              <a:t> </a:t>
-            </a:r>
-            <a:r>
-              <a:rPr lang="en-GB" sz="2200" dirty="0" err="1" smtClean="0">
-                <a:latin typeface="Cambria Math" panose="02040503050406030204" pitchFamily="18" charset="0"/>
-                <a:ea typeface="Cambria Math" panose="02040503050406030204" pitchFamily="18" charset="0"/>
-              </a:rPr>
-              <a:t>cần</a:t>
-            </a:r>
-            <a:r>
-              <a:rPr lang="en-GB" sz="2200" dirty="0" smtClean="0">
-                <a:latin typeface="Cambria Math" panose="02040503050406030204" pitchFamily="18" charset="0"/>
-                <a:ea typeface="Cambria Math" panose="02040503050406030204" pitchFamily="18" charset="0"/>
-              </a:rPr>
-              <a:t> </a:t>
-            </a:r>
-            <a:r>
-              <a:rPr lang="en-GB" sz="2200" dirty="0" err="1" smtClean="0">
-                <a:latin typeface="Cambria Math" panose="02040503050406030204" pitchFamily="18" charset="0"/>
-                <a:ea typeface="Cambria Math" panose="02040503050406030204" pitchFamily="18" charset="0"/>
-              </a:rPr>
-              <a:t>nạp</a:t>
-            </a:r>
-            <a:r>
-              <a:rPr lang="en-GB" sz="2200" dirty="0" smtClean="0">
-                <a:latin typeface="Cambria Math" panose="02040503050406030204" pitchFamily="18" charset="0"/>
-                <a:ea typeface="Cambria Math" panose="02040503050406030204" pitchFamily="18" charset="0"/>
-              </a:rPr>
-              <a:t> </a:t>
-            </a:r>
-            <a:r>
-              <a:rPr lang="en-GB" sz="2200" dirty="0" err="1" smtClean="0">
-                <a:latin typeface="Cambria Math" panose="02040503050406030204" pitchFamily="18" charset="0"/>
-                <a:ea typeface="Cambria Math" panose="02040503050406030204" pitchFamily="18" charset="0"/>
-              </a:rPr>
-              <a:t>vào</a:t>
-            </a:r>
-            <a:r>
-              <a:rPr lang="en-GB" sz="2200" dirty="0" smtClean="0">
-                <a:latin typeface="Cambria Math" panose="02040503050406030204" pitchFamily="18" charset="0"/>
-                <a:ea typeface="Cambria Math" panose="02040503050406030204" pitchFamily="18" charset="0"/>
-              </a:rPr>
-              <a:t> </a:t>
-            </a:r>
-            <a:r>
-              <a:rPr lang="en-GB" sz="2200" dirty="0" err="1" smtClean="0">
-                <a:latin typeface="Cambria Math" panose="02040503050406030204" pitchFamily="18" charset="0"/>
-                <a:ea typeface="Cambria Math" panose="02040503050406030204" pitchFamily="18" charset="0"/>
-              </a:rPr>
-              <a:t>và</a:t>
-            </a:r>
-            <a:r>
-              <a:rPr lang="en-GB" sz="2200" dirty="0" smtClean="0">
-                <a:latin typeface="Cambria Math" panose="02040503050406030204" pitchFamily="18" charset="0"/>
-                <a:ea typeface="Cambria Math" panose="02040503050406030204" pitchFamily="18" charset="0"/>
-              </a:rPr>
-              <a:t> </a:t>
-            </a:r>
-            <a:r>
-              <a:rPr lang="en-GB" sz="2200" dirty="0" err="1" smtClean="0">
-                <a:latin typeface="Cambria Math" panose="02040503050406030204" pitchFamily="18" charset="0"/>
-                <a:ea typeface="Cambria Math" panose="02040503050406030204" pitchFamily="18" charset="0"/>
-              </a:rPr>
-              <a:t>sức</a:t>
-            </a:r>
-            <a:r>
-              <a:rPr lang="en-GB" sz="2200" dirty="0" smtClean="0">
-                <a:latin typeface="Cambria Math" panose="02040503050406030204" pitchFamily="18" charset="0"/>
-                <a:ea typeface="Cambria Math" panose="02040503050406030204" pitchFamily="18" charset="0"/>
-              </a:rPr>
-              <a:t> </a:t>
-            </a:r>
-            <a:r>
-              <a:rPr lang="en-GB" sz="2200" dirty="0" err="1" smtClean="0">
-                <a:latin typeface="Cambria Math" panose="02040503050406030204" pitchFamily="18" charset="0"/>
-                <a:ea typeface="Cambria Math" panose="02040503050406030204" pitchFamily="18" charset="0"/>
-              </a:rPr>
-              <a:t>khỏe</a:t>
-            </a:r>
-            <a:r>
-              <a:rPr lang="en-GB" sz="2200" dirty="0" smtClean="0">
-                <a:latin typeface="Cambria Math" panose="02040503050406030204" pitchFamily="18" charset="0"/>
-                <a:ea typeface="Cambria Math" panose="02040503050406030204" pitchFamily="18" charset="0"/>
-              </a:rPr>
-              <a:t> </a:t>
-            </a:r>
-            <a:r>
-              <a:rPr lang="en-GB" sz="2200" dirty="0" err="1" smtClean="0">
-                <a:latin typeface="Cambria Math" panose="02040503050406030204" pitchFamily="18" charset="0"/>
-                <a:ea typeface="Cambria Math" panose="02040503050406030204" pitchFamily="18" charset="0"/>
-              </a:rPr>
-              <a:t>của</a:t>
-            </a:r>
-            <a:r>
-              <a:rPr lang="en-GB" sz="2200" dirty="0" smtClean="0">
-                <a:latin typeface="Cambria Math" panose="02040503050406030204" pitchFamily="18" charset="0"/>
-                <a:ea typeface="Cambria Math" panose="02040503050406030204" pitchFamily="18" charset="0"/>
-              </a:rPr>
-              <a:t> </a:t>
-            </a:r>
-            <a:r>
-              <a:rPr lang="en-GB" sz="2200" dirty="0" err="1" smtClean="0">
-                <a:latin typeface="Cambria Math" panose="02040503050406030204" pitchFamily="18" charset="0"/>
-                <a:ea typeface="Cambria Math" panose="02040503050406030204" pitchFamily="18" charset="0"/>
-              </a:rPr>
-              <a:t>họ</a:t>
-            </a:r>
-            <a:r>
-              <a:rPr lang="en-GB" sz="2200" dirty="0" smtClean="0">
-                <a:latin typeface="Cambria Math" panose="02040503050406030204" pitchFamily="18" charset="0"/>
-                <a:ea typeface="Cambria Math" panose="02040503050406030204" pitchFamily="18" charset="0"/>
-              </a:rPr>
-              <a:t>, </a:t>
-            </a:r>
-            <a:r>
-              <a:rPr lang="en-GB" sz="2200" dirty="0" err="1" smtClean="0">
-                <a:latin typeface="Cambria Math" panose="02040503050406030204" pitchFamily="18" charset="0"/>
-                <a:ea typeface="Cambria Math" panose="02040503050406030204" pitchFamily="18" charset="0"/>
-              </a:rPr>
-              <a:t>đặc</a:t>
-            </a:r>
-            <a:r>
-              <a:rPr lang="en-GB" sz="2200" dirty="0" smtClean="0">
-                <a:latin typeface="Cambria Math" panose="02040503050406030204" pitchFamily="18" charset="0"/>
-                <a:ea typeface="Cambria Math" panose="02040503050406030204" pitchFamily="18" charset="0"/>
-              </a:rPr>
-              <a:t> </a:t>
-            </a:r>
-            <a:r>
-              <a:rPr lang="en-GB" sz="2200" dirty="0" err="1" smtClean="0">
-                <a:latin typeface="Cambria Math" panose="02040503050406030204" pitchFamily="18" charset="0"/>
-                <a:ea typeface="Cambria Math" panose="02040503050406030204" pitchFamily="18" charset="0"/>
-              </a:rPr>
-              <a:t>biệt</a:t>
-            </a:r>
-            <a:r>
-              <a:rPr lang="en-GB" sz="2200" dirty="0" smtClean="0">
-                <a:latin typeface="Cambria Math" panose="02040503050406030204" pitchFamily="18" charset="0"/>
-                <a:ea typeface="Cambria Math" panose="02040503050406030204" pitchFamily="18" charset="0"/>
-              </a:rPr>
-              <a:t> </a:t>
-            </a:r>
-            <a:r>
-              <a:rPr lang="en-GB" sz="2200" dirty="0" err="1" smtClean="0">
-                <a:latin typeface="Cambria Math" panose="02040503050406030204" pitchFamily="18" charset="0"/>
-                <a:ea typeface="Cambria Math" panose="02040503050406030204" pitchFamily="18" charset="0"/>
-              </a:rPr>
-              <a:t>trong</a:t>
-            </a:r>
-            <a:r>
-              <a:rPr lang="en-GB" sz="2200" dirty="0" smtClean="0">
-                <a:latin typeface="Cambria Math" panose="02040503050406030204" pitchFamily="18" charset="0"/>
-                <a:ea typeface="Cambria Math" panose="02040503050406030204" pitchFamily="18" charset="0"/>
-              </a:rPr>
-              <a:t> </a:t>
-            </a:r>
-            <a:r>
-              <a:rPr lang="en-GB" sz="2200" dirty="0" err="1" smtClean="0">
-                <a:latin typeface="Cambria Math" panose="02040503050406030204" pitchFamily="18" charset="0"/>
-                <a:ea typeface="Cambria Math" panose="02040503050406030204" pitchFamily="18" charset="0"/>
-              </a:rPr>
-              <a:t>bối</a:t>
-            </a:r>
-            <a:r>
-              <a:rPr lang="en-GB" sz="2200" dirty="0" smtClean="0">
-                <a:latin typeface="Cambria Math" panose="02040503050406030204" pitchFamily="18" charset="0"/>
-                <a:ea typeface="Cambria Math" panose="02040503050406030204" pitchFamily="18" charset="0"/>
-              </a:rPr>
-              <a:t> </a:t>
-            </a:r>
-            <a:r>
-              <a:rPr lang="en-GB" sz="2200" dirty="0" err="1" smtClean="0">
-                <a:latin typeface="Cambria Math" panose="02040503050406030204" pitchFamily="18" charset="0"/>
-                <a:ea typeface="Cambria Math" panose="02040503050406030204" pitchFamily="18" charset="0"/>
-              </a:rPr>
-              <a:t>cảnh</a:t>
-            </a:r>
-            <a:r>
-              <a:rPr lang="en-GB" sz="2200" dirty="0" smtClean="0">
-                <a:latin typeface="Cambria Math" panose="02040503050406030204" pitchFamily="18" charset="0"/>
-                <a:ea typeface="Cambria Math" panose="02040503050406030204" pitchFamily="18" charset="0"/>
-              </a:rPr>
-              <a:t> con </a:t>
-            </a:r>
-            <a:r>
-              <a:rPr lang="en-GB" sz="2200" dirty="0" err="1" smtClean="0">
-                <a:latin typeface="Cambria Math" panose="02040503050406030204" pitchFamily="18" charset="0"/>
-                <a:ea typeface="Cambria Math" panose="02040503050406030204" pitchFamily="18" charset="0"/>
-              </a:rPr>
-              <a:t>người</a:t>
-            </a:r>
-            <a:r>
-              <a:rPr lang="en-GB" sz="2200" dirty="0" smtClean="0">
-                <a:latin typeface="Cambria Math" panose="02040503050406030204" pitchFamily="18" charset="0"/>
-                <a:ea typeface="Cambria Math" panose="02040503050406030204" pitchFamily="18" charset="0"/>
-              </a:rPr>
-              <a:t> </a:t>
-            </a:r>
-            <a:r>
-              <a:rPr lang="en-GB" sz="2200" dirty="0" err="1" smtClean="0">
-                <a:latin typeface="Cambria Math" panose="02040503050406030204" pitchFamily="18" charset="0"/>
-                <a:ea typeface="Cambria Math" panose="02040503050406030204" pitchFamily="18" charset="0"/>
-              </a:rPr>
-              <a:t>ngày</a:t>
-            </a:r>
-            <a:r>
-              <a:rPr lang="en-GB" sz="2200" dirty="0" smtClean="0">
-                <a:latin typeface="Cambria Math" panose="02040503050406030204" pitchFamily="18" charset="0"/>
-                <a:ea typeface="Cambria Math" panose="02040503050406030204" pitchFamily="18" charset="0"/>
-              </a:rPr>
-              <a:t> </a:t>
-            </a:r>
-            <a:r>
-              <a:rPr lang="en-GB" sz="2200" dirty="0" err="1" smtClean="0">
-                <a:latin typeface="Cambria Math" panose="02040503050406030204" pitchFamily="18" charset="0"/>
-                <a:ea typeface="Cambria Math" panose="02040503050406030204" pitchFamily="18" charset="0"/>
-              </a:rPr>
-              <a:t>càng</a:t>
-            </a:r>
-            <a:r>
-              <a:rPr lang="en-GB" sz="2200" dirty="0" smtClean="0">
-                <a:latin typeface="Cambria Math" panose="02040503050406030204" pitchFamily="18" charset="0"/>
-                <a:ea typeface="Cambria Math" panose="02040503050406030204" pitchFamily="18" charset="0"/>
-              </a:rPr>
-              <a:t> </a:t>
-            </a:r>
-            <a:r>
-              <a:rPr lang="en-GB" sz="2200" dirty="0" err="1" smtClean="0">
-                <a:latin typeface="Cambria Math" panose="02040503050406030204" pitchFamily="18" charset="0"/>
-                <a:ea typeface="Cambria Math" panose="02040503050406030204" pitchFamily="18" charset="0"/>
-              </a:rPr>
-              <a:t>chú</a:t>
-            </a:r>
-            <a:r>
-              <a:rPr lang="en-GB" sz="2200" dirty="0" smtClean="0">
-                <a:latin typeface="Cambria Math" panose="02040503050406030204" pitchFamily="18" charset="0"/>
-                <a:ea typeface="Cambria Math" panose="02040503050406030204" pitchFamily="18" charset="0"/>
-              </a:rPr>
-              <a:t> </a:t>
-            </a:r>
-            <a:r>
-              <a:rPr lang="en-GB" sz="2200" dirty="0" err="1" smtClean="0">
-                <a:latin typeface="Cambria Math" panose="02040503050406030204" pitchFamily="18" charset="0"/>
-                <a:ea typeface="Cambria Math" panose="02040503050406030204" pitchFamily="18" charset="0"/>
-              </a:rPr>
-              <a:t>trọng</a:t>
-            </a:r>
-            <a:r>
-              <a:rPr lang="en-GB" sz="2200" dirty="0" smtClean="0">
-                <a:latin typeface="Cambria Math" panose="02040503050406030204" pitchFamily="18" charset="0"/>
-                <a:ea typeface="Cambria Math" panose="02040503050406030204" pitchFamily="18" charset="0"/>
-              </a:rPr>
-              <a:t> </a:t>
-            </a:r>
-            <a:r>
-              <a:rPr lang="en-GB" sz="2200" dirty="0" err="1" smtClean="0">
-                <a:latin typeface="Cambria Math" panose="02040503050406030204" pitchFamily="18" charset="0"/>
-                <a:ea typeface="Cambria Math" panose="02040503050406030204" pitchFamily="18" charset="0"/>
-              </a:rPr>
-              <a:t>hơn</a:t>
-            </a:r>
-            <a:r>
-              <a:rPr lang="en-GB" sz="2200" dirty="0" smtClean="0">
-                <a:latin typeface="Cambria Math" panose="02040503050406030204" pitchFamily="18" charset="0"/>
-                <a:ea typeface="Cambria Math" panose="02040503050406030204" pitchFamily="18" charset="0"/>
-              </a:rPr>
-              <a:t> </a:t>
-            </a:r>
-            <a:r>
-              <a:rPr lang="en-GB" sz="2200" dirty="0" err="1" smtClean="0">
-                <a:latin typeface="Cambria Math" panose="02040503050406030204" pitchFamily="18" charset="0"/>
-                <a:ea typeface="Cambria Math" panose="02040503050406030204" pitchFamily="18" charset="0"/>
-              </a:rPr>
-              <a:t>vào</a:t>
-            </a:r>
-            <a:r>
-              <a:rPr lang="en-GB" sz="2200" dirty="0" smtClean="0">
-                <a:latin typeface="Cambria Math" panose="02040503050406030204" pitchFamily="18" charset="0"/>
-                <a:ea typeface="Cambria Math" panose="02040503050406030204" pitchFamily="18" charset="0"/>
-              </a:rPr>
-              <a:t> </a:t>
-            </a:r>
-            <a:r>
-              <a:rPr lang="en-GB" sz="2200" dirty="0" err="1" smtClean="0">
-                <a:latin typeface="Cambria Math" panose="02040503050406030204" pitchFamily="18" charset="0"/>
-                <a:ea typeface="Cambria Math" panose="02040503050406030204" pitchFamily="18" charset="0"/>
-              </a:rPr>
-              <a:t>sức</a:t>
-            </a:r>
-            <a:r>
-              <a:rPr lang="en-GB" sz="2200" dirty="0" smtClean="0">
-                <a:latin typeface="Cambria Math" panose="02040503050406030204" pitchFamily="18" charset="0"/>
-                <a:ea typeface="Cambria Math" panose="02040503050406030204" pitchFamily="18" charset="0"/>
-              </a:rPr>
-              <a:t> </a:t>
-            </a:r>
-            <a:r>
-              <a:rPr lang="en-GB" sz="2200" dirty="0" err="1" smtClean="0">
-                <a:latin typeface="Cambria Math" panose="02040503050406030204" pitchFamily="18" charset="0"/>
-                <a:ea typeface="Cambria Math" panose="02040503050406030204" pitchFamily="18" charset="0"/>
-              </a:rPr>
-              <a:t>khỏe</a:t>
-            </a:r>
-            <a:r>
-              <a:rPr lang="en-GB" sz="2200" dirty="0" smtClean="0">
-                <a:latin typeface="Cambria Math" panose="02040503050406030204" pitchFamily="18" charset="0"/>
-                <a:ea typeface="Cambria Math" panose="02040503050406030204" pitchFamily="18" charset="0"/>
-              </a:rPr>
-              <a:t> </a:t>
-            </a:r>
-            <a:r>
-              <a:rPr lang="en-GB" sz="2200" dirty="0" err="1" smtClean="0">
-                <a:latin typeface="Cambria Math" panose="02040503050406030204" pitchFamily="18" charset="0"/>
-                <a:ea typeface="Cambria Math" panose="02040503050406030204" pitchFamily="18" charset="0"/>
-              </a:rPr>
-              <a:t>của</a:t>
-            </a:r>
-            <a:r>
-              <a:rPr lang="en-GB" sz="2200" dirty="0" smtClean="0">
-                <a:latin typeface="Cambria Math" panose="02040503050406030204" pitchFamily="18" charset="0"/>
-                <a:ea typeface="Cambria Math" panose="02040503050406030204" pitchFamily="18" charset="0"/>
-              </a:rPr>
-              <a:t> </a:t>
-            </a:r>
-            <a:r>
-              <a:rPr lang="en-GB" sz="2200" dirty="0" err="1" smtClean="0">
-                <a:latin typeface="Cambria Math" panose="02040503050406030204" pitchFamily="18" charset="0"/>
-                <a:ea typeface="Cambria Math" panose="02040503050406030204" pitchFamily="18" charset="0"/>
-              </a:rPr>
-              <a:t>mình</a:t>
-            </a:r>
-            <a:endParaRPr lang="en-GB" sz="2200" dirty="0" smtClean="0">
+            <a:endParaRPr lang="en-GB" sz="6400" dirty="0" smtClean="0">
               <a:latin typeface="Cambria Math" panose="02040503050406030204" pitchFamily="18" charset="0"/>
               <a:ea typeface="Cambria Math" panose="02040503050406030204" pitchFamily="18" charset="0"/>
             </a:endParaRPr>
@@ -27094,446 +26016,1586 @@
           <a:p>
             <a:pPr lvl="1"/>
             <a:r>
-              <a:rPr lang="en-GB" sz="2200" dirty="0" err="1" smtClean="0">
+              <a:rPr lang="vi-VN" sz="6400" dirty="0">
+                <a:latin typeface="Cambria Math" panose="02040503050406030204" pitchFamily="18" charset="0"/>
+                <a:ea typeface="Cambria Math" panose="02040503050406030204" pitchFamily="18" charset="0"/>
+              </a:rPr>
+              <a:t>Như vậy năng lượng sẽ được tính thông qua một công thức với các hạng tử là các thành phần dinh dưỡng cụ </a:t>
+            </a:r>
+            <a:r>
+              <a:rPr lang="vi-VN" sz="6400" dirty="0" smtClean="0">
+                <a:latin typeface="Cambria Math" panose="02040503050406030204" pitchFamily="18" charset="0"/>
+                <a:ea typeface="Cambria Math" panose="02040503050406030204" pitchFamily="18" charset="0"/>
+              </a:rPr>
+              <a:t>thể</a:t>
+            </a:r>
+            <a:endParaRPr lang="en-GB" sz="6400" dirty="0" smtClean="0">
+              <a:latin typeface="Cambria Math" panose="02040503050406030204" pitchFamily="18" charset="0"/>
+              <a:ea typeface="Cambria Math" panose="02040503050406030204" pitchFamily="18" charset="0"/>
+            </a:endParaRPr>
+          </a:p>
+          <a:p>
+            <a:r>
+              <a:rPr lang="en-GB" sz="6400" dirty="0" err="1" smtClean="0">
+                <a:latin typeface="Cambria Math" panose="02040503050406030204" pitchFamily="18" charset="0"/>
+                <a:ea typeface="Cambria Math" panose="02040503050406030204" pitchFamily="18" charset="0"/>
+              </a:rPr>
+              <a:t>Việc</a:t>
+            </a:r>
+            <a:r>
+              <a:rPr lang="en-GB" sz="6400" dirty="0" smtClean="0">
+                <a:latin typeface="Cambria Math" panose="02040503050406030204" pitchFamily="18" charset="0"/>
+                <a:ea typeface="Cambria Math" panose="02040503050406030204" pitchFamily="18" charset="0"/>
+              </a:rPr>
+              <a:t> </a:t>
+            </a:r>
+            <a:r>
+              <a:rPr lang="en-GB" sz="6400" dirty="0" err="1" smtClean="0">
+                <a:latin typeface="Cambria Math" panose="02040503050406030204" pitchFamily="18" charset="0"/>
+                <a:ea typeface="Cambria Math" panose="02040503050406030204" pitchFamily="18" charset="0"/>
+              </a:rPr>
+              <a:t>tìm</a:t>
+            </a:r>
+            <a:r>
+              <a:rPr lang="en-GB" sz="6400" dirty="0" smtClean="0">
+                <a:latin typeface="Cambria Math" panose="02040503050406030204" pitchFamily="18" charset="0"/>
+                <a:ea typeface="Cambria Math" panose="02040503050406030204" pitchFamily="18" charset="0"/>
+              </a:rPr>
+              <a:t> </a:t>
+            </a:r>
+            <a:r>
+              <a:rPr lang="en-GB" sz="6400" dirty="0" err="1" smtClean="0">
+                <a:latin typeface="Cambria Math" panose="02040503050406030204" pitchFamily="18" charset="0"/>
+                <a:ea typeface="Cambria Math" panose="02040503050406030204" pitchFamily="18" charset="0"/>
+              </a:rPr>
+              <a:t>ra</a:t>
+            </a:r>
+            <a:r>
+              <a:rPr lang="en-GB" sz="6400" dirty="0" smtClean="0">
+                <a:latin typeface="Cambria Math" panose="02040503050406030204" pitchFamily="18" charset="0"/>
+                <a:ea typeface="Cambria Math" panose="02040503050406030204" pitchFamily="18" charset="0"/>
+              </a:rPr>
+              <a:t> </a:t>
+            </a:r>
+            <a:r>
+              <a:rPr lang="en-GB" sz="6400" dirty="0" err="1" smtClean="0">
+                <a:latin typeface="Cambria Math" panose="02040503050406030204" pitchFamily="18" charset="0"/>
+                <a:ea typeface="Cambria Math" panose="02040503050406030204" pitchFamily="18" charset="0"/>
+              </a:rPr>
+              <a:t>câu</a:t>
+            </a:r>
+            <a:r>
+              <a:rPr lang="en-GB" sz="6400" dirty="0" smtClean="0">
+                <a:latin typeface="Cambria Math" panose="02040503050406030204" pitchFamily="18" charset="0"/>
+                <a:ea typeface="Cambria Math" panose="02040503050406030204" pitchFamily="18" charset="0"/>
+              </a:rPr>
+              <a:t> </a:t>
+            </a:r>
+            <a:r>
+              <a:rPr lang="en-GB" sz="6400" dirty="0" err="1" smtClean="0">
+                <a:latin typeface="Cambria Math" panose="02040503050406030204" pitchFamily="18" charset="0"/>
+                <a:ea typeface="Cambria Math" panose="02040503050406030204" pitchFamily="18" charset="0"/>
+              </a:rPr>
+              <a:t>trả</a:t>
+            </a:r>
+            <a:r>
+              <a:rPr lang="en-GB" sz="6400" dirty="0" smtClean="0">
+                <a:latin typeface="Cambria Math" panose="02040503050406030204" pitchFamily="18" charset="0"/>
+                <a:ea typeface="Cambria Math" panose="02040503050406030204" pitchFamily="18" charset="0"/>
+              </a:rPr>
+              <a:t> </a:t>
+            </a:r>
+            <a:r>
+              <a:rPr lang="en-GB" sz="6400" dirty="0" err="1" smtClean="0">
+                <a:latin typeface="Cambria Math" panose="02040503050406030204" pitchFamily="18" charset="0"/>
+                <a:ea typeface="Cambria Math" panose="02040503050406030204" pitchFamily="18" charset="0"/>
+              </a:rPr>
+              <a:t>lời</a:t>
+            </a:r>
+            <a:r>
+              <a:rPr lang="en-GB" sz="6400" dirty="0" smtClean="0">
+                <a:latin typeface="Cambria Math" panose="02040503050406030204" pitchFamily="18" charset="0"/>
+                <a:ea typeface="Cambria Math" panose="02040503050406030204" pitchFamily="18" charset="0"/>
+              </a:rPr>
+              <a:t> </a:t>
+            </a:r>
+            <a:r>
+              <a:rPr lang="en-GB" sz="6400" dirty="0" err="1" smtClean="0">
+                <a:latin typeface="Cambria Math" panose="02040503050406030204" pitchFamily="18" charset="0"/>
+                <a:ea typeface="Cambria Math" panose="02040503050406030204" pitchFamily="18" charset="0"/>
+              </a:rPr>
+              <a:t>cho</a:t>
+            </a:r>
+            <a:r>
+              <a:rPr lang="en-GB" sz="6400" dirty="0" smtClean="0">
+                <a:latin typeface="Cambria Math" panose="02040503050406030204" pitchFamily="18" charset="0"/>
+                <a:ea typeface="Cambria Math" panose="02040503050406030204" pitchFamily="18" charset="0"/>
+              </a:rPr>
+              <a:t> </a:t>
+            </a:r>
+            <a:r>
+              <a:rPr lang="en-GB" sz="6400" dirty="0" err="1" smtClean="0">
+                <a:latin typeface="Cambria Math" panose="02040503050406030204" pitchFamily="18" charset="0"/>
+                <a:ea typeface="Cambria Math" panose="02040503050406030204" pitchFamily="18" charset="0"/>
+              </a:rPr>
+              <a:t>câu</a:t>
+            </a:r>
+            <a:r>
+              <a:rPr lang="en-GB" sz="6400" dirty="0" smtClean="0">
+                <a:latin typeface="Cambria Math" panose="02040503050406030204" pitchFamily="18" charset="0"/>
+                <a:ea typeface="Cambria Math" panose="02040503050406030204" pitchFamily="18" charset="0"/>
+              </a:rPr>
+              <a:t> </a:t>
+            </a:r>
+            <a:r>
+              <a:rPr lang="en-GB" sz="6400" dirty="0" err="1" smtClean="0">
+                <a:latin typeface="Cambria Math" panose="02040503050406030204" pitchFamily="18" charset="0"/>
+                <a:ea typeface="Cambria Math" panose="02040503050406030204" pitchFamily="18" charset="0"/>
+              </a:rPr>
+              <a:t>hỏi</a:t>
+            </a:r>
+            <a:r>
+              <a:rPr lang="en-GB" sz="6400" dirty="0" smtClean="0">
+                <a:latin typeface="Cambria Math" panose="02040503050406030204" pitchFamily="18" charset="0"/>
+                <a:ea typeface="Cambria Math" panose="02040503050406030204" pitchFamily="18" charset="0"/>
+              </a:rPr>
+              <a:t> </a:t>
+            </a:r>
+            <a:r>
+              <a:rPr lang="en-GB" sz="6400" dirty="0" err="1" smtClean="0">
+                <a:latin typeface="Cambria Math" panose="02040503050406030204" pitchFamily="18" charset="0"/>
+                <a:ea typeface="Cambria Math" panose="02040503050406030204" pitchFamily="18" charset="0"/>
+              </a:rPr>
+              <a:t>này</a:t>
+            </a:r>
+            <a:r>
+              <a:rPr lang="en-GB" sz="6400" dirty="0" smtClean="0">
+                <a:latin typeface="Cambria Math" panose="02040503050406030204" pitchFamily="18" charset="0"/>
+                <a:ea typeface="Cambria Math" panose="02040503050406030204" pitchFamily="18" charset="0"/>
+              </a:rPr>
+              <a:t> </a:t>
+            </a:r>
+            <a:r>
+              <a:rPr lang="en-GB" sz="6400" dirty="0" err="1" smtClean="0">
+                <a:latin typeface="Cambria Math" panose="02040503050406030204" pitchFamily="18" charset="0"/>
+                <a:ea typeface="Cambria Math" panose="02040503050406030204" pitchFamily="18" charset="0"/>
+              </a:rPr>
+              <a:t>có</a:t>
+            </a:r>
+            <a:r>
+              <a:rPr lang="en-GB" sz="6400" dirty="0" smtClean="0">
+                <a:latin typeface="Cambria Math" panose="02040503050406030204" pitchFamily="18" charset="0"/>
+                <a:ea typeface="Cambria Math" panose="02040503050406030204" pitchFamily="18" charset="0"/>
+              </a:rPr>
+              <a:t> ý </a:t>
+            </a:r>
+            <a:r>
+              <a:rPr lang="en-GB" sz="6400" dirty="0" err="1" smtClean="0">
+                <a:latin typeface="Cambria Math" panose="02040503050406030204" pitchFamily="18" charset="0"/>
+                <a:ea typeface="Cambria Math" panose="02040503050406030204" pitchFamily="18" charset="0"/>
+              </a:rPr>
+              <a:t>nghĩa</a:t>
+            </a:r>
+            <a:r>
+              <a:rPr lang="en-GB" sz="6400" dirty="0" smtClean="0">
+                <a:latin typeface="Cambria Math" panose="02040503050406030204" pitchFamily="18" charset="0"/>
+                <a:ea typeface="Cambria Math" panose="02040503050406030204" pitchFamily="18" charset="0"/>
+              </a:rPr>
+              <a:t>:</a:t>
+            </a:r>
+          </a:p>
+          <a:p>
+            <a:pPr lvl="1"/>
+            <a:r>
+              <a:rPr lang="en-GB" sz="6400" dirty="0" err="1" smtClean="0">
+                <a:latin typeface="Cambria Math" panose="02040503050406030204" pitchFamily="18" charset="0"/>
+                <a:ea typeface="Cambria Math" panose="02040503050406030204" pitchFamily="18" charset="0"/>
+              </a:rPr>
+              <a:t>Từ</a:t>
+            </a:r>
+            <a:r>
+              <a:rPr lang="en-GB" sz="6400" dirty="0" smtClean="0">
+                <a:latin typeface="Cambria Math" panose="02040503050406030204" pitchFamily="18" charset="0"/>
+                <a:ea typeface="Cambria Math" panose="02040503050406030204" pitchFamily="18" charset="0"/>
+              </a:rPr>
+              <a:t> </a:t>
+            </a:r>
+            <a:r>
+              <a:rPr lang="en-GB" sz="6400" dirty="0" err="1" smtClean="0">
+                <a:latin typeface="Cambria Math" panose="02040503050406030204" pitchFamily="18" charset="0"/>
+                <a:ea typeface="Cambria Math" panose="02040503050406030204" pitchFamily="18" charset="0"/>
+              </a:rPr>
+              <a:t>việc</a:t>
+            </a:r>
+            <a:r>
+              <a:rPr lang="en-GB" sz="6400" dirty="0" smtClean="0">
+                <a:latin typeface="Cambria Math" panose="02040503050406030204" pitchFamily="18" charset="0"/>
+                <a:ea typeface="Cambria Math" panose="02040503050406030204" pitchFamily="18" charset="0"/>
+              </a:rPr>
+              <a:t> </a:t>
+            </a:r>
+            <a:r>
+              <a:rPr lang="en-GB" sz="6400" dirty="0" err="1" smtClean="0">
+                <a:latin typeface="Cambria Math" panose="02040503050406030204" pitchFamily="18" charset="0"/>
+                <a:ea typeface="Cambria Math" panose="02040503050406030204" pitchFamily="18" charset="0"/>
+              </a:rPr>
+              <a:t>biết</a:t>
+            </a:r>
+            <a:r>
+              <a:rPr lang="en-GB" sz="6400" dirty="0" smtClean="0">
+                <a:latin typeface="Cambria Math" panose="02040503050406030204" pitchFamily="18" charset="0"/>
+                <a:ea typeface="Cambria Math" panose="02040503050406030204" pitchFamily="18" charset="0"/>
+              </a:rPr>
+              <a:t> </a:t>
+            </a:r>
+            <a:r>
+              <a:rPr lang="en-GB" sz="6400" dirty="0" err="1" smtClean="0">
+                <a:latin typeface="Cambria Math" panose="02040503050406030204" pitchFamily="18" charset="0"/>
+                <a:ea typeface="Cambria Math" panose="02040503050406030204" pitchFamily="18" charset="0"/>
+              </a:rPr>
+              <a:t>được</a:t>
+            </a:r>
+            <a:r>
+              <a:rPr lang="en-GB" sz="6400" dirty="0" smtClean="0">
+                <a:latin typeface="Cambria Math" panose="02040503050406030204" pitchFamily="18" charset="0"/>
+                <a:ea typeface="Cambria Math" panose="02040503050406030204" pitchFamily="18" charset="0"/>
+              </a:rPr>
+              <a:t> </a:t>
+            </a:r>
+            <a:r>
+              <a:rPr lang="en-GB" sz="6400" dirty="0" err="1" smtClean="0">
+                <a:latin typeface="Cambria Math" panose="02040503050406030204" pitchFamily="18" charset="0"/>
+                <a:ea typeface="Cambria Math" panose="02040503050406030204" pitchFamily="18" charset="0"/>
+              </a:rPr>
+              <a:t>mức</a:t>
+            </a:r>
+            <a:r>
+              <a:rPr lang="en-GB" sz="6400" dirty="0" smtClean="0">
+                <a:latin typeface="Cambria Math" panose="02040503050406030204" pitchFamily="18" charset="0"/>
+                <a:ea typeface="Cambria Math" panose="02040503050406030204" pitchFamily="18" charset="0"/>
+              </a:rPr>
+              <a:t> </a:t>
+            </a:r>
+            <a:r>
+              <a:rPr lang="en-GB" sz="6400" dirty="0" err="1" smtClean="0">
+                <a:latin typeface="Cambria Math" panose="02040503050406030204" pitchFamily="18" charset="0"/>
+                <a:ea typeface="Cambria Math" panose="02040503050406030204" pitchFamily="18" charset="0"/>
+              </a:rPr>
+              <a:t>năng</a:t>
+            </a:r>
+            <a:r>
+              <a:rPr lang="en-GB" sz="6400" dirty="0" smtClean="0">
+                <a:latin typeface="Cambria Math" panose="02040503050406030204" pitchFamily="18" charset="0"/>
+                <a:ea typeface="Cambria Math" panose="02040503050406030204" pitchFamily="18" charset="0"/>
+              </a:rPr>
+              <a:t> </a:t>
+            </a:r>
+            <a:r>
+              <a:rPr lang="en-GB" sz="6400" dirty="0" err="1" smtClean="0">
+                <a:latin typeface="Cambria Math" panose="02040503050406030204" pitchFamily="18" charset="0"/>
+                <a:ea typeface="Cambria Math" panose="02040503050406030204" pitchFamily="18" charset="0"/>
+              </a:rPr>
+              <a:t>lượng</a:t>
+            </a:r>
+            <a:r>
+              <a:rPr lang="en-GB" sz="6400" dirty="0" smtClean="0">
+                <a:latin typeface="Cambria Math" panose="02040503050406030204" pitchFamily="18" charset="0"/>
+                <a:ea typeface="Cambria Math" panose="02040503050406030204" pitchFamily="18" charset="0"/>
+              </a:rPr>
+              <a:t> </a:t>
+            </a:r>
+            <a:r>
+              <a:rPr lang="en-GB" sz="6400" dirty="0" err="1" smtClean="0">
+                <a:latin typeface="Cambria Math" panose="02040503050406030204" pitchFamily="18" charset="0"/>
+                <a:ea typeface="Cambria Math" panose="02040503050406030204" pitchFamily="18" charset="0"/>
+              </a:rPr>
+              <a:t>mà</a:t>
+            </a:r>
+            <a:r>
+              <a:rPr lang="en-GB" sz="6400" dirty="0" smtClean="0">
+                <a:latin typeface="Cambria Math" panose="02040503050406030204" pitchFamily="18" charset="0"/>
+                <a:ea typeface="Cambria Math" panose="02040503050406030204" pitchFamily="18" charset="0"/>
+              </a:rPr>
+              <a:t> </a:t>
+            </a:r>
+            <a:r>
+              <a:rPr lang="en-GB" sz="6400" dirty="0" err="1" smtClean="0">
+                <a:latin typeface="Cambria Math" panose="02040503050406030204" pitchFamily="18" charset="0"/>
+                <a:ea typeface="Cambria Math" panose="02040503050406030204" pitchFamily="18" charset="0"/>
+              </a:rPr>
+              <a:t>mỗi</a:t>
+            </a:r>
+            <a:r>
+              <a:rPr lang="en-GB" sz="6400" dirty="0" smtClean="0">
+                <a:latin typeface="Cambria Math" panose="02040503050406030204" pitchFamily="18" charset="0"/>
+                <a:ea typeface="Cambria Math" panose="02040503050406030204" pitchFamily="18" charset="0"/>
+              </a:rPr>
+              <a:t> </a:t>
+            </a:r>
+            <a:r>
+              <a:rPr lang="en-GB" sz="6400" dirty="0" err="1" smtClean="0">
+                <a:latin typeface="Cambria Math" panose="02040503050406030204" pitchFamily="18" charset="0"/>
+                <a:ea typeface="Cambria Math" panose="02040503050406030204" pitchFamily="18" charset="0"/>
+              </a:rPr>
+              <a:t>loại</a:t>
+            </a:r>
+            <a:r>
+              <a:rPr lang="en-GB" sz="6400" dirty="0" smtClean="0">
+                <a:latin typeface="Cambria Math" panose="02040503050406030204" pitchFamily="18" charset="0"/>
+                <a:ea typeface="Cambria Math" panose="02040503050406030204" pitchFamily="18" charset="0"/>
+              </a:rPr>
+              <a:t> </a:t>
+            </a:r>
+            <a:r>
+              <a:rPr lang="en-GB" sz="6400" dirty="0" err="1" smtClean="0">
+                <a:latin typeface="Cambria Math" panose="02040503050406030204" pitchFamily="18" charset="0"/>
+                <a:ea typeface="Cambria Math" panose="02040503050406030204" pitchFamily="18" charset="0"/>
+              </a:rPr>
+              <a:t>thực</a:t>
+            </a:r>
+            <a:r>
+              <a:rPr lang="en-GB" sz="6400" dirty="0" smtClean="0">
+                <a:latin typeface="Cambria Math" panose="02040503050406030204" pitchFamily="18" charset="0"/>
+                <a:ea typeface="Cambria Math" panose="02040503050406030204" pitchFamily="18" charset="0"/>
+              </a:rPr>
+              <a:t> </a:t>
+            </a:r>
+            <a:r>
+              <a:rPr lang="en-GB" sz="6400" dirty="0" err="1" smtClean="0">
+                <a:latin typeface="Cambria Math" panose="02040503050406030204" pitchFamily="18" charset="0"/>
+                <a:ea typeface="Cambria Math" panose="02040503050406030204" pitchFamily="18" charset="0"/>
+              </a:rPr>
+              <a:t>phẩm</a:t>
+            </a:r>
+            <a:r>
+              <a:rPr lang="en-GB" sz="6400" dirty="0" smtClean="0">
+                <a:latin typeface="Cambria Math" panose="02040503050406030204" pitchFamily="18" charset="0"/>
+                <a:ea typeface="Cambria Math" panose="02040503050406030204" pitchFamily="18" charset="0"/>
+              </a:rPr>
+              <a:t> </a:t>
+            </a:r>
+            <a:r>
+              <a:rPr lang="en-GB" sz="6400" dirty="0" err="1" smtClean="0">
+                <a:latin typeface="Cambria Math" panose="02040503050406030204" pitchFamily="18" charset="0"/>
+                <a:ea typeface="Cambria Math" panose="02040503050406030204" pitchFamily="18" charset="0"/>
+              </a:rPr>
+              <a:t>mang</a:t>
+            </a:r>
+            <a:r>
+              <a:rPr lang="en-GB" sz="6400" dirty="0" smtClean="0">
+                <a:latin typeface="Cambria Math" panose="02040503050406030204" pitchFamily="18" charset="0"/>
+                <a:ea typeface="Cambria Math" panose="02040503050406030204" pitchFamily="18" charset="0"/>
+              </a:rPr>
+              <a:t> </a:t>
+            </a:r>
+            <a:r>
+              <a:rPr lang="en-GB" sz="6400" dirty="0" err="1" smtClean="0">
+                <a:latin typeface="Cambria Math" panose="02040503050406030204" pitchFamily="18" charset="0"/>
+                <a:ea typeface="Cambria Math" panose="02040503050406030204" pitchFamily="18" charset="0"/>
+              </a:rPr>
+              <a:t>lại</a:t>
+            </a:r>
+            <a:r>
+              <a:rPr lang="en-GB" sz="6400" dirty="0" smtClean="0">
+                <a:latin typeface="Cambria Math" panose="02040503050406030204" pitchFamily="18" charset="0"/>
+                <a:ea typeface="Cambria Math" panose="02040503050406030204" pitchFamily="18" charset="0"/>
+              </a:rPr>
+              <a:t>, con </a:t>
+            </a:r>
+            <a:r>
+              <a:rPr lang="en-GB" sz="6400" dirty="0" err="1" smtClean="0">
+                <a:latin typeface="Cambria Math" panose="02040503050406030204" pitchFamily="18" charset="0"/>
+                <a:ea typeface="Cambria Math" panose="02040503050406030204" pitchFamily="18" charset="0"/>
+              </a:rPr>
+              <a:t>người</a:t>
+            </a:r>
+            <a:r>
+              <a:rPr lang="en-GB" sz="6400" dirty="0" smtClean="0">
+                <a:latin typeface="Cambria Math" panose="02040503050406030204" pitchFamily="18" charset="0"/>
+                <a:ea typeface="Cambria Math" panose="02040503050406030204" pitchFamily="18" charset="0"/>
+              </a:rPr>
+              <a:t> ta </a:t>
+            </a:r>
+            <a:r>
+              <a:rPr lang="en-GB" sz="6400" dirty="0" err="1" smtClean="0">
+                <a:latin typeface="Cambria Math" panose="02040503050406030204" pitchFamily="18" charset="0"/>
+                <a:ea typeface="Cambria Math" panose="02040503050406030204" pitchFamily="18" charset="0"/>
+              </a:rPr>
+              <a:t>có</a:t>
+            </a:r>
+            <a:r>
+              <a:rPr lang="en-GB" sz="6400" dirty="0" smtClean="0">
+                <a:latin typeface="Cambria Math" panose="02040503050406030204" pitchFamily="18" charset="0"/>
+                <a:ea typeface="Cambria Math" panose="02040503050406030204" pitchFamily="18" charset="0"/>
+              </a:rPr>
+              <a:t> </a:t>
+            </a:r>
+            <a:r>
+              <a:rPr lang="en-GB" sz="6400" dirty="0" err="1" smtClean="0">
+                <a:latin typeface="Cambria Math" panose="02040503050406030204" pitchFamily="18" charset="0"/>
+                <a:ea typeface="Cambria Math" panose="02040503050406030204" pitchFamily="18" charset="0"/>
+              </a:rPr>
+              <a:t>thể</a:t>
+            </a:r>
+            <a:r>
+              <a:rPr lang="en-GB" sz="6400" dirty="0" smtClean="0">
+                <a:latin typeface="Cambria Math" panose="02040503050406030204" pitchFamily="18" charset="0"/>
+                <a:ea typeface="Cambria Math" panose="02040503050406030204" pitchFamily="18" charset="0"/>
+              </a:rPr>
+              <a:t> </a:t>
+            </a:r>
+            <a:r>
+              <a:rPr lang="en-GB" sz="6400" dirty="0" err="1" smtClean="0">
+                <a:latin typeface="Cambria Math" panose="02040503050406030204" pitchFamily="18" charset="0"/>
+                <a:ea typeface="Cambria Math" panose="02040503050406030204" pitchFamily="18" charset="0"/>
+              </a:rPr>
+              <a:t>chủ</a:t>
+            </a:r>
+            <a:r>
+              <a:rPr lang="en-GB" sz="6400" dirty="0" smtClean="0">
+                <a:latin typeface="Cambria Math" panose="02040503050406030204" pitchFamily="18" charset="0"/>
+                <a:ea typeface="Cambria Math" panose="02040503050406030204" pitchFamily="18" charset="0"/>
+              </a:rPr>
+              <a:t> </a:t>
+            </a:r>
+            <a:r>
+              <a:rPr lang="en-GB" sz="6400" dirty="0" err="1" smtClean="0">
+                <a:latin typeface="Cambria Math" panose="02040503050406030204" pitchFamily="18" charset="0"/>
+                <a:ea typeface="Cambria Math" panose="02040503050406030204" pitchFamily="18" charset="0"/>
+              </a:rPr>
+              <a:t>động</a:t>
+            </a:r>
+            <a:r>
+              <a:rPr lang="en-GB" sz="6400" dirty="0" smtClean="0">
+                <a:latin typeface="Cambria Math" panose="02040503050406030204" pitchFamily="18" charset="0"/>
+                <a:ea typeface="Cambria Math" panose="02040503050406030204" pitchFamily="18" charset="0"/>
+              </a:rPr>
+              <a:t> </a:t>
+            </a:r>
+            <a:r>
+              <a:rPr lang="en-GB" sz="6400" dirty="0" err="1" smtClean="0">
+                <a:latin typeface="Cambria Math" panose="02040503050406030204" pitchFamily="18" charset="0"/>
+                <a:ea typeface="Cambria Math" panose="02040503050406030204" pitchFamily="18" charset="0"/>
+              </a:rPr>
+              <a:t>trong</a:t>
+            </a:r>
+            <a:r>
+              <a:rPr lang="en-GB" sz="6400" dirty="0" smtClean="0">
+                <a:latin typeface="Cambria Math" panose="02040503050406030204" pitchFamily="18" charset="0"/>
+                <a:ea typeface="Cambria Math" panose="02040503050406030204" pitchFamily="18" charset="0"/>
+              </a:rPr>
+              <a:t> </a:t>
+            </a:r>
+            <a:r>
+              <a:rPr lang="en-GB" sz="6400" dirty="0" err="1" smtClean="0">
+                <a:latin typeface="Cambria Math" panose="02040503050406030204" pitchFamily="18" charset="0"/>
+                <a:ea typeface="Cambria Math" panose="02040503050406030204" pitchFamily="18" charset="0"/>
+              </a:rPr>
+              <a:t>việc</a:t>
+            </a:r>
+            <a:r>
+              <a:rPr lang="en-GB" sz="6400" dirty="0" smtClean="0">
+                <a:latin typeface="Cambria Math" panose="02040503050406030204" pitchFamily="18" charset="0"/>
+                <a:ea typeface="Cambria Math" panose="02040503050406030204" pitchFamily="18" charset="0"/>
+              </a:rPr>
+              <a:t> </a:t>
+            </a:r>
+            <a:r>
+              <a:rPr lang="en-GB" sz="6400" dirty="0" err="1" smtClean="0">
+                <a:latin typeface="Cambria Math" panose="02040503050406030204" pitchFamily="18" charset="0"/>
+                <a:ea typeface="Cambria Math" panose="02040503050406030204" pitchFamily="18" charset="0"/>
+              </a:rPr>
+              <a:t>điều</a:t>
+            </a:r>
+            <a:r>
+              <a:rPr lang="en-GB" sz="6400" dirty="0" smtClean="0">
+                <a:latin typeface="Cambria Math" panose="02040503050406030204" pitchFamily="18" charset="0"/>
+                <a:ea typeface="Cambria Math" panose="02040503050406030204" pitchFamily="18" charset="0"/>
+              </a:rPr>
+              <a:t> </a:t>
+            </a:r>
+            <a:r>
+              <a:rPr lang="en-GB" sz="6400" dirty="0" err="1" smtClean="0">
+                <a:latin typeface="Cambria Math" panose="02040503050406030204" pitchFamily="18" charset="0"/>
+                <a:ea typeface="Cambria Math" panose="02040503050406030204" pitchFamily="18" charset="0"/>
+              </a:rPr>
+              <a:t>phối</a:t>
+            </a:r>
+            <a:r>
+              <a:rPr lang="en-GB" sz="6400" dirty="0" smtClean="0">
+                <a:latin typeface="Cambria Math" panose="02040503050406030204" pitchFamily="18" charset="0"/>
+                <a:ea typeface="Cambria Math" panose="02040503050406030204" pitchFamily="18" charset="0"/>
+              </a:rPr>
+              <a:t> </a:t>
+            </a:r>
+            <a:r>
+              <a:rPr lang="en-GB" sz="6400" dirty="0" err="1" smtClean="0">
+                <a:latin typeface="Cambria Math" panose="02040503050406030204" pitchFamily="18" charset="0"/>
+                <a:ea typeface="Cambria Math" panose="02040503050406030204" pitchFamily="18" charset="0"/>
+              </a:rPr>
+              <a:t>khẩu</a:t>
+            </a:r>
+            <a:r>
+              <a:rPr lang="en-GB" sz="6400" dirty="0" smtClean="0">
+                <a:latin typeface="Cambria Math" panose="02040503050406030204" pitchFamily="18" charset="0"/>
+                <a:ea typeface="Cambria Math" panose="02040503050406030204" pitchFamily="18" charset="0"/>
+              </a:rPr>
+              <a:t> </a:t>
+            </a:r>
+            <a:r>
+              <a:rPr lang="en-GB" sz="6400" dirty="0" err="1" smtClean="0">
+                <a:latin typeface="Cambria Math" panose="02040503050406030204" pitchFamily="18" charset="0"/>
+                <a:ea typeface="Cambria Math" panose="02040503050406030204" pitchFamily="18" charset="0"/>
+              </a:rPr>
+              <a:t>phần</a:t>
+            </a:r>
+            <a:r>
+              <a:rPr lang="en-GB" sz="6400" dirty="0" smtClean="0">
+                <a:latin typeface="Cambria Math" panose="02040503050406030204" pitchFamily="18" charset="0"/>
+                <a:ea typeface="Cambria Math" panose="02040503050406030204" pitchFamily="18" charset="0"/>
+              </a:rPr>
+              <a:t> </a:t>
+            </a:r>
+            <a:r>
+              <a:rPr lang="en-GB" sz="6400" dirty="0" err="1" smtClean="0">
+                <a:latin typeface="Cambria Math" panose="02040503050406030204" pitchFamily="18" charset="0"/>
+                <a:ea typeface="Cambria Math" panose="02040503050406030204" pitchFamily="18" charset="0"/>
+              </a:rPr>
+              <a:t>ăn</a:t>
+            </a:r>
+            <a:r>
+              <a:rPr lang="en-GB" sz="6400" dirty="0" smtClean="0">
+                <a:latin typeface="Cambria Math" panose="02040503050406030204" pitchFamily="18" charset="0"/>
+                <a:ea typeface="Cambria Math" panose="02040503050406030204" pitchFamily="18" charset="0"/>
+              </a:rPr>
+              <a:t> </a:t>
+            </a:r>
+            <a:r>
+              <a:rPr lang="en-GB" sz="6400" dirty="0" err="1" smtClean="0">
+                <a:latin typeface="Cambria Math" panose="02040503050406030204" pitchFamily="18" charset="0"/>
+                <a:ea typeface="Cambria Math" panose="02040503050406030204" pitchFamily="18" charset="0"/>
+              </a:rPr>
+              <a:t>hằng</a:t>
+            </a:r>
+            <a:r>
+              <a:rPr lang="en-GB" sz="6400" dirty="0" smtClean="0">
+                <a:latin typeface="Cambria Math" panose="02040503050406030204" pitchFamily="18" charset="0"/>
+                <a:ea typeface="Cambria Math" panose="02040503050406030204" pitchFamily="18" charset="0"/>
+              </a:rPr>
+              <a:t> </a:t>
+            </a:r>
+            <a:r>
+              <a:rPr lang="en-GB" sz="6400" dirty="0" err="1" smtClean="0">
+                <a:latin typeface="Cambria Math" panose="02040503050406030204" pitchFamily="18" charset="0"/>
+                <a:ea typeface="Cambria Math" panose="02040503050406030204" pitchFamily="18" charset="0"/>
+              </a:rPr>
+              <a:t>ngày</a:t>
+            </a:r>
+            <a:r>
+              <a:rPr lang="en-GB" sz="6400" dirty="0" smtClean="0">
+                <a:latin typeface="Cambria Math" panose="02040503050406030204" pitchFamily="18" charset="0"/>
+                <a:ea typeface="Cambria Math" panose="02040503050406030204" pitchFamily="18" charset="0"/>
+              </a:rPr>
+              <a:t> </a:t>
+            </a:r>
+            <a:r>
+              <a:rPr lang="en-GB" sz="6400" dirty="0" err="1" smtClean="0">
+                <a:latin typeface="Cambria Math" panose="02040503050406030204" pitchFamily="18" charset="0"/>
+                <a:ea typeface="Cambria Math" panose="02040503050406030204" pitchFamily="18" charset="0"/>
+              </a:rPr>
+              <a:t>sao</a:t>
+            </a:r>
+            <a:r>
+              <a:rPr lang="en-GB" sz="6400" dirty="0" smtClean="0">
+                <a:latin typeface="Cambria Math" panose="02040503050406030204" pitchFamily="18" charset="0"/>
+                <a:ea typeface="Cambria Math" panose="02040503050406030204" pitchFamily="18" charset="0"/>
+              </a:rPr>
+              <a:t> </a:t>
+            </a:r>
+            <a:r>
+              <a:rPr lang="en-GB" sz="6400" dirty="0" err="1" smtClean="0">
+                <a:latin typeface="Cambria Math" panose="02040503050406030204" pitchFamily="18" charset="0"/>
+                <a:ea typeface="Cambria Math" panose="02040503050406030204" pitchFamily="18" charset="0"/>
+              </a:rPr>
+              <a:t>cho</a:t>
+            </a:r>
+            <a:r>
+              <a:rPr lang="en-GB" sz="6400" dirty="0" smtClean="0">
+                <a:latin typeface="Cambria Math" panose="02040503050406030204" pitchFamily="18" charset="0"/>
+                <a:ea typeface="Cambria Math" panose="02040503050406030204" pitchFamily="18" charset="0"/>
+              </a:rPr>
+              <a:t> </a:t>
+            </a:r>
+            <a:r>
+              <a:rPr lang="en-GB" sz="6400" dirty="0" err="1" smtClean="0">
+                <a:latin typeface="Cambria Math" panose="02040503050406030204" pitchFamily="18" charset="0"/>
+                <a:ea typeface="Cambria Math" panose="02040503050406030204" pitchFamily="18" charset="0"/>
+              </a:rPr>
+              <a:t>cân</a:t>
+            </a:r>
+            <a:r>
+              <a:rPr lang="en-GB" sz="6400" dirty="0" smtClean="0">
+                <a:latin typeface="Cambria Math" panose="02040503050406030204" pitchFamily="18" charset="0"/>
+                <a:ea typeface="Cambria Math" panose="02040503050406030204" pitchFamily="18" charset="0"/>
+              </a:rPr>
+              <a:t> </a:t>
+            </a:r>
+            <a:r>
+              <a:rPr lang="en-GB" sz="6400" dirty="0" err="1" smtClean="0">
+                <a:latin typeface="Cambria Math" panose="02040503050406030204" pitchFamily="18" charset="0"/>
+                <a:ea typeface="Cambria Math" panose="02040503050406030204" pitchFamily="18" charset="0"/>
+              </a:rPr>
+              <a:t>bằng</a:t>
+            </a:r>
+            <a:r>
+              <a:rPr lang="en-GB" sz="6400" dirty="0" smtClean="0">
+                <a:latin typeface="Cambria Math" panose="02040503050406030204" pitchFamily="18" charset="0"/>
+                <a:ea typeface="Cambria Math" panose="02040503050406030204" pitchFamily="18" charset="0"/>
+              </a:rPr>
+              <a:t> </a:t>
+            </a:r>
+            <a:r>
+              <a:rPr lang="en-GB" sz="6400" dirty="0" err="1" smtClean="0">
+                <a:latin typeface="Cambria Math" panose="02040503050406030204" pitchFamily="18" charset="0"/>
+                <a:ea typeface="Cambria Math" panose="02040503050406030204" pitchFamily="18" charset="0"/>
+              </a:rPr>
+              <a:t>giữa</a:t>
+            </a:r>
+            <a:r>
+              <a:rPr lang="en-GB" sz="6400" dirty="0" smtClean="0">
+                <a:latin typeface="Cambria Math" panose="02040503050406030204" pitchFamily="18" charset="0"/>
+                <a:ea typeface="Cambria Math" panose="02040503050406030204" pitchFamily="18" charset="0"/>
+              </a:rPr>
+              <a:t> </a:t>
+            </a:r>
+            <a:r>
+              <a:rPr lang="en-GB" sz="6400" dirty="0" err="1" smtClean="0">
+                <a:latin typeface="Cambria Math" panose="02040503050406030204" pitchFamily="18" charset="0"/>
+                <a:ea typeface="Cambria Math" panose="02040503050406030204" pitchFamily="18" charset="0"/>
+              </a:rPr>
+              <a:t>mức</a:t>
+            </a:r>
+            <a:r>
+              <a:rPr lang="en-GB" sz="6400" dirty="0" smtClean="0">
+                <a:latin typeface="Cambria Math" panose="02040503050406030204" pitchFamily="18" charset="0"/>
+                <a:ea typeface="Cambria Math" panose="02040503050406030204" pitchFamily="18" charset="0"/>
+              </a:rPr>
+              <a:t> </a:t>
+            </a:r>
+            <a:r>
+              <a:rPr lang="en-GB" sz="6400" dirty="0" err="1" smtClean="0">
+                <a:latin typeface="Cambria Math" panose="02040503050406030204" pitchFamily="18" charset="0"/>
+                <a:ea typeface="Cambria Math" panose="02040503050406030204" pitchFamily="18" charset="0"/>
+              </a:rPr>
+              <a:t>năng</a:t>
+            </a:r>
+            <a:r>
+              <a:rPr lang="en-GB" sz="6400" dirty="0" smtClean="0">
+                <a:latin typeface="Cambria Math" panose="02040503050406030204" pitchFamily="18" charset="0"/>
+                <a:ea typeface="Cambria Math" panose="02040503050406030204" pitchFamily="18" charset="0"/>
+              </a:rPr>
+              <a:t> </a:t>
+            </a:r>
+            <a:r>
+              <a:rPr lang="en-GB" sz="6400" dirty="0" err="1" smtClean="0">
+                <a:latin typeface="Cambria Math" panose="02040503050406030204" pitchFamily="18" charset="0"/>
+                <a:ea typeface="Cambria Math" panose="02040503050406030204" pitchFamily="18" charset="0"/>
+              </a:rPr>
+              <a:t>lượng</a:t>
+            </a:r>
+            <a:r>
+              <a:rPr lang="en-GB" sz="6400" dirty="0" smtClean="0">
+                <a:latin typeface="Cambria Math" panose="02040503050406030204" pitchFamily="18" charset="0"/>
+                <a:ea typeface="Cambria Math" panose="02040503050406030204" pitchFamily="18" charset="0"/>
+              </a:rPr>
+              <a:t> </a:t>
+            </a:r>
+            <a:r>
+              <a:rPr lang="en-GB" sz="6400" dirty="0" err="1" smtClean="0">
+                <a:latin typeface="Cambria Math" panose="02040503050406030204" pitchFamily="18" charset="0"/>
+                <a:ea typeface="Cambria Math" panose="02040503050406030204" pitchFamily="18" charset="0"/>
+              </a:rPr>
+              <a:t>cần</a:t>
+            </a:r>
+            <a:r>
+              <a:rPr lang="en-GB" sz="6400" dirty="0" smtClean="0">
+                <a:latin typeface="Cambria Math" panose="02040503050406030204" pitchFamily="18" charset="0"/>
+                <a:ea typeface="Cambria Math" panose="02040503050406030204" pitchFamily="18" charset="0"/>
+              </a:rPr>
+              <a:t> </a:t>
+            </a:r>
+            <a:r>
+              <a:rPr lang="en-GB" sz="6400" dirty="0" err="1" smtClean="0">
+                <a:latin typeface="Cambria Math" panose="02040503050406030204" pitchFamily="18" charset="0"/>
+                <a:ea typeface="Cambria Math" panose="02040503050406030204" pitchFamily="18" charset="0"/>
+              </a:rPr>
+              <a:t>nạp</a:t>
+            </a:r>
+            <a:r>
+              <a:rPr lang="en-GB" sz="6400" dirty="0" smtClean="0">
+                <a:latin typeface="Cambria Math" panose="02040503050406030204" pitchFamily="18" charset="0"/>
+                <a:ea typeface="Cambria Math" panose="02040503050406030204" pitchFamily="18" charset="0"/>
+              </a:rPr>
+              <a:t> </a:t>
+            </a:r>
+            <a:r>
+              <a:rPr lang="en-GB" sz="6400" dirty="0" err="1" smtClean="0">
+                <a:latin typeface="Cambria Math" panose="02040503050406030204" pitchFamily="18" charset="0"/>
+                <a:ea typeface="Cambria Math" panose="02040503050406030204" pitchFamily="18" charset="0"/>
+              </a:rPr>
+              <a:t>vào</a:t>
+            </a:r>
+            <a:r>
+              <a:rPr lang="en-GB" sz="6400" dirty="0" smtClean="0">
+                <a:latin typeface="Cambria Math" panose="02040503050406030204" pitchFamily="18" charset="0"/>
+                <a:ea typeface="Cambria Math" panose="02040503050406030204" pitchFamily="18" charset="0"/>
+              </a:rPr>
+              <a:t> </a:t>
+            </a:r>
+            <a:r>
+              <a:rPr lang="en-GB" sz="6400" dirty="0" err="1" smtClean="0">
+                <a:latin typeface="Cambria Math" panose="02040503050406030204" pitchFamily="18" charset="0"/>
+                <a:ea typeface="Cambria Math" panose="02040503050406030204" pitchFamily="18" charset="0"/>
+              </a:rPr>
+              <a:t>và</a:t>
+            </a:r>
+            <a:r>
+              <a:rPr lang="en-GB" sz="6400" dirty="0" smtClean="0">
+                <a:latin typeface="Cambria Math" panose="02040503050406030204" pitchFamily="18" charset="0"/>
+                <a:ea typeface="Cambria Math" panose="02040503050406030204" pitchFamily="18" charset="0"/>
+              </a:rPr>
+              <a:t> </a:t>
+            </a:r>
+            <a:r>
+              <a:rPr lang="en-GB" sz="6400" dirty="0" err="1" smtClean="0">
+                <a:latin typeface="Cambria Math" panose="02040503050406030204" pitchFamily="18" charset="0"/>
+                <a:ea typeface="Cambria Math" panose="02040503050406030204" pitchFamily="18" charset="0"/>
+              </a:rPr>
+              <a:t>sức</a:t>
+            </a:r>
+            <a:r>
+              <a:rPr lang="en-GB" sz="6400" dirty="0" smtClean="0">
+                <a:latin typeface="Cambria Math" panose="02040503050406030204" pitchFamily="18" charset="0"/>
+                <a:ea typeface="Cambria Math" panose="02040503050406030204" pitchFamily="18" charset="0"/>
+              </a:rPr>
+              <a:t> </a:t>
+            </a:r>
+            <a:r>
+              <a:rPr lang="en-GB" sz="6400" dirty="0" err="1" smtClean="0">
+                <a:latin typeface="Cambria Math" panose="02040503050406030204" pitchFamily="18" charset="0"/>
+                <a:ea typeface="Cambria Math" panose="02040503050406030204" pitchFamily="18" charset="0"/>
+              </a:rPr>
+              <a:t>khỏe</a:t>
+            </a:r>
+            <a:r>
+              <a:rPr lang="en-GB" sz="6400" dirty="0" smtClean="0">
+                <a:latin typeface="Cambria Math" panose="02040503050406030204" pitchFamily="18" charset="0"/>
+                <a:ea typeface="Cambria Math" panose="02040503050406030204" pitchFamily="18" charset="0"/>
+              </a:rPr>
+              <a:t> </a:t>
+            </a:r>
+            <a:r>
+              <a:rPr lang="en-GB" sz="6400" dirty="0" err="1" smtClean="0">
+                <a:latin typeface="Cambria Math" panose="02040503050406030204" pitchFamily="18" charset="0"/>
+                <a:ea typeface="Cambria Math" panose="02040503050406030204" pitchFamily="18" charset="0"/>
+              </a:rPr>
+              <a:t>của</a:t>
+            </a:r>
+            <a:r>
+              <a:rPr lang="en-GB" sz="6400" dirty="0" smtClean="0">
+                <a:latin typeface="Cambria Math" panose="02040503050406030204" pitchFamily="18" charset="0"/>
+                <a:ea typeface="Cambria Math" panose="02040503050406030204" pitchFamily="18" charset="0"/>
+              </a:rPr>
+              <a:t> </a:t>
+            </a:r>
+            <a:r>
+              <a:rPr lang="en-GB" sz="6400" dirty="0" err="1" smtClean="0">
+                <a:latin typeface="Cambria Math" panose="02040503050406030204" pitchFamily="18" charset="0"/>
+                <a:ea typeface="Cambria Math" panose="02040503050406030204" pitchFamily="18" charset="0"/>
+              </a:rPr>
+              <a:t>họ</a:t>
+            </a:r>
+            <a:r>
+              <a:rPr lang="en-GB" sz="6400" dirty="0" smtClean="0">
+                <a:latin typeface="Cambria Math" panose="02040503050406030204" pitchFamily="18" charset="0"/>
+                <a:ea typeface="Cambria Math" panose="02040503050406030204" pitchFamily="18" charset="0"/>
+              </a:rPr>
+              <a:t>, </a:t>
+            </a:r>
+            <a:r>
+              <a:rPr lang="en-GB" sz="6400" dirty="0" err="1" smtClean="0">
+                <a:latin typeface="Cambria Math" panose="02040503050406030204" pitchFamily="18" charset="0"/>
+                <a:ea typeface="Cambria Math" panose="02040503050406030204" pitchFamily="18" charset="0"/>
+              </a:rPr>
+              <a:t>đặc</a:t>
+            </a:r>
+            <a:r>
+              <a:rPr lang="en-GB" sz="6400" dirty="0" smtClean="0">
+                <a:latin typeface="Cambria Math" panose="02040503050406030204" pitchFamily="18" charset="0"/>
+                <a:ea typeface="Cambria Math" panose="02040503050406030204" pitchFamily="18" charset="0"/>
+              </a:rPr>
+              <a:t> </a:t>
+            </a:r>
+            <a:r>
+              <a:rPr lang="en-GB" sz="6400" dirty="0" err="1" smtClean="0">
+                <a:latin typeface="Cambria Math" panose="02040503050406030204" pitchFamily="18" charset="0"/>
+                <a:ea typeface="Cambria Math" panose="02040503050406030204" pitchFamily="18" charset="0"/>
+              </a:rPr>
+              <a:t>biệt</a:t>
+            </a:r>
+            <a:r>
+              <a:rPr lang="en-GB" sz="6400" dirty="0" smtClean="0">
+                <a:latin typeface="Cambria Math" panose="02040503050406030204" pitchFamily="18" charset="0"/>
+                <a:ea typeface="Cambria Math" panose="02040503050406030204" pitchFamily="18" charset="0"/>
+              </a:rPr>
+              <a:t> </a:t>
+            </a:r>
+            <a:r>
+              <a:rPr lang="en-GB" sz="6400" dirty="0" err="1" smtClean="0">
+                <a:latin typeface="Cambria Math" panose="02040503050406030204" pitchFamily="18" charset="0"/>
+                <a:ea typeface="Cambria Math" panose="02040503050406030204" pitchFamily="18" charset="0"/>
+              </a:rPr>
+              <a:t>trong</a:t>
+            </a:r>
+            <a:r>
+              <a:rPr lang="en-GB" sz="6400" dirty="0" smtClean="0">
+                <a:latin typeface="Cambria Math" panose="02040503050406030204" pitchFamily="18" charset="0"/>
+                <a:ea typeface="Cambria Math" panose="02040503050406030204" pitchFamily="18" charset="0"/>
+              </a:rPr>
+              <a:t> </a:t>
+            </a:r>
+            <a:r>
+              <a:rPr lang="en-GB" sz="6400" dirty="0" err="1" smtClean="0">
+                <a:latin typeface="Cambria Math" panose="02040503050406030204" pitchFamily="18" charset="0"/>
+                <a:ea typeface="Cambria Math" panose="02040503050406030204" pitchFamily="18" charset="0"/>
+              </a:rPr>
+              <a:t>bối</a:t>
+            </a:r>
+            <a:r>
+              <a:rPr lang="en-GB" sz="6400" dirty="0" smtClean="0">
+                <a:latin typeface="Cambria Math" panose="02040503050406030204" pitchFamily="18" charset="0"/>
+                <a:ea typeface="Cambria Math" panose="02040503050406030204" pitchFamily="18" charset="0"/>
+              </a:rPr>
+              <a:t> </a:t>
+            </a:r>
+            <a:r>
+              <a:rPr lang="en-GB" sz="6400" dirty="0" err="1" smtClean="0">
+                <a:latin typeface="Cambria Math" panose="02040503050406030204" pitchFamily="18" charset="0"/>
+                <a:ea typeface="Cambria Math" panose="02040503050406030204" pitchFamily="18" charset="0"/>
+              </a:rPr>
+              <a:t>cảnh</a:t>
+            </a:r>
+            <a:r>
+              <a:rPr lang="en-GB" sz="6400" dirty="0" smtClean="0">
+                <a:latin typeface="Cambria Math" panose="02040503050406030204" pitchFamily="18" charset="0"/>
+                <a:ea typeface="Cambria Math" panose="02040503050406030204" pitchFamily="18" charset="0"/>
+              </a:rPr>
+              <a:t> con </a:t>
+            </a:r>
+            <a:r>
+              <a:rPr lang="en-GB" sz="6400" dirty="0" err="1" smtClean="0">
+                <a:latin typeface="Cambria Math" panose="02040503050406030204" pitchFamily="18" charset="0"/>
+                <a:ea typeface="Cambria Math" panose="02040503050406030204" pitchFamily="18" charset="0"/>
+              </a:rPr>
+              <a:t>người</a:t>
+            </a:r>
+            <a:r>
+              <a:rPr lang="en-GB" sz="6400" dirty="0" smtClean="0">
+                <a:latin typeface="Cambria Math" panose="02040503050406030204" pitchFamily="18" charset="0"/>
+                <a:ea typeface="Cambria Math" panose="02040503050406030204" pitchFamily="18" charset="0"/>
+              </a:rPr>
+              <a:t> </a:t>
+            </a:r>
+            <a:r>
+              <a:rPr lang="en-GB" sz="6400" dirty="0" err="1" smtClean="0">
+                <a:latin typeface="Cambria Math" panose="02040503050406030204" pitchFamily="18" charset="0"/>
+                <a:ea typeface="Cambria Math" panose="02040503050406030204" pitchFamily="18" charset="0"/>
+              </a:rPr>
+              <a:t>ngày</a:t>
+            </a:r>
+            <a:r>
+              <a:rPr lang="en-GB" sz="6400" dirty="0" smtClean="0">
+                <a:latin typeface="Cambria Math" panose="02040503050406030204" pitchFamily="18" charset="0"/>
+                <a:ea typeface="Cambria Math" panose="02040503050406030204" pitchFamily="18" charset="0"/>
+              </a:rPr>
+              <a:t> </a:t>
+            </a:r>
+            <a:r>
+              <a:rPr lang="en-GB" sz="6400" dirty="0" err="1" smtClean="0">
+                <a:latin typeface="Cambria Math" panose="02040503050406030204" pitchFamily="18" charset="0"/>
+                <a:ea typeface="Cambria Math" panose="02040503050406030204" pitchFamily="18" charset="0"/>
+              </a:rPr>
+              <a:t>càng</a:t>
+            </a:r>
+            <a:r>
+              <a:rPr lang="en-GB" sz="6400" dirty="0" smtClean="0">
+                <a:latin typeface="Cambria Math" panose="02040503050406030204" pitchFamily="18" charset="0"/>
+                <a:ea typeface="Cambria Math" panose="02040503050406030204" pitchFamily="18" charset="0"/>
+              </a:rPr>
+              <a:t> </a:t>
+            </a:r>
+            <a:r>
+              <a:rPr lang="en-GB" sz="6400" dirty="0" err="1" smtClean="0">
+                <a:latin typeface="Cambria Math" panose="02040503050406030204" pitchFamily="18" charset="0"/>
+                <a:ea typeface="Cambria Math" panose="02040503050406030204" pitchFamily="18" charset="0"/>
+              </a:rPr>
+              <a:t>chú</a:t>
+            </a:r>
+            <a:r>
+              <a:rPr lang="en-GB" sz="6400" dirty="0" smtClean="0">
+                <a:latin typeface="Cambria Math" panose="02040503050406030204" pitchFamily="18" charset="0"/>
+                <a:ea typeface="Cambria Math" panose="02040503050406030204" pitchFamily="18" charset="0"/>
+              </a:rPr>
+              <a:t> </a:t>
+            </a:r>
+            <a:r>
+              <a:rPr lang="en-GB" sz="6400" dirty="0" err="1" smtClean="0">
+                <a:latin typeface="Cambria Math" panose="02040503050406030204" pitchFamily="18" charset="0"/>
+                <a:ea typeface="Cambria Math" panose="02040503050406030204" pitchFamily="18" charset="0"/>
+              </a:rPr>
+              <a:t>trọng</a:t>
+            </a:r>
+            <a:r>
+              <a:rPr lang="en-GB" sz="6400" dirty="0" smtClean="0">
+                <a:latin typeface="Cambria Math" panose="02040503050406030204" pitchFamily="18" charset="0"/>
+                <a:ea typeface="Cambria Math" panose="02040503050406030204" pitchFamily="18" charset="0"/>
+              </a:rPr>
+              <a:t> </a:t>
+            </a:r>
+            <a:r>
+              <a:rPr lang="en-GB" sz="6400" dirty="0" err="1" smtClean="0">
+                <a:latin typeface="Cambria Math" panose="02040503050406030204" pitchFamily="18" charset="0"/>
+                <a:ea typeface="Cambria Math" panose="02040503050406030204" pitchFamily="18" charset="0"/>
+              </a:rPr>
+              <a:t>hơn</a:t>
+            </a:r>
+            <a:r>
+              <a:rPr lang="en-GB" sz="6400" dirty="0" smtClean="0">
+                <a:latin typeface="Cambria Math" panose="02040503050406030204" pitchFamily="18" charset="0"/>
+                <a:ea typeface="Cambria Math" panose="02040503050406030204" pitchFamily="18" charset="0"/>
+              </a:rPr>
+              <a:t> </a:t>
+            </a:r>
+            <a:r>
+              <a:rPr lang="en-GB" sz="6400" dirty="0" err="1" smtClean="0">
+                <a:latin typeface="Cambria Math" panose="02040503050406030204" pitchFamily="18" charset="0"/>
+                <a:ea typeface="Cambria Math" panose="02040503050406030204" pitchFamily="18" charset="0"/>
+              </a:rPr>
+              <a:t>vào</a:t>
+            </a:r>
+            <a:r>
+              <a:rPr lang="en-GB" sz="6400" dirty="0" smtClean="0">
+                <a:latin typeface="Cambria Math" panose="02040503050406030204" pitchFamily="18" charset="0"/>
+                <a:ea typeface="Cambria Math" panose="02040503050406030204" pitchFamily="18" charset="0"/>
+              </a:rPr>
+              <a:t> </a:t>
+            </a:r>
+            <a:r>
+              <a:rPr lang="en-GB" sz="6400" dirty="0" err="1" smtClean="0">
+                <a:latin typeface="Cambria Math" panose="02040503050406030204" pitchFamily="18" charset="0"/>
+                <a:ea typeface="Cambria Math" panose="02040503050406030204" pitchFamily="18" charset="0"/>
+              </a:rPr>
+              <a:t>sức</a:t>
+            </a:r>
+            <a:r>
+              <a:rPr lang="en-GB" sz="6400" dirty="0" smtClean="0">
+                <a:latin typeface="Cambria Math" panose="02040503050406030204" pitchFamily="18" charset="0"/>
+                <a:ea typeface="Cambria Math" panose="02040503050406030204" pitchFamily="18" charset="0"/>
+              </a:rPr>
+              <a:t> </a:t>
+            </a:r>
+            <a:r>
+              <a:rPr lang="en-GB" sz="6400" dirty="0" err="1" smtClean="0">
+                <a:latin typeface="Cambria Math" panose="02040503050406030204" pitchFamily="18" charset="0"/>
+                <a:ea typeface="Cambria Math" panose="02040503050406030204" pitchFamily="18" charset="0"/>
+              </a:rPr>
+              <a:t>khỏe</a:t>
+            </a:r>
+            <a:r>
+              <a:rPr lang="en-GB" sz="6400" dirty="0" smtClean="0">
+                <a:latin typeface="Cambria Math" panose="02040503050406030204" pitchFamily="18" charset="0"/>
+                <a:ea typeface="Cambria Math" panose="02040503050406030204" pitchFamily="18" charset="0"/>
+              </a:rPr>
+              <a:t> </a:t>
+            </a:r>
+            <a:r>
+              <a:rPr lang="en-GB" sz="6400" dirty="0" err="1" smtClean="0">
+                <a:latin typeface="Cambria Math" panose="02040503050406030204" pitchFamily="18" charset="0"/>
+                <a:ea typeface="Cambria Math" panose="02040503050406030204" pitchFamily="18" charset="0"/>
+              </a:rPr>
+              <a:t>của</a:t>
+            </a:r>
+            <a:r>
+              <a:rPr lang="en-GB" sz="6400" dirty="0" smtClean="0">
+                <a:latin typeface="Cambria Math" panose="02040503050406030204" pitchFamily="18" charset="0"/>
+                <a:ea typeface="Cambria Math" panose="02040503050406030204" pitchFamily="18" charset="0"/>
+              </a:rPr>
+              <a:t> </a:t>
+            </a:r>
+            <a:r>
+              <a:rPr lang="en-GB" sz="6400" dirty="0" err="1" smtClean="0">
+                <a:latin typeface="Cambria Math" panose="02040503050406030204" pitchFamily="18" charset="0"/>
+                <a:ea typeface="Cambria Math" panose="02040503050406030204" pitchFamily="18" charset="0"/>
+              </a:rPr>
+              <a:t>mình</a:t>
+            </a:r>
+            <a:endParaRPr lang="en-GB" sz="6400" dirty="0">
+              <a:latin typeface="Cambria Math" panose="02040503050406030204" pitchFamily="18" charset="0"/>
+              <a:ea typeface="Cambria Math" panose="02040503050406030204" pitchFamily="18" charset="0"/>
+            </a:endParaRPr>
+          </a:p>
+          <a:p>
+            <a:pPr lvl="1"/>
+            <a:r>
+              <a:rPr lang="en-GB" sz="6400" dirty="0" err="1" smtClean="0">
                 <a:latin typeface="Cambria Math" panose="02040503050406030204" pitchFamily="18" charset="0"/>
                 <a:ea typeface="Cambria Math" panose="02040503050406030204" pitchFamily="18" charset="0"/>
               </a:rPr>
               <a:t>Ngoài</a:t>
             </a:r>
             <a:r>
-              <a:rPr lang="en-GB" sz="2200" dirty="0" smtClean="0">
-                <a:latin typeface="Cambria Math" panose="02040503050406030204" pitchFamily="18" charset="0"/>
-                <a:ea typeface="Cambria Math" panose="02040503050406030204" pitchFamily="18" charset="0"/>
-              </a:rPr>
-              <a:t> </a:t>
-            </a:r>
-            <a:r>
-              <a:rPr lang="en-GB" sz="2200" dirty="0" err="1" smtClean="0">
+              <a:rPr lang="en-GB" sz="6400" dirty="0" smtClean="0">
+                <a:latin typeface="Cambria Math" panose="02040503050406030204" pitchFamily="18" charset="0"/>
+                <a:ea typeface="Cambria Math" panose="02040503050406030204" pitchFamily="18" charset="0"/>
+              </a:rPr>
+              <a:t> </a:t>
+            </a:r>
+            <a:r>
+              <a:rPr lang="en-GB" sz="6400" dirty="0" err="1" smtClean="0">
                 <a:latin typeface="Cambria Math" panose="02040503050406030204" pitchFamily="18" charset="0"/>
                 <a:ea typeface="Cambria Math" panose="02040503050406030204" pitchFamily="18" charset="0"/>
               </a:rPr>
               <a:t>ra</a:t>
             </a:r>
             <a:r>
-              <a:rPr lang="en-GB" sz="2200" dirty="0" smtClean="0">
-                <a:latin typeface="Cambria Math" panose="02040503050406030204" pitchFamily="18" charset="0"/>
-                <a:ea typeface="Cambria Math" panose="02040503050406030204" pitchFamily="18" charset="0"/>
-              </a:rPr>
-              <a:t> </a:t>
-            </a:r>
-            <a:r>
-              <a:rPr lang="en-GB" sz="2200" dirty="0" err="1" smtClean="0">
+              <a:rPr lang="en-GB" sz="6400" dirty="0" smtClean="0">
+                <a:latin typeface="Cambria Math" panose="02040503050406030204" pitchFamily="18" charset="0"/>
+                <a:ea typeface="Cambria Math" panose="02040503050406030204" pitchFamily="18" charset="0"/>
+              </a:rPr>
+              <a:t> </a:t>
+            </a:r>
+            <a:r>
+              <a:rPr lang="en-GB" sz="6400" dirty="0" err="1" smtClean="0">
                 <a:latin typeface="Cambria Math" panose="02040503050406030204" pitchFamily="18" charset="0"/>
                 <a:ea typeface="Cambria Math" panose="02040503050406030204" pitchFamily="18" charset="0"/>
               </a:rPr>
               <a:t>nó</a:t>
             </a:r>
             <a:r>
-              <a:rPr lang="en-GB" sz="2200" dirty="0" smtClean="0">
-                <a:latin typeface="Cambria Math" panose="02040503050406030204" pitchFamily="18" charset="0"/>
-                <a:ea typeface="Cambria Math" panose="02040503050406030204" pitchFamily="18" charset="0"/>
-              </a:rPr>
-              <a:t> </a:t>
-            </a:r>
-            <a:r>
-              <a:rPr lang="en-GB" sz="2200" dirty="0" err="1" smtClean="0">
+              <a:rPr lang="en-GB" sz="6400" dirty="0" smtClean="0">
+                <a:latin typeface="Cambria Math" panose="02040503050406030204" pitchFamily="18" charset="0"/>
+                <a:ea typeface="Cambria Math" panose="02040503050406030204" pitchFamily="18" charset="0"/>
+              </a:rPr>
+              <a:t> </a:t>
+            </a:r>
+            <a:r>
+              <a:rPr lang="en-GB" sz="6400" dirty="0" err="1" smtClean="0">
                 <a:latin typeface="Cambria Math" panose="02040503050406030204" pitchFamily="18" charset="0"/>
                 <a:ea typeface="Cambria Math" panose="02040503050406030204" pitchFamily="18" charset="0"/>
               </a:rPr>
               <a:t>còn</a:t>
             </a:r>
             <a:r>
-              <a:rPr lang="en-GB" sz="2200" dirty="0" smtClean="0">
-                <a:latin typeface="Cambria Math" panose="02040503050406030204" pitchFamily="18" charset="0"/>
-                <a:ea typeface="Cambria Math" panose="02040503050406030204" pitchFamily="18" charset="0"/>
-              </a:rPr>
-              <a:t> </a:t>
-            </a:r>
-            <a:r>
-              <a:rPr lang="en-GB" sz="2200" dirty="0" err="1" smtClean="0">
+              <a:rPr lang="en-GB" sz="6400" dirty="0" smtClean="0">
+                <a:latin typeface="Cambria Math" panose="02040503050406030204" pitchFamily="18" charset="0"/>
+                <a:ea typeface="Cambria Math" panose="02040503050406030204" pitchFamily="18" charset="0"/>
+              </a:rPr>
+              <a:t> </a:t>
+            </a:r>
+            <a:r>
+              <a:rPr lang="en-GB" sz="6400" dirty="0" err="1" smtClean="0">
                 <a:latin typeface="Cambria Math" panose="02040503050406030204" pitchFamily="18" charset="0"/>
                 <a:ea typeface="Cambria Math" panose="02040503050406030204" pitchFamily="18" charset="0"/>
               </a:rPr>
               <a:t>giúp</a:t>
             </a:r>
             <a:r>
-              <a:rPr lang="en-GB" sz="2200" dirty="0" smtClean="0">
-                <a:latin typeface="Cambria Math" panose="02040503050406030204" pitchFamily="18" charset="0"/>
-                <a:ea typeface="Cambria Math" panose="02040503050406030204" pitchFamily="18" charset="0"/>
-              </a:rPr>
-              <a:t> </a:t>
-            </a:r>
-            <a:r>
-              <a:rPr lang="en-GB" sz="2200" dirty="0" err="1" smtClean="0">
+              <a:rPr lang="en-GB" sz="6400" dirty="0" smtClean="0">
+                <a:latin typeface="Cambria Math" panose="02040503050406030204" pitchFamily="18" charset="0"/>
+                <a:ea typeface="Cambria Math" panose="02040503050406030204" pitchFamily="18" charset="0"/>
+              </a:rPr>
+              <a:t> </a:t>
+            </a:r>
+            <a:r>
+              <a:rPr lang="en-GB" sz="6400" dirty="0" err="1" smtClean="0">
                 <a:latin typeface="Cambria Math" panose="02040503050406030204" pitchFamily="18" charset="0"/>
                 <a:ea typeface="Cambria Math" panose="02040503050406030204" pitchFamily="18" charset="0"/>
               </a:rPr>
               <a:t>các</a:t>
             </a:r>
             <a:r>
-              <a:rPr lang="en-GB" sz="2200" dirty="0" smtClean="0">
-                <a:latin typeface="Cambria Math" panose="02040503050406030204" pitchFamily="18" charset="0"/>
-                <a:ea typeface="Cambria Math" panose="02040503050406030204" pitchFamily="18" charset="0"/>
-              </a:rPr>
-              <a:t> </a:t>
-            </a:r>
-            <a:r>
-              <a:rPr lang="en-GB" sz="2200" dirty="0" err="1" smtClean="0">
+              <a:rPr lang="en-GB" sz="6400" dirty="0" smtClean="0">
+                <a:latin typeface="Cambria Math" panose="02040503050406030204" pitchFamily="18" charset="0"/>
+                <a:ea typeface="Cambria Math" panose="02040503050406030204" pitchFamily="18" charset="0"/>
+              </a:rPr>
+              <a:t> </a:t>
+            </a:r>
+            <a:r>
+              <a:rPr lang="en-GB" sz="6400" dirty="0" err="1" smtClean="0">
                 <a:latin typeface="Cambria Math" panose="02040503050406030204" pitchFamily="18" charset="0"/>
                 <a:ea typeface="Cambria Math" panose="02040503050406030204" pitchFamily="18" charset="0"/>
               </a:rPr>
               <a:t>chuyên</a:t>
             </a:r>
             <a:r>
-              <a:rPr lang="en-GB" sz="2200" dirty="0" smtClean="0">
-                <a:latin typeface="Cambria Math" panose="02040503050406030204" pitchFamily="18" charset="0"/>
-                <a:ea typeface="Cambria Math" panose="02040503050406030204" pitchFamily="18" charset="0"/>
-              </a:rPr>
-              <a:t> </a:t>
-            </a:r>
-            <a:r>
-              <a:rPr lang="en-GB" sz="2200" dirty="0" err="1" smtClean="0">
+              <a:rPr lang="en-GB" sz="6400" dirty="0" smtClean="0">
+                <a:latin typeface="Cambria Math" panose="02040503050406030204" pitchFamily="18" charset="0"/>
+                <a:ea typeface="Cambria Math" panose="02040503050406030204" pitchFamily="18" charset="0"/>
+              </a:rPr>
+              <a:t> </a:t>
+            </a:r>
+            <a:r>
+              <a:rPr lang="en-GB" sz="6400" dirty="0" err="1" smtClean="0">
                 <a:latin typeface="Cambria Math" panose="02040503050406030204" pitchFamily="18" charset="0"/>
                 <a:ea typeface="Cambria Math" panose="02040503050406030204" pitchFamily="18" charset="0"/>
               </a:rPr>
               <a:t>gia</a:t>
             </a:r>
             <a:r>
-              <a:rPr lang="en-GB" sz="2200" dirty="0" smtClean="0">
+              <a:rPr lang="en-GB" sz="6400" dirty="0" smtClean="0">
                 <a:latin typeface="Cambria Math" panose="02040503050406030204" pitchFamily="18" charset="0"/>
                 <a:ea typeface="Cambria Math" panose="02040503050406030204" pitchFamily="18" charset="0"/>
               </a:rPr>
               <a:t>, </a:t>
             </a:r>
             <a:r>
-              <a:rPr lang="en-GB" sz="2200" dirty="0" err="1" smtClean="0">
+              <a:rPr lang="en-GB" sz="6400" dirty="0" err="1" smtClean="0">
                 <a:latin typeface="Cambria Math" panose="02040503050406030204" pitchFamily="18" charset="0"/>
                 <a:ea typeface="Cambria Math" panose="02040503050406030204" pitchFamily="18" charset="0"/>
               </a:rPr>
               <a:t>nhà</a:t>
             </a:r>
             <a:r>
-              <a:rPr lang="en-GB" sz="2200" dirty="0" smtClean="0">
-                <a:latin typeface="Cambria Math" panose="02040503050406030204" pitchFamily="18" charset="0"/>
-                <a:ea typeface="Cambria Math" panose="02040503050406030204" pitchFamily="18" charset="0"/>
-              </a:rPr>
-              <a:t> </a:t>
-            </a:r>
-            <a:r>
-              <a:rPr lang="en-GB" sz="2200" dirty="0" err="1" smtClean="0">
+              <a:rPr lang="en-GB" sz="6400" dirty="0" smtClean="0">
+                <a:latin typeface="Cambria Math" panose="02040503050406030204" pitchFamily="18" charset="0"/>
+                <a:ea typeface="Cambria Math" panose="02040503050406030204" pitchFamily="18" charset="0"/>
+              </a:rPr>
+              <a:t> </a:t>
+            </a:r>
+            <a:r>
+              <a:rPr lang="en-GB" sz="6400" dirty="0" err="1" smtClean="0">
                 <a:latin typeface="Cambria Math" panose="02040503050406030204" pitchFamily="18" charset="0"/>
                 <a:ea typeface="Cambria Math" panose="02040503050406030204" pitchFamily="18" charset="0"/>
               </a:rPr>
               <a:t>nghiên</a:t>
             </a:r>
             <a:r>
-              <a:rPr lang="en-GB" sz="2200" dirty="0" smtClean="0">
-                <a:latin typeface="Cambria Math" panose="02040503050406030204" pitchFamily="18" charset="0"/>
-                <a:ea typeface="Cambria Math" panose="02040503050406030204" pitchFamily="18" charset="0"/>
-              </a:rPr>
-              <a:t> </a:t>
-            </a:r>
-            <a:r>
-              <a:rPr lang="en-GB" sz="2200" dirty="0" err="1" smtClean="0">
+              <a:rPr lang="en-GB" sz="6400" dirty="0" smtClean="0">
+                <a:latin typeface="Cambria Math" panose="02040503050406030204" pitchFamily="18" charset="0"/>
+                <a:ea typeface="Cambria Math" panose="02040503050406030204" pitchFamily="18" charset="0"/>
+              </a:rPr>
+              <a:t> </a:t>
+            </a:r>
+            <a:r>
+              <a:rPr lang="en-GB" sz="6400" dirty="0" err="1" smtClean="0">
                 <a:latin typeface="Cambria Math" panose="02040503050406030204" pitchFamily="18" charset="0"/>
                 <a:ea typeface="Cambria Math" panose="02040503050406030204" pitchFamily="18" charset="0"/>
               </a:rPr>
               <a:t>cứu</a:t>
             </a:r>
             <a:r>
-              <a:rPr lang="en-GB" sz="2200" dirty="0" smtClean="0">
-                <a:latin typeface="Cambria Math" panose="02040503050406030204" pitchFamily="18" charset="0"/>
-                <a:ea typeface="Cambria Math" panose="02040503050406030204" pitchFamily="18" charset="0"/>
-              </a:rPr>
-              <a:t> </a:t>
-            </a:r>
-            <a:r>
-              <a:rPr lang="en-GB" sz="2200" dirty="0" err="1" smtClean="0">
+              <a:rPr lang="en-GB" sz="6400" dirty="0" smtClean="0">
+                <a:latin typeface="Cambria Math" panose="02040503050406030204" pitchFamily="18" charset="0"/>
+                <a:ea typeface="Cambria Math" panose="02040503050406030204" pitchFamily="18" charset="0"/>
+              </a:rPr>
+              <a:t> </a:t>
+            </a:r>
+            <a:r>
+              <a:rPr lang="en-GB" sz="6400" dirty="0" err="1" smtClean="0">
                 <a:latin typeface="Cambria Math" panose="02040503050406030204" pitchFamily="18" charset="0"/>
                 <a:ea typeface="Cambria Math" panose="02040503050406030204" pitchFamily="18" charset="0"/>
               </a:rPr>
               <a:t>phát</a:t>
             </a:r>
             <a:r>
-              <a:rPr lang="en-GB" sz="2200" dirty="0" smtClean="0">
-                <a:latin typeface="Cambria Math" panose="02040503050406030204" pitchFamily="18" charset="0"/>
-                <a:ea typeface="Cambria Math" panose="02040503050406030204" pitchFamily="18" charset="0"/>
-              </a:rPr>
-              <a:t> </a:t>
-            </a:r>
-            <a:r>
-              <a:rPr lang="en-GB" sz="2200" dirty="0" err="1" smtClean="0">
+              <a:rPr lang="en-GB" sz="6400" dirty="0" smtClean="0">
+                <a:latin typeface="Cambria Math" panose="02040503050406030204" pitchFamily="18" charset="0"/>
+                <a:ea typeface="Cambria Math" panose="02040503050406030204" pitchFamily="18" charset="0"/>
+              </a:rPr>
+              <a:t> </a:t>
+            </a:r>
+            <a:r>
+              <a:rPr lang="en-GB" sz="6400" dirty="0" err="1" smtClean="0">
                 <a:latin typeface="Cambria Math" panose="02040503050406030204" pitchFamily="18" charset="0"/>
                 <a:ea typeface="Cambria Math" panose="02040503050406030204" pitchFamily="18" charset="0"/>
               </a:rPr>
               <a:t>triển</a:t>
             </a:r>
             <a:r>
-              <a:rPr lang="en-GB" sz="2200" dirty="0" smtClean="0">
-                <a:latin typeface="Cambria Math" panose="02040503050406030204" pitchFamily="18" charset="0"/>
-                <a:ea typeface="Cambria Math" panose="02040503050406030204" pitchFamily="18" charset="0"/>
-              </a:rPr>
-              <a:t> </a:t>
-            </a:r>
-            <a:r>
-              <a:rPr lang="en-GB" sz="2200" dirty="0" err="1" smtClean="0">
+              <a:rPr lang="en-GB" sz="6400" dirty="0" smtClean="0">
+                <a:latin typeface="Cambria Math" panose="02040503050406030204" pitchFamily="18" charset="0"/>
+                <a:ea typeface="Cambria Math" panose="02040503050406030204" pitchFamily="18" charset="0"/>
+              </a:rPr>
+              <a:t> </a:t>
+            </a:r>
+            <a:r>
+              <a:rPr lang="en-GB" sz="6400" dirty="0" err="1" smtClean="0">
                 <a:latin typeface="Cambria Math" panose="02040503050406030204" pitchFamily="18" charset="0"/>
                 <a:ea typeface="Cambria Math" panose="02040503050406030204" pitchFamily="18" charset="0"/>
               </a:rPr>
               <a:t>các</a:t>
             </a:r>
             <a:r>
-              <a:rPr lang="en-GB" sz="2200" dirty="0" smtClean="0">
-                <a:latin typeface="Cambria Math" panose="02040503050406030204" pitchFamily="18" charset="0"/>
-                <a:ea typeface="Cambria Math" panose="02040503050406030204" pitchFamily="18" charset="0"/>
-              </a:rPr>
-              <a:t> </a:t>
-            </a:r>
-            <a:r>
-              <a:rPr lang="en-GB" sz="2200" dirty="0" err="1" smtClean="0">
+              <a:rPr lang="en-GB" sz="6400" dirty="0" smtClean="0">
+                <a:latin typeface="Cambria Math" panose="02040503050406030204" pitchFamily="18" charset="0"/>
+                <a:ea typeface="Cambria Math" panose="02040503050406030204" pitchFamily="18" charset="0"/>
+              </a:rPr>
+              <a:t> </a:t>
+            </a:r>
+            <a:r>
+              <a:rPr lang="en-GB" sz="6400" dirty="0" err="1" smtClean="0">
                 <a:latin typeface="Cambria Math" panose="02040503050406030204" pitchFamily="18" charset="0"/>
                 <a:ea typeface="Cambria Math" panose="02040503050406030204" pitchFamily="18" charset="0"/>
               </a:rPr>
               <a:t>sản</a:t>
             </a:r>
             <a:r>
-              <a:rPr lang="en-GB" sz="2200" dirty="0" smtClean="0">
-                <a:latin typeface="Cambria Math" panose="02040503050406030204" pitchFamily="18" charset="0"/>
-                <a:ea typeface="Cambria Math" panose="02040503050406030204" pitchFamily="18" charset="0"/>
-              </a:rPr>
-              <a:t> </a:t>
-            </a:r>
-            <a:r>
-              <a:rPr lang="en-GB" sz="2200" dirty="0" err="1" smtClean="0">
+              <a:rPr lang="en-GB" sz="6400" dirty="0" smtClean="0">
+                <a:latin typeface="Cambria Math" panose="02040503050406030204" pitchFamily="18" charset="0"/>
+                <a:ea typeface="Cambria Math" panose="02040503050406030204" pitchFamily="18" charset="0"/>
+              </a:rPr>
+              <a:t> </a:t>
+            </a:r>
+            <a:r>
+              <a:rPr lang="en-GB" sz="6400" dirty="0" err="1" smtClean="0">
                 <a:latin typeface="Cambria Math" panose="02040503050406030204" pitchFamily="18" charset="0"/>
                 <a:ea typeface="Cambria Math" panose="02040503050406030204" pitchFamily="18" charset="0"/>
               </a:rPr>
               <a:t>phẩm</a:t>
             </a:r>
             <a:r>
-              <a:rPr lang="en-GB" sz="2200" dirty="0" smtClean="0">
-                <a:latin typeface="Cambria Math" panose="02040503050406030204" pitchFamily="18" charset="0"/>
-                <a:ea typeface="Cambria Math" panose="02040503050406030204" pitchFamily="18" charset="0"/>
-              </a:rPr>
-              <a:t> </a:t>
-            </a:r>
-            <a:r>
-              <a:rPr lang="en-GB" sz="2200" dirty="0" err="1" smtClean="0">
+              <a:rPr lang="en-GB" sz="6400" dirty="0" smtClean="0">
+                <a:latin typeface="Cambria Math" panose="02040503050406030204" pitchFamily="18" charset="0"/>
+                <a:ea typeface="Cambria Math" panose="02040503050406030204" pitchFamily="18" charset="0"/>
+              </a:rPr>
+              <a:t> </a:t>
+            </a:r>
+            <a:r>
+              <a:rPr lang="en-GB" sz="6400" dirty="0" err="1" smtClean="0">
                 <a:latin typeface="Cambria Math" panose="02040503050406030204" pitchFamily="18" charset="0"/>
                 <a:ea typeface="Cambria Math" panose="02040503050406030204" pitchFamily="18" charset="0"/>
               </a:rPr>
               <a:t>phù</a:t>
             </a:r>
             <a:r>
-              <a:rPr lang="en-GB" sz="2200" dirty="0" smtClean="0">
-                <a:latin typeface="Cambria Math" panose="02040503050406030204" pitchFamily="18" charset="0"/>
-                <a:ea typeface="Cambria Math" panose="02040503050406030204" pitchFamily="18" charset="0"/>
-              </a:rPr>
-              <a:t> </a:t>
-            </a:r>
-            <a:r>
-              <a:rPr lang="en-GB" sz="2200" dirty="0" err="1" smtClean="0">
+              <a:rPr lang="en-GB" sz="6400" dirty="0" smtClean="0">
+                <a:latin typeface="Cambria Math" panose="02040503050406030204" pitchFamily="18" charset="0"/>
+                <a:ea typeface="Cambria Math" panose="02040503050406030204" pitchFamily="18" charset="0"/>
+              </a:rPr>
+              <a:t> </a:t>
+            </a:r>
+            <a:r>
+              <a:rPr lang="en-GB" sz="6400" dirty="0" err="1" smtClean="0">
                 <a:latin typeface="Cambria Math" panose="02040503050406030204" pitchFamily="18" charset="0"/>
                 <a:ea typeface="Cambria Math" panose="02040503050406030204" pitchFamily="18" charset="0"/>
               </a:rPr>
               <a:t>hợp</a:t>
             </a:r>
             <a:r>
-              <a:rPr lang="en-GB" sz="2200" dirty="0" smtClean="0">
-                <a:latin typeface="Cambria Math" panose="02040503050406030204" pitchFamily="18" charset="0"/>
-                <a:ea typeface="Cambria Math" panose="02040503050406030204" pitchFamily="18" charset="0"/>
-              </a:rPr>
-              <a:t> </a:t>
-            </a:r>
-            <a:r>
-              <a:rPr lang="en-GB" sz="2200" dirty="0" err="1" smtClean="0">
+              <a:rPr lang="en-GB" sz="6400" dirty="0" smtClean="0">
+                <a:latin typeface="Cambria Math" panose="02040503050406030204" pitchFamily="18" charset="0"/>
+                <a:ea typeface="Cambria Math" panose="02040503050406030204" pitchFamily="18" charset="0"/>
+              </a:rPr>
+              <a:t> </a:t>
+            </a:r>
+            <a:r>
+              <a:rPr lang="en-GB" sz="6400" dirty="0" err="1" smtClean="0">
                 <a:latin typeface="Cambria Math" panose="02040503050406030204" pitchFamily="18" charset="0"/>
                 <a:ea typeface="Cambria Math" panose="02040503050406030204" pitchFamily="18" charset="0"/>
               </a:rPr>
               <a:t>thị</a:t>
             </a:r>
             <a:r>
-              <a:rPr lang="en-GB" sz="2200" dirty="0" smtClean="0">
-                <a:latin typeface="Cambria Math" panose="02040503050406030204" pitchFamily="18" charset="0"/>
-                <a:ea typeface="Cambria Math" panose="02040503050406030204" pitchFamily="18" charset="0"/>
-              </a:rPr>
-              <a:t> </a:t>
-            </a:r>
-            <a:r>
-              <a:rPr lang="en-GB" sz="2200" dirty="0" err="1" smtClean="0">
+              <a:rPr lang="en-GB" sz="6400" dirty="0" smtClean="0">
+                <a:latin typeface="Cambria Math" panose="02040503050406030204" pitchFamily="18" charset="0"/>
+                <a:ea typeface="Cambria Math" panose="02040503050406030204" pitchFamily="18" charset="0"/>
+              </a:rPr>
+              <a:t> </a:t>
+            </a:r>
+            <a:r>
+              <a:rPr lang="en-GB" sz="6400" dirty="0" err="1" smtClean="0">
                 <a:latin typeface="Cambria Math" panose="02040503050406030204" pitchFamily="18" charset="0"/>
                 <a:ea typeface="Cambria Math" panose="02040503050406030204" pitchFamily="18" charset="0"/>
               </a:rPr>
               <a:t>hiếu</a:t>
             </a:r>
             <a:r>
-              <a:rPr lang="en-GB" sz="2200" dirty="0" smtClean="0">
-                <a:latin typeface="Cambria Math" panose="02040503050406030204" pitchFamily="18" charset="0"/>
-                <a:ea typeface="Cambria Math" panose="02040503050406030204" pitchFamily="18" charset="0"/>
-              </a:rPr>
-              <a:t> </a:t>
-            </a:r>
-            <a:r>
-              <a:rPr lang="en-GB" sz="2200" dirty="0" err="1" smtClean="0">
+              <a:rPr lang="en-GB" sz="6400" dirty="0" smtClean="0">
+                <a:latin typeface="Cambria Math" panose="02040503050406030204" pitchFamily="18" charset="0"/>
+                <a:ea typeface="Cambria Math" panose="02040503050406030204" pitchFamily="18" charset="0"/>
+              </a:rPr>
+              <a:t> </a:t>
+            </a:r>
+            <a:r>
+              <a:rPr lang="en-GB" sz="6400" dirty="0" err="1" smtClean="0">
                 <a:latin typeface="Cambria Math" panose="02040503050406030204" pitchFamily="18" charset="0"/>
                 <a:ea typeface="Cambria Math" panose="02040503050406030204" pitchFamily="18" charset="0"/>
               </a:rPr>
               <a:t>sức</a:t>
             </a:r>
             <a:r>
-              <a:rPr lang="en-GB" sz="2200" dirty="0" smtClean="0">
-                <a:latin typeface="Cambria Math" panose="02040503050406030204" pitchFamily="18" charset="0"/>
-                <a:ea typeface="Cambria Math" panose="02040503050406030204" pitchFamily="18" charset="0"/>
-              </a:rPr>
-              <a:t> </a:t>
-            </a:r>
-            <a:r>
-              <a:rPr lang="en-GB" sz="2200" dirty="0" err="1" smtClean="0">
+              <a:rPr lang="en-GB" sz="6400" dirty="0" smtClean="0">
+                <a:latin typeface="Cambria Math" panose="02040503050406030204" pitchFamily="18" charset="0"/>
+                <a:ea typeface="Cambria Math" panose="02040503050406030204" pitchFamily="18" charset="0"/>
+              </a:rPr>
+              <a:t> </a:t>
+            </a:r>
+            <a:r>
+              <a:rPr lang="en-GB" sz="6400" dirty="0" err="1" smtClean="0">
                 <a:latin typeface="Cambria Math" panose="02040503050406030204" pitchFamily="18" charset="0"/>
                 <a:ea typeface="Cambria Math" panose="02040503050406030204" pitchFamily="18" charset="0"/>
               </a:rPr>
               <a:t>khỏe</a:t>
             </a:r>
             <a:r>
-              <a:rPr lang="en-GB" sz="2200" dirty="0" smtClean="0">
-                <a:latin typeface="Cambria Math" panose="02040503050406030204" pitchFamily="18" charset="0"/>
-                <a:ea typeface="Cambria Math" panose="02040503050406030204" pitchFamily="18" charset="0"/>
-              </a:rPr>
-              <a:t> </a:t>
-            </a:r>
-            <a:r>
-              <a:rPr lang="en-GB" sz="2200" dirty="0" err="1" smtClean="0">
+              <a:rPr lang="en-GB" sz="6400" dirty="0" smtClean="0">
+                <a:latin typeface="Cambria Math" panose="02040503050406030204" pitchFamily="18" charset="0"/>
+                <a:ea typeface="Cambria Math" panose="02040503050406030204" pitchFamily="18" charset="0"/>
+              </a:rPr>
+              <a:t> </a:t>
+            </a:r>
+            <a:r>
+              <a:rPr lang="en-GB" sz="6400" dirty="0" err="1" smtClean="0">
                 <a:latin typeface="Cambria Math" panose="02040503050406030204" pitchFamily="18" charset="0"/>
                 <a:ea typeface="Cambria Math" panose="02040503050406030204" pitchFamily="18" charset="0"/>
               </a:rPr>
               <a:t>mà</a:t>
             </a:r>
             <a:r>
-              <a:rPr lang="en-GB" sz="2200" dirty="0" smtClean="0">
-                <a:latin typeface="Cambria Math" panose="02040503050406030204" pitchFamily="18" charset="0"/>
-                <a:ea typeface="Cambria Math" panose="02040503050406030204" pitchFamily="18" charset="0"/>
-              </a:rPr>
-              <a:t> </a:t>
-            </a:r>
-            <a:r>
-              <a:rPr lang="en-GB" sz="2200" dirty="0" err="1" smtClean="0">
+              <a:rPr lang="en-GB" sz="6400" dirty="0" smtClean="0">
+                <a:latin typeface="Cambria Math" panose="02040503050406030204" pitchFamily="18" charset="0"/>
+                <a:ea typeface="Cambria Math" panose="02040503050406030204" pitchFamily="18" charset="0"/>
+              </a:rPr>
+              <a:t> </a:t>
+            </a:r>
+            <a:r>
+              <a:rPr lang="en-GB" sz="6400" dirty="0" err="1" smtClean="0">
                 <a:latin typeface="Cambria Math" panose="02040503050406030204" pitchFamily="18" charset="0"/>
                 <a:ea typeface="Cambria Math" panose="02040503050406030204" pitchFamily="18" charset="0"/>
               </a:rPr>
               <a:t>vẫn</a:t>
             </a:r>
             <a:r>
-              <a:rPr lang="en-GB" sz="2200" dirty="0" smtClean="0">
-                <a:latin typeface="Cambria Math" panose="02040503050406030204" pitchFamily="18" charset="0"/>
-                <a:ea typeface="Cambria Math" panose="02040503050406030204" pitchFamily="18" charset="0"/>
-              </a:rPr>
-              <a:t> </a:t>
-            </a:r>
-            <a:r>
-              <a:rPr lang="en-GB" sz="2200" dirty="0" err="1" smtClean="0">
+              <a:rPr lang="en-GB" sz="6400" dirty="0" smtClean="0">
+                <a:latin typeface="Cambria Math" panose="02040503050406030204" pitchFamily="18" charset="0"/>
+                <a:ea typeface="Cambria Math" panose="02040503050406030204" pitchFamily="18" charset="0"/>
+              </a:rPr>
+              <a:t> </a:t>
+            </a:r>
+            <a:r>
+              <a:rPr lang="en-GB" sz="6400" dirty="0" err="1" smtClean="0">
                 <a:latin typeface="Cambria Math" panose="02040503050406030204" pitchFamily="18" charset="0"/>
                 <a:ea typeface="Cambria Math" panose="02040503050406030204" pitchFamily="18" charset="0"/>
               </a:rPr>
               <a:t>đảm</a:t>
             </a:r>
             <a:r>
-              <a:rPr lang="en-GB" sz="2200" dirty="0" smtClean="0">
-                <a:latin typeface="Cambria Math" panose="02040503050406030204" pitchFamily="18" charset="0"/>
-                <a:ea typeface="Cambria Math" panose="02040503050406030204" pitchFamily="18" charset="0"/>
-              </a:rPr>
-              <a:t> </a:t>
-            </a:r>
-            <a:r>
-              <a:rPr lang="en-GB" sz="2200" dirty="0" err="1" smtClean="0">
+              <a:rPr lang="en-GB" sz="6400" dirty="0" smtClean="0">
+                <a:latin typeface="Cambria Math" panose="02040503050406030204" pitchFamily="18" charset="0"/>
+                <a:ea typeface="Cambria Math" panose="02040503050406030204" pitchFamily="18" charset="0"/>
+              </a:rPr>
+              <a:t> </a:t>
+            </a:r>
+            <a:r>
+              <a:rPr lang="en-GB" sz="6400" dirty="0" err="1" smtClean="0">
                 <a:latin typeface="Cambria Math" panose="02040503050406030204" pitchFamily="18" charset="0"/>
                 <a:ea typeface="Cambria Math" panose="02040503050406030204" pitchFamily="18" charset="0"/>
               </a:rPr>
               <a:t>bảo</a:t>
             </a:r>
             <a:r>
-              <a:rPr lang="en-GB" sz="2200" dirty="0" smtClean="0">
-                <a:latin typeface="Cambria Math" panose="02040503050406030204" pitchFamily="18" charset="0"/>
-                <a:ea typeface="Cambria Math" panose="02040503050406030204" pitchFamily="18" charset="0"/>
-              </a:rPr>
-              <a:t> </a:t>
-            </a:r>
-            <a:r>
-              <a:rPr lang="en-GB" sz="2200" dirty="0" err="1" smtClean="0">
+              <a:rPr lang="en-GB" sz="6400" dirty="0" smtClean="0">
+                <a:latin typeface="Cambria Math" panose="02040503050406030204" pitchFamily="18" charset="0"/>
+                <a:ea typeface="Cambria Math" panose="02040503050406030204" pitchFamily="18" charset="0"/>
+              </a:rPr>
+              <a:t> </a:t>
+            </a:r>
+            <a:r>
+              <a:rPr lang="en-GB" sz="6400" dirty="0" err="1" smtClean="0">
                 <a:latin typeface="Cambria Math" panose="02040503050406030204" pitchFamily="18" charset="0"/>
                 <a:ea typeface="Cambria Math" panose="02040503050406030204" pitchFamily="18" charset="0"/>
               </a:rPr>
               <a:t>năng</a:t>
             </a:r>
             <a:r>
-              <a:rPr lang="en-GB" sz="2200" dirty="0" smtClean="0">
-                <a:latin typeface="Cambria Math" panose="02040503050406030204" pitchFamily="18" charset="0"/>
-                <a:ea typeface="Cambria Math" panose="02040503050406030204" pitchFamily="18" charset="0"/>
-              </a:rPr>
-              <a:t> </a:t>
-            </a:r>
-            <a:r>
-              <a:rPr lang="en-GB" sz="2200" dirty="0" err="1" smtClean="0">
+              <a:rPr lang="en-GB" sz="6400" dirty="0" smtClean="0">
+                <a:latin typeface="Cambria Math" panose="02040503050406030204" pitchFamily="18" charset="0"/>
+                <a:ea typeface="Cambria Math" panose="02040503050406030204" pitchFamily="18" charset="0"/>
+              </a:rPr>
+              <a:t> </a:t>
+            </a:r>
+            <a:r>
+              <a:rPr lang="en-GB" sz="6400" dirty="0" err="1" smtClean="0">
                 <a:latin typeface="Cambria Math" panose="02040503050406030204" pitchFamily="18" charset="0"/>
                 <a:ea typeface="Cambria Math" panose="02040503050406030204" pitchFamily="18" charset="0"/>
               </a:rPr>
               <a:t>lượng</a:t>
             </a:r>
             <a:r>
-              <a:rPr lang="en-GB" sz="2200" dirty="0" smtClean="0">
-                <a:latin typeface="Cambria Math" panose="02040503050406030204" pitchFamily="18" charset="0"/>
-                <a:ea typeface="Cambria Math" panose="02040503050406030204" pitchFamily="18" charset="0"/>
-              </a:rPr>
-              <a:t> </a:t>
-            </a:r>
-            <a:r>
-              <a:rPr lang="en-GB" sz="2200" dirty="0" err="1" smtClean="0">
+              <a:rPr lang="en-GB" sz="6400" dirty="0" smtClean="0">
+                <a:latin typeface="Cambria Math" panose="02040503050406030204" pitchFamily="18" charset="0"/>
+                <a:ea typeface="Cambria Math" panose="02040503050406030204" pitchFamily="18" charset="0"/>
+              </a:rPr>
+              <a:t> </a:t>
+            </a:r>
+            <a:r>
+              <a:rPr lang="en-GB" sz="6400" dirty="0" err="1" smtClean="0">
                 <a:latin typeface="Cambria Math" panose="02040503050406030204" pitchFamily="18" charset="0"/>
                 <a:ea typeface="Cambria Math" panose="02040503050406030204" pitchFamily="18" charset="0"/>
               </a:rPr>
               <a:t>cùng</a:t>
             </a:r>
             <a:r>
-              <a:rPr lang="en-GB" sz="2200" dirty="0" smtClean="0">
+              <a:rPr lang="en-GB" sz="6400" dirty="0" smtClean="0">
                 <a:latin typeface="Cambria Math" panose="02040503050406030204" pitchFamily="18" charset="0"/>
                 <a:ea typeface="Cambria Math" panose="02040503050406030204" pitchFamily="18" charset="0"/>
               </a:rPr>
               <a:t> chi </a:t>
             </a:r>
             <a:r>
-              <a:rPr lang="en-GB" sz="2200" dirty="0" err="1" smtClean="0">
+              <a:rPr lang="en-GB" sz="6400" dirty="0" err="1" smtClean="0">
                 <a:latin typeface="Cambria Math" panose="02040503050406030204" pitchFamily="18" charset="0"/>
                 <a:ea typeface="Cambria Math" panose="02040503050406030204" pitchFamily="18" charset="0"/>
               </a:rPr>
               <a:t>phí</a:t>
             </a:r>
             <a:r>
-              <a:rPr lang="en-GB" sz="2200" dirty="0" smtClean="0">
-                <a:latin typeface="Cambria Math" panose="02040503050406030204" pitchFamily="18" charset="0"/>
-                <a:ea typeface="Cambria Math" panose="02040503050406030204" pitchFamily="18" charset="0"/>
-              </a:rPr>
-              <a:t> </a:t>
-            </a:r>
-            <a:r>
-              <a:rPr lang="en-GB" sz="2200" dirty="0" err="1" smtClean="0">
+              <a:rPr lang="en-GB" sz="6400" dirty="0" smtClean="0">
+                <a:latin typeface="Cambria Math" panose="02040503050406030204" pitchFamily="18" charset="0"/>
+                <a:ea typeface="Cambria Math" panose="02040503050406030204" pitchFamily="18" charset="0"/>
+              </a:rPr>
+              <a:t> </a:t>
+            </a:r>
+            <a:r>
+              <a:rPr lang="en-GB" sz="6400" dirty="0" err="1" smtClean="0">
                 <a:latin typeface="Cambria Math" panose="02040503050406030204" pitchFamily="18" charset="0"/>
                 <a:ea typeface="Cambria Math" panose="02040503050406030204" pitchFamily="18" charset="0"/>
               </a:rPr>
               <a:t>sản</a:t>
             </a:r>
             <a:r>
-              <a:rPr lang="en-GB" sz="2200" dirty="0" smtClean="0">
-                <a:latin typeface="Cambria Math" panose="02040503050406030204" pitchFamily="18" charset="0"/>
-                <a:ea typeface="Cambria Math" panose="02040503050406030204" pitchFamily="18" charset="0"/>
-              </a:rPr>
-              <a:t> </a:t>
-            </a:r>
-            <a:r>
-              <a:rPr lang="en-GB" sz="2200" dirty="0" err="1" smtClean="0">
+              <a:rPr lang="en-GB" sz="6400" dirty="0" smtClean="0">
+                <a:latin typeface="Cambria Math" panose="02040503050406030204" pitchFamily="18" charset="0"/>
+                <a:ea typeface="Cambria Math" panose="02040503050406030204" pitchFamily="18" charset="0"/>
+              </a:rPr>
+              <a:t> </a:t>
+            </a:r>
+            <a:r>
+              <a:rPr lang="en-GB" sz="6400" dirty="0" err="1" smtClean="0">
                 <a:latin typeface="Cambria Math" panose="02040503050406030204" pitchFamily="18" charset="0"/>
                 <a:ea typeface="Cambria Math" panose="02040503050406030204" pitchFamily="18" charset="0"/>
               </a:rPr>
               <a:t>xuất</a:t>
             </a:r>
+            <a:endParaRPr lang="en-GB" sz="6400" dirty="0" smtClean="0">
+              <a:latin typeface="Cambria Math" panose="02040503050406030204" pitchFamily="18" charset="0"/>
+              <a:ea typeface="Cambria Math" panose="02040503050406030204" pitchFamily="18" charset="0"/>
+            </a:endParaRPr>
+          </a:p>
+          <a:p>
+            <a:r>
+              <a:rPr lang="en-GB" sz="6400" dirty="0" err="1" smtClean="0">
+                <a:latin typeface="Cambria Math" panose="02040503050406030204" pitchFamily="18" charset="0"/>
+                <a:ea typeface="Cambria Math" panose="02040503050406030204" pitchFamily="18" charset="0"/>
+              </a:rPr>
+              <a:t>Nguồn</a:t>
+            </a:r>
+            <a:r>
+              <a:rPr lang="en-GB" sz="6400" dirty="0" smtClean="0">
+                <a:latin typeface="Cambria Math" panose="02040503050406030204" pitchFamily="18" charset="0"/>
+                <a:ea typeface="Cambria Math" panose="02040503050406030204" pitchFamily="18" charset="0"/>
+              </a:rPr>
+              <a:t> </a:t>
+            </a:r>
+            <a:r>
+              <a:rPr lang="en-GB" sz="6400" dirty="0" err="1" smtClean="0">
+                <a:latin typeface="Cambria Math" panose="02040503050406030204" pitchFamily="18" charset="0"/>
+                <a:ea typeface="Cambria Math" panose="02040503050406030204" pitchFamily="18" charset="0"/>
+              </a:rPr>
+              <a:t>cảm</a:t>
+            </a:r>
+            <a:r>
+              <a:rPr lang="en-GB" sz="6400" dirty="0" smtClean="0">
+                <a:latin typeface="Cambria Math" panose="02040503050406030204" pitchFamily="18" charset="0"/>
+                <a:ea typeface="Cambria Math" panose="02040503050406030204" pitchFamily="18" charset="0"/>
+              </a:rPr>
+              <a:t> </a:t>
+            </a:r>
+            <a:r>
+              <a:rPr lang="en-GB" sz="6400" dirty="0" err="1" smtClean="0">
+                <a:latin typeface="Cambria Math" panose="02040503050406030204" pitchFamily="18" charset="0"/>
+                <a:ea typeface="Cambria Math" panose="02040503050406030204" pitchFamily="18" charset="0"/>
+              </a:rPr>
+              <a:t>hứng</a:t>
+            </a:r>
+            <a:r>
+              <a:rPr lang="en-GB" sz="6400" dirty="0" smtClean="0">
+                <a:latin typeface="Cambria Math" panose="02040503050406030204" pitchFamily="18" charset="0"/>
+                <a:ea typeface="Cambria Math" panose="02040503050406030204" pitchFamily="18" charset="0"/>
+              </a:rPr>
+              <a:t> </a:t>
+            </a:r>
+            <a:r>
+              <a:rPr lang="en-GB" sz="6400" dirty="0" err="1" smtClean="0">
+                <a:latin typeface="Cambria Math" panose="02040503050406030204" pitchFamily="18" charset="0"/>
+                <a:ea typeface="Cambria Math" panose="02040503050406030204" pitchFamily="18" charset="0"/>
+              </a:rPr>
+              <a:t>của</a:t>
+            </a:r>
+            <a:r>
+              <a:rPr lang="en-GB" sz="6400" dirty="0" smtClean="0">
+                <a:latin typeface="Cambria Math" panose="02040503050406030204" pitchFamily="18" charset="0"/>
+                <a:ea typeface="Cambria Math" panose="02040503050406030204" pitchFamily="18" charset="0"/>
+              </a:rPr>
+              <a:t> </a:t>
+            </a:r>
+            <a:r>
+              <a:rPr lang="en-GB" sz="6400" dirty="0" err="1" smtClean="0">
+                <a:latin typeface="Cambria Math" panose="02040503050406030204" pitchFamily="18" charset="0"/>
+                <a:ea typeface="Cambria Math" panose="02040503050406030204" pitchFamily="18" charset="0"/>
+              </a:rPr>
+              <a:t>câu</a:t>
+            </a:r>
+            <a:r>
+              <a:rPr lang="en-GB" sz="6400" dirty="0" smtClean="0">
+                <a:latin typeface="Cambria Math" panose="02040503050406030204" pitchFamily="18" charset="0"/>
+                <a:ea typeface="Cambria Math" panose="02040503050406030204" pitchFamily="18" charset="0"/>
+              </a:rPr>
+              <a:t> </a:t>
+            </a:r>
+            <a:r>
+              <a:rPr lang="en-GB" sz="6400" dirty="0" err="1" smtClean="0">
+                <a:latin typeface="Cambria Math" panose="02040503050406030204" pitchFamily="18" charset="0"/>
+                <a:ea typeface="Cambria Math" panose="02040503050406030204" pitchFamily="18" charset="0"/>
+              </a:rPr>
+              <a:t>hỏi</a:t>
+            </a:r>
+            <a:r>
+              <a:rPr lang="en-GB" sz="6400" dirty="0" smtClean="0">
+                <a:latin typeface="Cambria Math" panose="02040503050406030204" pitchFamily="18" charset="0"/>
+                <a:ea typeface="Cambria Math" panose="02040503050406030204" pitchFamily="18" charset="0"/>
+              </a:rPr>
+              <a:t>:</a:t>
+            </a:r>
+          </a:p>
+          <a:p>
+            <a:pPr lvl="1"/>
+            <a:r>
+              <a:rPr lang="vi-VN" sz="6400" dirty="0">
+                <a:latin typeface="Cambria Math" panose="02040503050406030204" pitchFamily="18" charset="0"/>
+                <a:ea typeface="Cambria Math" panose="02040503050406030204" pitchFamily="18" charset="0"/>
+              </a:rPr>
+              <a:t>Phải nói rằng nguồn cảm hứng của câu hỏi xuất phát từ nguồn cảm hứng chọn chủ để của nhóm em, nhóm em nhận thấy rằng tỉ lệ béo phì ở dân số các quốc gia mỗi ngày một tăng, họ luôn đặt ra câu hỏi tại sao tôi ăn ít nhưng vẫn mập. Tuy nhiên họ không biết rằng họ ăn ít về khối lương nhưng lượng calo trong thực phẩm họ ăn không hề thấp, do đó nhóm em đã đặt ra câu hỏi là đâu là công thức tính năng lượng từ các thành phân dinh dưỡng của món ăn, nhằm giúp mọi người hiểu được thực phẩm họ ăn chứa nhiều năng lượng tới đâu để có thể điều chỉnh chế độ ăn cân bằng và hợp lý</a:t>
+            </a:r>
+          </a:p>
+          <a:p>
+            <a:endParaRPr lang="en-GB" sz="6400" dirty="0" smtClean="0">
+              <a:latin typeface="Cambria Math" panose="02040503050406030204" pitchFamily="18" charset="0"/>
+              <a:ea typeface="Cambria Math" panose="02040503050406030204" pitchFamily="18" charset="0"/>
+            </a:endParaRPr>
+          </a:p>
+          <a:p>
+            <a:pPr lvl="1"/>
             <a:endParaRPr lang="en-GB" sz="2200" dirty="0">
               <a:latin typeface="Cambria Math" panose="02040503050406030204" pitchFamily="18" charset="0"/>
               <a:ea typeface="Cambria Math" panose="02040503050406030204" pitchFamily="18" charset="0"/>
@@ -27928,6 +27990,153 @@
                                           <p:spTgt spid="3">
                                             <p:txEl>
                                               <p:pRg st="6" end="6"/>
+                                            </p:txEl>
+                                          </p:spTgt>
+                                        </p:tgtEl>
+                                        <p:attrNameLst>
+                                          <p:attrName>style.visibility</p:attrName>
+                                        </p:attrNameLst>
+                                      </p:cBhvr>
+                                      <p:to>
+                                        <p:strVal val="visible"/>
+                                      </p:to>
+                                    </p:set>
+                                  </p:childTnLst>
+                                </p:cTn>
+                              </p:par>
+                            </p:childTnLst>
+                          </p:cTn>
+                        </p:par>
+                      </p:childTnLst>
+                    </p:cTn>
+                  </p:par>
+                  <p:par>
+                    <p:cTn id="31" fill="hold">
+                      <p:stCondLst>
+                        <p:cond delay="indefinite"/>
+                      </p:stCondLst>
+                      <p:childTnLst>
+                        <p:par>
+                          <p:cTn id="32" fill="hold">
+                            <p:stCondLst>
+                              <p:cond delay="0"/>
+                            </p:stCondLst>
+                            <p:childTnLst>
+                              <p:par>
+                                <p:cTn id="33" presetID="1" presetClass="entr" presetSubtype="0" fill="hold" nodeType="clickEffect">
+                                  <p:stCondLst>
+                                    <p:cond delay="0"/>
+                                  </p:stCondLst>
+                                  <p:childTnLst>
+                                    <p:set>
+                                      <p:cBhvr>
+                                        <p:cTn id="34" dur="1" fill="hold">
+                                          <p:stCondLst>
+                                            <p:cond delay="0"/>
+                                          </p:stCondLst>
+                                        </p:cTn>
+                                        <p:tgtEl>
+                                          <p:spTgt spid="3">
+                                            <p:txEl>
+                                              <p:pRg st="7" end="7"/>
+                                            </p:txEl>
+                                          </p:spTgt>
+                                        </p:tgtEl>
+                                        <p:attrNameLst>
+                                          <p:attrName>style.visibility</p:attrName>
+                                        </p:attrNameLst>
+                                      </p:cBhvr>
+                                      <p:to>
+                                        <p:strVal val="visible"/>
+                                      </p:to>
+                                    </p:set>
+                                  </p:childTnLst>
+                                </p:cTn>
+                              </p:par>
+                            </p:childTnLst>
+                          </p:cTn>
+                        </p:par>
+                      </p:childTnLst>
+                    </p:cTn>
+                  </p:par>
+                  <p:par>
+                    <p:cTn id="35" fill="hold">
+                      <p:stCondLst>
+                        <p:cond delay="indefinite"/>
+                      </p:stCondLst>
+                      <p:childTnLst>
+                        <p:par>
+                          <p:cTn id="36" fill="hold">
+                            <p:stCondLst>
+                              <p:cond delay="0"/>
+                            </p:stCondLst>
+                            <p:childTnLst>
+                              <p:par>
+                                <p:cTn id="37" presetID="1" presetClass="entr" presetSubtype="0" fill="hold" nodeType="clickEffect">
+                                  <p:stCondLst>
+                                    <p:cond delay="0"/>
+                                  </p:stCondLst>
+                                  <p:childTnLst>
+                                    <p:set>
+                                      <p:cBhvr>
+                                        <p:cTn id="38" dur="1" fill="hold">
+                                          <p:stCondLst>
+                                            <p:cond delay="0"/>
+                                          </p:stCondLst>
+                                        </p:cTn>
+                                        <p:tgtEl>
+                                          <p:spTgt spid="3">
+                                            <p:txEl>
+                                              <p:pRg st="8" end="8"/>
+                                            </p:txEl>
+                                          </p:spTgt>
+                                        </p:tgtEl>
+                                        <p:attrNameLst>
+                                          <p:attrName>style.visibility</p:attrName>
+                                        </p:attrNameLst>
+                                      </p:cBhvr>
+                                      <p:to>
+                                        <p:strVal val="visible"/>
+                                      </p:to>
+                                    </p:set>
+                                  </p:childTnLst>
+                                </p:cTn>
+                              </p:par>
+                            </p:childTnLst>
+                          </p:cTn>
+                        </p:par>
+                      </p:childTnLst>
+                    </p:cTn>
+                  </p:par>
+                  <p:par>
+                    <p:cTn id="39" fill="hold">
+                      <p:stCondLst>
+                        <p:cond delay="indefinite"/>
+                      </p:stCondLst>
+                      <p:childTnLst>
+                        <p:par>
+                          <p:cTn id="40" fill="hold">
+                            <p:stCondLst>
+                              <p:cond delay="0"/>
+                            </p:stCondLst>
+                            <p:childTnLst>
+                              <p:par>
+                                <p:cTn id="41" presetID="1" presetClass="entr" presetSubtype="0" fill="hold" nodeType="clickEffect">
+                                  <p:stCondLst>
+                                    <p:cond delay="0"/>
+                                  </p:stCondLst>
+                                  <p:childTnLst>
+                                    <p:set>
+                                      <p:cBhvr>
+                                        <p:cTn id="42" dur="1" fill="hold">
+                                          <p:stCondLst>
+                                            <p:cond delay="0"/>
+                                          </p:stCondLst>
+                                        </p:cTn>
+                                        <p:tgtEl>
+                                          <p:spTgt spid="3">
+                                            <p:txEl>
+                                              <p:pRg st="9" end="9"/>
                                             </p:txEl>
                                           </p:spTgt>
                                         </p:tgtEl>

</xml_diff>